<commit_message>
minor change slide TA
</commit_message>
<xml_diff>
--- a/Dokumen/05111540000055-Pradipta-Baskara-Slide_TA.pptx
+++ b/Dokumen/05111540000055-Pradipta-Baskara-Slide_TA.pptx
@@ -3707,7 +3707,7 @@
           <p:cNvPr id="2" name="Title 1">
             <a:extLst>
               <a:ext uri="{FF2B5EF4-FFF2-40B4-BE49-F238E27FC236}">
-                <a16:creationId xmlns:a16="http://schemas.microsoft.com/office/drawing/2014/main" id="{6816E675-546B-4AF8-893A-F60DF9DD1595}"/>
+                <a16:creationId xmlns:a16="http://schemas.microsoft.com/office/drawing/2014/main" xmlns="" id="{6816E675-546B-4AF8-893A-F60DF9DD1595}"/>
               </a:ext>
             </a:extLst>
           </p:cNvPr>
@@ -3763,7 +3763,7 @@
           <p:cNvPr id="4" name="Rectangle 3">
             <a:extLst>
               <a:ext uri="{FF2B5EF4-FFF2-40B4-BE49-F238E27FC236}">
-                <a16:creationId xmlns:a16="http://schemas.microsoft.com/office/drawing/2014/main" id="{75238133-ED37-439D-B9AB-C85F5B12F7A6}"/>
+                <a16:creationId xmlns:a16="http://schemas.microsoft.com/office/drawing/2014/main" xmlns="" id="{75238133-ED37-439D-B9AB-C85F5B12F7A6}"/>
               </a:ext>
             </a:extLst>
           </p:cNvPr>
@@ -3935,7 +3935,7 @@
           <p:cNvPr id="5" name="Rectangle 4">
             <a:extLst>
               <a:ext uri="{FF2B5EF4-FFF2-40B4-BE49-F238E27FC236}">
-                <a16:creationId xmlns:a16="http://schemas.microsoft.com/office/drawing/2014/main" id="{7BDEAAFB-05E6-4E97-B534-F5E47B5093EE}"/>
+                <a16:creationId xmlns:a16="http://schemas.microsoft.com/office/drawing/2014/main" xmlns="" id="{7BDEAAFB-05E6-4E97-B534-F5E47B5093EE}"/>
               </a:ext>
             </a:extLst>
           </p:cNvPr>
@@ -4035,7 +4035,7 @@
           <p:cNvPr id="6" name="Picture 5">
             <a:extLst>
               <a:ext uri="{FF2B5EF4-FFF2-40B4-BE49-F238E27FC236}">
-                <a16:creationId xmlns:a16="http://schemas.microsoft.com/office/drawing/2014/main" id="{DC764AD9-86CA-4251-93FE-9843168C3BF5}"/>
+                <a16:creationId xmlns:a16="http://schemas.microsoft.com/office/drawing/2014/main" xmlns="" id="{DC764AD9-86CA-4251-93FE-9843168C3BF5}"/>
               </a:ext>
             </a:extLst>
           </p:cNvPr>
@@ -4071,7 +4071,7 @@
           <p:cNvPr id="8" name="Slide Number Placeholder 5">
             <a:extLst>
               <a:ext uri="{FF2B5EF4-FFF2-40B4-BE49-F238E27FC236}">
-                <a16:creationId xmlns:a16="http://schemas.microsoft.com/office/drawing/2014/main" id="{E13CD49D-3EDB-441A-8022-7957F0F6B201}"/>
+                <a16:creationId xmlns:a16="http://schemas.microsoft.com/office/drawing/2014/main" xmlns="" id="{E13CD49D-3EDB-441A-8022-7957F0F6B201}"/>
               </a:ext>
             </a:extLst>
           </p:cNvPr>
@@ -4116,7 +4116,7 @@
           <p:cNvPr id="7" name="Footer Placeholder 4">
             <a:extLst>
               <a:ext uri="{FF2B5EF4-FFF2-40B4-BE49-F238E27FC236}">
-                <a16:creationId xmlns:a16="http://schemas.microsoft.com/office/drawing/2014/main" id="{64FC418E-BF84-423E-9AB4-A77546C6ADA8}"/>
+                <a16:creationId xmlns:a16="http://schemas.microsoft.com/office/drawing/2014/main" xmlns="" id="{64FC418E-BF84-423E-9AB4-A77546C6ADA8}"/>
               </a:ext>
             </a:extLst>
           </p:cNvPr>
@@ -4285,7 +4285,7 @@
           <p:cNvPr id="49" name="Picture 48">
             <a:extLst>
               <a:ext uri="{FF2B5EF4-FFF2-40B4-BE49-F238E27FC236}">
-                <a16:creationId xmlns:a16="http://schemas.microsoft.com/office/drawing/2014/main" id="{3DB88EB2-4959-4384-B606-6EC9735683D6}"/>
+                <a16:creationId xmlns:a16="http://schemas.microsoft.com/office/drawing/2014/main" xmlns="" id="{3DB88EB2-4959-4384-B606-6EC9735683D6}"/>
               </a:ext>
             </a:extLst>
           </p:cNvPr>
@@ -4321,7 +4321,7 @@
           <p:cNvPr id="51" name="Straight Connector 50">
             <a:extLst>
               <a:ext uri="{FF2B5EF4-FFF2-40B4-BE49-F238E27FC236}">
-                <a16:creationId xmlns:a16="http://schemas.microsoft.com/office/drawing/2014/main" id="{29B44FC3-C737-4B92-B1D0-AD232099FBDF}"/>
+                <a16:creationId xmlns:a16="http://schemas.microsoft.com/office/drawing/2014/main" xmlns="" id="{29B44FC3-C737-4B92-B1D0-AD232099FBDF}"/>
               </a:ext>
             </a:extLst>
           </p:cNvPr>
@@ -4362,7 +4362,7 @@
           <p:cNvPr id="52" name="Title 1">
             <a:extLst>
               <a:ext uri="{FF2B5EF4-FFF2-40B4-BE49-F238E27FC236}">
-                <a16:creationId xmlns:a16="http://schemas.microsoft.com/office/drawing/2014/main" id="{2B8CDEBA-452A-4190-964B-37DF9F5C0EF5}"/>
+                <a16:creationId xmlns:a16="http://schemas.microsoft.com/office/drawing/2014/main" xmlns="" id="{2B8CDEBA-452A-4190-964B-37DF9F5C0EF5}"/>
               </a:ext>
             </a:extLst>
           </p:cNvPr>
@@ -4408,7 +4408,7 @@
           <p:cNvPr id="53" name="Rectangle 52">
             <a:extLst>
               <a:ext uri="{FF2B5EF4-FFF2-40B4-BE49-F238E27FC236}">
-                <a16:creationId xmlns:a16="http://schemas.microsoft.com/office/drawing/2014/main" id="{A0FB1C80-C067-49CE-95A9-A233AADF262C}"/>
+                <a16:creationId xmlns:a16="http://schemas.microsoft.com/office/drawing/2014/main" xmlns="" id="{A0FB1C80-C067-49CE-95A9-A233AADF262C}"/>
               </a:ext>
             </a:extLst>
           </p:cNvPr>
@@ -4459,7 +4459,7 @@
           <p:cNvPr id="54" name="Slide Number Placeholder 5">
             <a:extLst>
               <a:ext uri="{FF2B5EF4-FFF2-40B4-BE49-F238E27FC236}">
-                <a16:creationId xmlns:a16="http://schemas.microsoft.com/office/drawing/2014/main" id="{9AD941AF-6002-455E-B6E0-BA52F0663035}"/>
+                <a16:creationId xmlns:a16="http://schemas.microsoft.com/office/drawing/2014/main" xmlns="" id="{9AD941AF-6002-455E-B6E0-BA52F0663035}"/>
               </a:ext>
             </a:extLst>
           </p:cNvPr>
@@ -4504,7 +4504,7 @@
           <p:cNvPr id="2" name="Rectangle 1">
             <a:extLst>
               <a:ext uri="{FF2B5EF4-FFF2-40B4-BE49-F238E27FC236}">
-                <a16:creationId xmlns:a16="http://schemas.microsoft.com/office/drawing/2014/main" id="{14A90B70-7F26-462A-B0D6-991DF4A67FD9}"/>
+                <a16:creationId xmlns:a16="http://schemas.microsoft.com/office/drawing/2014/main" xmlns="" id="{14A90B70-7F26-462A-B0D6-991DF4A67FD9}"/>
               </a:ext>
             </a:extLst>
           </p:cNvPr>
@@ -4829,7 +4829,7 @@
           <p:cNvPr id="3" name="Rectangle 2">
             <a:extLst>
               <a:ext uri="{FF2B5EF4-FFF2-40B4-BE49-F238E27FC236}">
-                <a16:creationId xmlns:a16="http://schemas.microsoft.com/office/drawing/2014/main" id="{49E747A3-868F-4BD8-9598-29415557A7A6}"/>
+                <a16:creationId xmlns:a16="http://schemas.microsoft.com/office/drawing/2014/main" xmlns="" id="{49E747A3-868F-4BD8-9598-29415557A7A6}"/>
               </a:ext>
             </a:extLst>
           </p:cNvPr>
@@ -5301,7 +5301,7 @@
           <p:cNvPr id="12" name="Footer Placeholder 4">
             <a:extLst>
               <a:ext uri="{FF2B5EF4-FFF2-40B4-BE49-F238E27FC236}">
-                <a16:creationId xmlns:a16="http://schemas.microsoft.com/office/drawing/2014/main" id="{AF0761A2-EAB9-4EAD-AEDD-517B32979B49}"/>
+                <a16:creationId xmlns:a16="http://schemas.microsoft.com/office/drawing/2014/main" xmlns="" id="{AF0761A2-EAB9-4EAD-AEDD-517B32979B49}"/>
               </a:ext>
             </a:extLst>
           </p:cNvPr>
@@ -5403,6 +5403,13 @@
       </p:transition>
     </mc:Fallback>
   </mc:AlternateContent>
+  <p:timing>
+    <p:tnLst>
+      <p:par>
+        <p:cTn id="1" dur="indefinite" restart="never" nodeType="tmRoot"/>
+      </p:par>
+    </p:tnLst>
+  </p:timing>
 </p:sld>
 </file>
 
@@ -5428,7 +5435,7 @@
           <p:cNvPr id="49" name="Picture 48">
             <a:extLst>
               <a:ext uri="{FF2B5EF4-FFF2-40B4-BE49-F238E27FC236}">
-                <a16:creationId xmlns:a16="http://schemas.microsoft.com/office/drawing/2014/main" id="{3DB88EB2-4959-4384-B606-6EC9735683D6}"/>
+                <a16:creationId xmlns:a16="http://schemas.microsoft.com/office/drawing/2014/main" xmlns="" id="{3DB88EB2-4959-4384-B606-6EC9735683D6}"/>
               </a:ext>
             </a:extLst>
           </p:cNvPr>
@@ -5464,7 +5471,7 @@
           <p:cNvPr id="51" name="Straight Connector 50">
             <a:extLst>
               <a:ext uri="{FF2B5EF4-FFF2-40B4-BE49-F238E27FC236}">
-                <a16:creationId xmlns:a16="http://schemas.microsoft.com/office/drawing/2014/main" id="{29B44FC3-C737-4B92-B1D0-AD232099FBDF}"/>
+                <a16:creationId xmlns:a16="http://schemas.microsoft.com/office/drawing/2014/main" xmlns="" id="{29B44FC3-C737-4B92-B1D0-AD232099FBDF}"/>
               </a:ext>
             </a:extLst>
           </p:cNvPr>
@@ -5505,7 +5512,7 @@
           <p:cNvPr id="52" name="Title 1">
             <a:extLst>
               <a:ext uri="{FF2B5EF4-FFF2-40B4-BE49-F238E27FC236}">
-                <a16:creationId xmlns:a16="http://schemas.microsoft.com/office/drawing/2014/main" id="{2B8CDEBA-452A-4190-964B-37DF9F5C0EF5}"/>
+                <a16:creationId xmlns:a16="http://schemas.microsoft.com/office/drawing/2014/main" xmlns="" id="{2B8CDEBA-452A-4190-964B-37DF9F5C0EF5}"/>
               </a:ext>
             </a:extLst>
           </p:cNvPr>
@@ -5551,7 +5558,7 @@
           <p:cNvPr id="53" name="Rectangle 52">
             <a:extLst>
               <a:ext uri="{FF2B5EF4-FFF2-40B4-BE49-F238E27FC236}">
-                <a16:creationId xmlns:a16="http://schemas.microsoft.com/office/drawing/2014/main" id="{A0FB1C80-C067-49CE-95A9-A233AADF262C}"/>
+                <a16:creationId xmlns:a16="http://schemas.microsoft.com/office/drawing/2014/main" xmlns="" id="{A0FB1C80-C067-49CE-95A9-A233AADF262C}"/>
               </a:ext>
             </a:extLst>
           </p:cNvPr>
@@ -5602,7 +5609,7 @@
           <p:cNvPr id="54" name="Slide Number Placeholder 5">
             <a:extLst>
               <a:ext uri="{FF2B5EF4-FFF2-40B4-BE49-F238E27FC236}">
-                <a16:creationId xmlns:a16="http://schemas.microsoft.com/office/drawing/2014/main" id="{9AD941AF-6002-455E-B6E0-BA52F0663035}"/>
+                <a16:creationId xmlns:a16="http://schemas.microsoft.com/office/drawing/2014/main" xmlns="" id="{9AD941AF-6002-455E-B6E0-BA52F0663035}"/>
               </a:ext>
             </a:extLst>
           </p:cNvPr>
@@ -5647,7 +5654,7 @@
           <p:cNvPr id="5" name="Table 4">
             <a:extLst>
               <a:ext uri="{FF2B5EF4-FFF2-40B4-BE49-F238E27FC236}">
-                <a16:creationId xmlns:a16="http://schemas.microsoft.com/office/drawing/2014/main" id="{66E72B65-1F2B-4833-B451-07F7FCB90250}"/>
+                <a16:creationId xmlns:a16="http://schemas.microsoft.com/office/drawing/2014/main" xmlns="" id="{66E72B65-1F2B-4833-B451-07F7FCB90250}"/>
               </a:ext>
             </a:extLst>
           </p:cNvPr>
@@ -5676,14 +5683,14 @@
                 <a:gridCol w="3890102">
                   <a:extLst>
                     <a:ext uri="{9D8B030D-6E8A-4147-A177-3AD203B41FA5}">
-                      <a16:colId xmlns:a16="http://schemas.microsoft.com/office/drawing/2014/main" val="3510047415"/>
+                      <a16:colId xmlns:a16="http://schemas.microsoft.com/office/drawing/2014/main" xmlns="" val="3510047415"/>
                     </a:ext>
                   </a:extLst>
                 </a:gridCol>
                 <a:gridCol w="3605610">
                   <a:extLst>
                     <a:ext uri="{9D8B030D-6E8A-4147-A177-3AD203B41FA5}">
-                      <a16:colId xmlns:a16="http://schemas.microsoft.com/office/drawing/2014/main" val="2013745537"/>
+                      <a16:colId xmlns:a16="http://schemas.microsoft.com/office/drawing/2014/main" xmlns="" val="2013745537"/>
                     </a:ext>
                   </a:extLst>
                 </a:gridCol>
@@ -5825,7 +5832,7 @@
                 </a:tc>
                 <a:extLst>
                   <a:ext uri="{0D108BD9-81ED-4DB2-BD59-A6C34878D82A}">
-                    <a16:rowId xmlns:a16="http://schemas.microsoft.com/office/drawing/2014/main" val="3035232346"/>
+                    <a16:rowId xmlns:a16="http://schemas.microsoft.com/office/drawing/2014/main" xmlns="" val="3035232346"/>
                   </a:ext>
                 </a:extLst>
               </a:tr>
@@ -5966,7 +5973,7 @@
                 </a:tc>
                 <a:extLst>
                   <a:ext uri="{0D108BD9-81ED-4DB2-BD59-A6C34878D82A}">
-                    <a16:rowId xmlns:a16="http://schemas.microsoft.com/office/drawing/2014/main" val="1878043881"/>
+                    <a16:rowId xmlns:a16="http://schemas.microsoft.com/office/drawing/2014/main" xmlns="" val="1878043881"/>
                   </a:ext>
                 </a:extLst>
               </a:tr>
@@ -6107,7 +6114,7 @@
                 </a:tc>
                 <a:extLst>
                   <a:ext uri="{0D108BD9-81ED-4DB2-BD59-A6C34878D82A}">
-                    <a16:rowId xmlns:a16="http://schemas.microsoft.com/office/drawing/2014/main" val="2194787024"/>
+                    <a16:rowId xmlns:a16="http://schemas.microsoft.com/office/drawing/2014/main" xmlns="" val="2194787024"/>
                   </a:ext>
                 </a:extLst>
               </a:tr>
@@ -6248,7 +6255,7 @@
                 </a:tc>
                 <a:extLst>
                   <a:ext uri="{0D108BD9-81ED-4DB2-BD59-A6C34878D82A}">
-                    <a16:rowId xmlns:a16="http://schemas.microsoft.com/office/drawing/2014/main" val="3034746610"/>
+                    <a16:rowId xmlns:a16="http://schemas.microsoft.com/office/drawing/2014/main" xmlns="" val="3034746610"/>
                   </a:ext>
                 </a:extLst>
               </a:tr>
@@ -6410,7 +6417,7 @@
                 </a:tc>
                 <a:extLst>
                   <a:ext uri="{0D108BD9-81ED-4DB2-BD59-A6C34878D82A}">
-                    <a16:rowId xmlns:a16="http://schemas.microsoft.com/office/drawing/2014/main" val="3793640881"/>
+                    <a16:rowId xmlns:a16="http://schemas.microsoft.com/office/drawing/2014/main" xmlns="" val="3793640881"/>
                   </a:ext>
                 </a:extLst>
               </a:tr>
@@ -6558,7 +6565,7 @@
                 </a:tc>
                 <a:extLst>
                   <a:ext uri="{0D108BD9-81ED-4DB2-BD59-A6C34878D82A}">
-                    <a16:rowId xmlns:a16="http://schemas.microsoft.com/office/drawing/2014/main" val="1020683905"/>
+                    <a16:rowId xmlns:a16="http://schemas.microsoft.com/office/drawing/2014/main" xmlns="" val="1020683905"/>
                   </a:ext>
                 </a:extLst>
               </a:tr>
@@ -6713,7 +6720,7 @@
                 </a:tc>
                 <a:extLst>
                   <a:ext uri="{0D108BD9-81ED-4DB2-BD59-A6C34878D82A}">
-                    <a16:rowId xmlns:a16="http://schemas.microsoft.com/office/drawing/2014/main" val="3595026320"/>
+                    <a16:rowId xmlns:a16="http://schemas.microsoft.com/office/drawing/2014/main" xmlns="" val="3595026320"/>
                   </a:ext>
                 </a:extLst>
               </a:tr>
@@ -6854,7 +6861,7 @@
                 </a:tc>
                 <a:extLst>
                   <a:ext uri="{0D108BD9-81ED-4DB2-BD59-A6C34878D82A}">
-                    <a16:rowId xmlns:a16="http://schemas.microsoft.com/office/drawing/2014/main" val="3513638625"/>
+                    <a16:rowId xmlns:a16="http://schemas.microsoft.com/office/drawing/2014/main" xmlns="" val="3513638625"/>
                   </a:ext>
                 </a:extLst>
               </a:tr>
@@ -6867,7 +6874,7 @@
           <p:cNvPr id="14" name="TextBox 13">
             <a:extLst>
               <a:ext uri="{FF2B5EF4-FFF2-40B4-BE49-F238E27FC236}">
-                <a16:creationId xmlns:a16="http://schemas.microsoft.com/office/drawing/2014/main" id="{051EACA1-B387-4D83-9995-9A9E6CFE303D}"/>
+                <a16:creationId xmlns:a16="http://schemas.microsoft.com/office/drawing/2014/main" xmlns="" id="{051EACA1-B387-4D83-9995-9A9E6CFE303D}"/>
               </a:ext>
             </a:extLst>
           </p:cNvPr>
@@ -6915,7 +6922,7 @@
           <p:cNvPr id="10" name="Footer Placeholder 4">
             <a:extLst>
               <a:ext uri="{FF2B5EF4-FFF2-40B4-BE49-F238E27FC236}">
-                <a16:creationId xmlns:a16="http://schemas.microsoft.com/office/drawing/2014/main" id="{619E15D3-AD04-4D9C-95A1-903ECEAF1A7F}"/>
+                <a16:creationId xmlns:a16="http://schemas.microsoft.com/office/drawing/2014/main" xmlns="" id="{619E15D3-AD04-4D9C-95A1-903ECEAF1A7F}"/>
               </a:ext>
             </a:extLst>
           </p:cNvPr>
@@ -6973,6 +6980,13 @@
       </p:transition>
     </mc:Fallback>
   </mc:AlternateContent>
+  <p:timing>
+    <p:tnLst>
+      <p:par>
+        <p:cTn id="1" dur="indefinite" restart="never" nodeType="tmRoot"/>
+      </p:par>
+    </p:tnLst>
+  </p:timing>
 </p:sld>
 </file>
 
@@ -6998,7 +7012,7 @@
           <p:cNvPr id="49" name="Picture 48">
             <a:extLst>
               <a:ext uri="{FF2B5EF4-FFF2-40B4-BE49-F238E27FC236}">
-                <a16:creationId xmlns:a16="http://schemas.microsoft.com/office/drawing/2014/main" id="{3DB88EB2-4959-4384-B606-6EC9735683D6}"/>
+                <a16:creationId xmlns:a16="http://schemas.microsoft.com/office/drawing/2014/main" xmlns="" id="{3DB88EB2-4959-4384-B606-6EC9735683D6}"/>
               </a:ext>
             </a:extLst>
           </p:cNvPr>
@@ -7034,7 +7048,7 @@
           <p:cNvPr id="51" name="Straight Connector 50">
             <a:extLst>
               <a:ext uri="{FF2B5EF4-FFF2-40B4-BE49-F238E27FC236}">
-                <a16:creationId xmlns:a16="http://schemas.microsoft.com/office/drawing/2014/main" id="{29B44FC3-C737-4B92-B1D0-AD232099FBDF}"/>
+                <a16:creationId xmlns:a16="http://schemas.microsoft.com/office/drawing/2014/main" xmlns="" id="{29B44FC3-C737-4B92-B1D0-AD232099FBDF}"/>
               </a:ext>
             </a:extLst>
           </p:cNvPr>
@@ -7075,7 +7089,7 @@
           <p:cNvPr id="52" name="Title 1">
             <a:extLst>
               <a:ext uri="{FF2B5EF4-FFF2-40B4-BE49-F238E27FC236}">
-                <a16:creationId xmlns:a16="http://schemas.microsoft.com/office/drawing/2014/main" id="{2B8CDEBA-452A-4190-964B-37DF9F5C0EF5}"/>
+                <a16:creationId xmlns:a16="http://schemas.microsoft.com/office/drawing/2014/main" xmlns="" id="{2B8CDEBA-452A-4190-964B-37DF9F5C0EF5}"/>
               </a:ext>
             </a:extLst>
           </p:cNvPr>
@@ -7121,7 +7135,7 @@
           <p:cNvPr id="53" name="Rectangle 52">
             <a:extLst>
               <a:ext uri="{FF2B5EF4-FFF2-40B4-BE49-F238E27FC236}">
-                <a16:creationId xmlns:a16="http://schemas.microsoft.com/office/drawing/2014/main" id="{A0FB1C80-C067-49CE-95A9-A233AADF262C}"/>
+                <a16:creationId xmlns:a16="http://schemas.microsoft.com/office/drawing/2014/main" xmlns="" id="{A0FB1C80-C067-49CE-95A9-A233AADF262C}"/>
               </a:ext>
             </a:extLst>
           </p:cNvPr>
@@ -7172,7 +7186,7 @@
           <p:cNvPr id="54" name="Slide Number Placeholder 5">
             <a:extLst>
               <a:ext uri="{FF2B5EF4-FFF2-40B4-BE49-F238E27FC236}">
-                <a16:creationId xmlns:a16="http://schemas.microsoft.com/office/drawing/2014/main" id="{9AD941AF-6002-455E-B6E0-BA52F0663035}"/>
+                <a16:creationId xmlns:a16="http://schemas.microsoft.com/office/drawing/2014/main" xmlns="" id="{9AD941AF-6002-455E-B6E0-BA52F0663035}"/>
               </a:ext>
             </a:extLst>
           </p:cNvPr>
@@ -7217,7 +7231,7 @@
           <p:cNvPr id="129" name="TextBox 128">
             <a:extLst>
               <a:ext uri="{FF2B5EF4-FFF2-40B4-BE49-F238E27FC236}">
-                <a16:creationId xmlns:a16="http://schemas.microsoft.com/office/drawing/2014/main" id="{FC4F8F57-3438-4811-92E7-2FF4EDFCDA04}"/>
+                <a16:creationId xmlns:a16="http://schemas.microsoft.com/office/drawing/2014/main" xmlns="" id="{FC4F8F57-3438-4811-92E7-2FF4EDFCDA04}"/>
               </a:ext>
             </a:extLst>
           </p:cNvPr>
@@ -7269,7 +7283,7 @@
           <p:cNvPr id="27" name="Footer Placeholder 4">
             <a:extLst>
               <a:ext uri="{FF2B5EF4-FFF2-40B4-BE49-F238E27FC236}">
-                <a16:creationId xmlns:a16="http://schemas.microsoft.com/office/drawing/2014/main" id="{C737CB17-8456-42DD-A146-3C0168AABCA7}"/>
+                <a16:creationId xmlns:a16="http://schemas.microsoft.com/office/drawing/2014/main" xmlns="" id="{C737CB17-8456-42DD-A146-3C0168AABCA7}"/>
               </a:ext>
             </a:extLst>
           </p:cNvPr>
@@ -7357,6 +7371,13 @@
       </p:transition>
     </mc:Fallback>
   </mc:AlternateContent>
+  <p:timing>
+    <p:tnLst>
+      <p:par>
+        <p:cTn id="1" dur="indefinite" restart="never" nodeType="tmRoot"/>
+      </p:par>
+    </p:tnLst>
+  </p:timing>
 </p:sld>
 </file>
 
@@ -7382,7 +7403,7 @@
           <p:cNvPr id="49" name="Picture 48">
             <a:extLst>
               <a:ext uri="{FF2B5EF4-FFF2-40B4-BE49-F238E27FC236}">
-                <a16:creationId xmlns:a16="http://schemas.microsoft.com/office/drawing/2014/main" id="{3DB88EB2-4959-4384-B606-6EC9735683D6}"/>
+                <a16:creationId xmlns:a16="http://schemas.microsoft.com/office/drawing/2014/main" xmlns="" id="{3DB88EB2-4959-4384-B606-6EC9735683D6}"/>
               </a:ext>
             </a:extLst>
           </p:cNvPr>
@@ -7418,7 +7439,7 @@
           <p:cNvPr id="51" name="Straight Connector 50">
             <a:extLst>
               <a:ext uri="{FF2B5EF4-FFF2-40B4-BE49-F238E27FC236}">
-                <a16:creationId xmlns:a16="http://schemas.microsoft.com/office/drawing/2014/main" id="{29B44FC3-C737-4B92-B1D0-AD232099FBDF}"/>
+                <a16:creationId xmlns:a16="http://schemas.microsoft.com/office/drawing/2014/main" xmlns="" id="{29B44FC3-C737-4B92-B1D0-AD232099FBDF}"/>
               </a:ext>
             </a:extLst>
           </p:cNvPr>
@@ -7459,7 +7480,7 @@
           <p:cNvPr id="52" name="Title 1">
             <a:extLst>
               <a:ext uri="{FF2B5EF4-FFF2-40B4-BE49-F238E27FC236}">
-                <a16:creationId xmlns:a16="http://schemas.microsoft.com/office/drawing/2014/main" id="{2B8CDEBA-452A-4190-964B-37DF9F5C0EF5}"/>
+                <a16:creationId xmlns:a16="http://schemas.microsoft.com/office/drawing/2014/main" xmlns="" id="{2B8CDEBA-452A-4190-964B-37DF9F5C0EF5}"/>
               </a:ext>
             </a:extLst>
           </p:cNvPr>
@@ -7505,7 +7526,7 @@
           <p:cNvPr id="53" name="Rectangle 52">
             <a:extLst>
               <a:ext uri="{FF2B5EF4-FFF2-40B4-BE49-F238E27FC236}">
-                <a16:creationId xmlns:a16="http://schemas.microsoft.com/office/drawing/2014/main" id="{A0FB1C80-C067-49CE-95A9-A233AADF262C}"/>
+                <a16:creationId xmlns:a16="http://schemas.microsoft.com/office/drawing/2014/main" xmlns="" id="{A0FB1C80-C067-49CE-95A9-A233AADF262C}"/>
               </a:ext>
             </a:extLst>
           </p:cNvPr>
@@ -7556,7 +7577,7 @@
           <p:cNvPr id="54" name="Slide Number Placeholder 5">
             <a:extLst>
               <a:ext uri="{FF2B5EF4-FFF2-40B4-BE49-F238E27FC236}">
-                <a16:creationId xmlns:a16="http://schemas.microsoft.com/office/drawing/2014/main" id="{9AD941AF-6002-455E-B6E0-BA52F0663035}"/>
+                <a16:creationId xmlns:a16="http://schemas.microsoft.com/office/drawing/2014/main" xmlns="" id="{9AD941AF-6002-455E-B6E0-BA52F0663035}"/>
               </a:ext>
             </a:extLst>
           </p:cNvPr>
@@ -7601,7 +7622,7 @@
           <p:cNvPr id="17" name="Footer Placeholder 4">
             <a:extLst>
               <a:ext uri="{FF2B5EF4-FFF2-40B4-BE49-F238E27FC236}">
-                <a16:creationId xmlns:a16="http://schemas.microsoft.com/office/drawing/2014/main" id="{F9626AAF-B8BA-4148-8D94-21D4BA977222}"/>
+                <a16:creationId xmlns:a16="http://schemas.microsoft.com/office/drawing/2014/main" xmlns="" id="{F9626AAF-B8BA-4148-8D94-21D4BA977222}"/>
               </a:ext>
             </a:extLst>
           </p:cNvPr>
@@ -7711,7 +7732,7 @@
           <p:cNvPr id="10" name="Rectangle 9">
             <a:extLst>
               <a:ext uri="{FF2B5EF4-FFF2-40B4-BE49-F238E27FC236}">
-                <a16:creationId xmlns:a16="http://schemas.microsoft.com/office/drawing/2014/main" id="{25FDE7F5-C35A-489D-B7C0-AD574DFE9AF2}"/>
+                <a16:creationId xmlns:a16="http://schemas.microsoft.com/office/drawing/2014/main" xmlns="" id="{25FDE7F5-C35A-489D-B7C0-AD574DFE9AF2}"/>
               </a:ext>
             </a:extLst>
           </p:cNvPr>
@@ -7892,6 +7913,13 @@
       </p:transition>
     </mc:Fallback>
   </mc:AlternateContent>
+  <p:timing>
+    <p:tnLst>
+      <p:par>
+        <p:cTn id="1" dur="indefinite" restart="never" nodeType="tmRoot"/>
+      </p:par>
+    </p:tnLst>
+  </p:timing>
 </p:sld>
 </file>
 
@@ -7917,7 +7945,7 @@
           <p:cNvPr id="49" name="Picture 48">
             <a:extLst>
               <a:ext uri="{FF2B5EF4-FFF2-40B4-BE49-F238E27FC236}">
-                <a16:creationId xmlns:a16="http://schemas.microsoft.com/office/drawing/2014/main" id="{3DB88EB2-4959-4384-B606-6EC9735683D6}"/>
+                <a16:creationId xmlns:a16="http://schemas.microsoft.com/office/drawing/2014/main" xmlns="" id="{3DB88EB2-4959-4384-B606-6EC9735683D6}"/>
               </a:ext>
             </a:extLst>
           </p:cNvPr>
@@ -7953,7 +7981,7 @@
           <p:cNvPr id="51" name="Straight Connector 50">
             <a:extLst>
               <a:ext uri="{FF2B5EF4-FFF2-40B4-BE49-F238E27FC236}">
-                <a16:creationId xmlns:a16="http://schemas.microsoft.com/office/drawing/2014/main" id="{29B44FC3-C737-4B92-B1D0-AD232099FBDF}"/>
+                <a16:creationId xmlns:a16="http://schemas.microsoft.com/office/drawing/2014/main" xmlns="" id="{29B44FC3-C737-4B92-B1D0-AD232099FBDF}"/>
               </a:ext>
             </a:extLst>
           </p:cNvPr>
@@ -7994,7 +8022,7 @@
           <p:cNvPr id="52" name="Title 1">
             <a:extLst>
               <a:ext uri="{FF2B5EF4-FFF2-40B4-BE49-F238E27FC236}">
-                <a16:creationId xmlns:a16="http://schemas.microsoft.com/office/drawing/2014/main" id="{2B8CDEBA-452A-4190-964B-37DF9F5C0EF5}"/>
+                <a16:creationId xmlns:a16="http://schemas.microsoft.com/office/drawing/2014/main" xmlns="" id="{2B8CDEBA-452A-4190-964B-37DF9F5C0EF5}"/>
               </a:ext>
             </a:extLst>
           </p:cNvPr>
@@ -8040,7 +8068,7 @@
           <p:cNvPr id="53" name="Rectangle 52">
             <a:extLst>
               <a:ext uri="{FF2B5EF4-FFF2-40B4-BE49-F238E27FC236}">
-                <a16:creationId xmlns:a16="http://schemas.microsoft.com/office/drawing/2014/main" id="{A0FB1C80-C067-49CE-95A9-A233AADF262C}"/>
+                <a16:creationId xmlns:a16="http://schemas.microsoft.com/office/drawing/2014/main" xmlns="" id="{A0FB1C80-C067-49CE-95A9-A233AADF262C}"/>
               </a:ext>
             </a:extLst>
           </p:cNvPr>
@@ -8091,7 +8119,7 @@
           <p:cNvPr id="54" name="Slide Number Placeholder 5">
             <a:extLst>
               <a:ext uri="{FF2B5EF4-FFF2-40B4-BE49-F238E27FC236}">
-                <a16:creationId xmlns:a16="http://schemas.microsoft.com/office/drawing/2014/main" id="{9AD941AF-6002-455E-B6E0-BA52F0663035}"/>
+                <a16:creationId xmlns:a16="http://schemas.microsoft.com/office/drawing/2014/main" xmlns="" id="{9AD941AF-6002-455E-B6E0-BA52F0663035}"/>
               </a:ext>
             </a:extLst>
           </p:cNvPr>
@@ -8136,7 +8164,7 @@
           <p:cNvPr id="91" name="Rectangle 90">
             <a:extLst>
               <a:ext uri="{FF2B5EF4-FFF2-40B4-BE49-F238E27FC236}">
-                <a16:creationId xmlns:a16="http://schemas.microsoft.com/office/drawing/2014/main" id="{25FDE7F5-C35A-489D-B7C0-AD574DFE9AF2}"/>
+                <a16:creationId xmlns:a16="http://schemas.microsoft.com/office/drawing/2014/main" xmlns="" id="{25FDE7F5-C35A-489D-B7C0-AD574DFE9AF2}"/>
               </a:ext>
             </a:extLst>
           </p:cNvPr>
@@ -8517,7 +8545,7 @@
           <p:cNvPr id="25" name="Footer Placeholder 4">
             <a:extLst>
               <a:ext uri="{FF2B5EF4-FFF2-40B4-BE49-F238E27FC236}">
-                <a16:creationId xmlns:a16="http://schemas.microsoft.com/office/drawing/2014/main" id="{18EE5532-359F-4760-AF99-FD1069F39F6D}"/>
+                <a16:creationId xmlns:a16="http://schemas.microsoft.com/office/drawing/2014/main" xmlns="" id="{18EE5532-359F-4760-AF99-FD1069F39F6D}"/>
               </a:ext>
             </a:extLst>
           </p:cNvPr>
@@ -8608,6 +8636,13 @@
       </p:transition>
     </mc:Fallback>
   </mc:AlternateContent>
+  <p:timing>
+    <p:tnLst>
+      <p:par>
+        <p:cTn id="1" dur="indefinite" restart="never" nodeType="tmRoot"/>
+      </p:par>
+    </p:tnLst>
+  </p:timing>
 </p:sld>
 </file>
 
@@ -8633,7 +8668,7 @@
           <p:cNvPr id="49" name="Picture 48">
             <a:extLst>
               <a:ext uri="{FF2B5EF4-FFF2-40B4-BE49-F238E27FC236}">
-                <a16:creationId xmlns:a16="http://schemas.microsoft.com/office/drawing/2014/main" id="{3DB88EB2-4959-4384-B606-6EC9735683D6}"/>
+                <a16:creationId xmlns:a16="http://schemas.microsoft.com/office/drawing/2014/main" xmlns="" id="{3DB88EB2-4959-4384-B606-6EC9735683D6}"/>
               </a:ext>
             </a:extLst>
           </p:cNvPr>
@@ -8669,7 +8704,7 @@
           <p:cNvPr id="51" name="Straight Connector 50">
             <a:extLst>
               <a:ext uri="{FF2B5EF4-FFF2-40B4-BE49-F238E27FC236}">
-                <a16:creationId xmlns:a16="http://schemas.microsoft.com/office/drawing/2014/main" id="{29B44FC3-C737-4B92-B1D0-AD232099FBDF}"/>
+                <a16:creationId xmlns:a16="http://schemas.microsoft.com/office/drawing/2014/main" xmlns="" id="{29B44FC3-C737-4B92-B1D0-AD232099FBDF}"/>
               </a:ext>
             </a:extLst>
           </p:cNvPr>
@@ -8710,7 +8745,7 @@
           <p:cNvPr id="52" name="Title 1">
             <a:extLst>
               <a:ext uri="{FF2B5EF4-FFF2-40B4-BE49-F238E27FC236}">
-                <a16:creationId xmlns:a16="http://schemas.microsoft.com/office/drawing/2014/main" id="{2B8CDEBA-452A-4190-964B-37DF9F5C0EF5}"/>
+                <a16:creationId xmlns:a16="http://schemas.microsoft.com/office/drawing/2014/main" xmlns="" id="{2B8CDEBA-452A-4190-964B-37DF9F5C0EF5}"/>
               </a:ext>
             </a:extLst>
           </p:cNvPr>
@@ -8756,7 +8791,7 @@
           <p:cNvPr id="53" name="Rectangle 52">
             <a:extLst>
               <a:ext uri="{FF2B5EF4-FFF2-40B4-BE49-F238E27FC236}">
-                <a16:creationId xmlns:a16="http://schemas.microsoft.com/office/drawing/2014/main" id="{A0FB1C80-C067-49CE-95A9-A233AADF262C}"/>
+                <a16:creationId xmlns:a16="http://schemas.microsoft.com/office/drawing/2014/main" xmlns="" id="{A0FB1C80-C067-49CE-95A9-A233AADF262C}"/>
               </a:ext>
             </a:extLst>
           </p:cNvPr>
@@ -8807,7 +8842,7 @@
           <p:cNvPr id="54" name="Slide Number Placeholder 5">
             <a:extLst>
               <a:ext uri="{FF2B5EF4-FFF2-40B4-BE49-F238E27FC236}">
-                <a16:creationId xmlns:a16="http://schemas.microsoft.com/office/drawing/2014/main" id="{9AD941AF-6002-455E-B6E0-BA52F0663035}"/>
+                <a16:creationId xmlns:a16="http://schemas.microsoft.com/office/drawing/2014/main" xmlns="" id="{9AD941AF-6002-455E-B6E0-BA52F0663035}"/>
               </a:ext>
             </a:extLst>
           </p:cNvPr>
@@ -8852,7 +8887,7 @@
           <p:cNvPr id="5" name="Rectangle 4">
             <a:extLst>
               <a:ext uri="{FF2B5EF4-FFF2-40B4-BE49-F238E27FC236}">
-                <a16:creationId xmlns:a16="http://schemas.microsoft.com/office/drawing/2014/main" id="{FFEC5CA1-0BFE-477B-AB1B-B28542C07C1A}"/>
+                <a16:creationId xmlns:a16="http://schemas.microsoft.com/office/drawing/2014/main" xmlns="" id="{FFEC5CA1-0BFE-477B-AB1B-B28542C07C1A}"/>
               </a:ext>
             </a:extLst>
           </p:cNvPr>
@@ -9116,7 +9151,7 @@
           <p:cNvPr id="23" name="Footer Placeholder 4">
             <a:extLst>
               <a:ext uri="{FF2B5EF4-FFF2-40B4-BE49-F238E27FC236}">
-                <a16:creationId xmlns:a16="http://schemas.microsoft.com/office/drawing/2014/main" id="{02179F8B-404D-4A7B-97D8-5F2C479ED1C9}"/>
+                <a16:creationId xmlns:a16="http://schemas.microsoft.com/office/drawing/2014/main" xmlns="" id="{02179F8B-404D-4A7B-97D8-5F2C479ED1C9}"/>
               </a:ext>
             </a:extLst>
           </p:cNvPr>
@@ -9210,6 +9245,13 @@
       </p:transition>
     </mc:Fallback>
   </mc:AlternateContent>
+  <p:timing>
+    <p:tnLst>
+      <p:par>
+        <p:cTn id="1" dur="indefinite" restart="never" nodeType="tmRoot"/>
+      </p:par>
+    </p:tnLst>
+  </p:timing>
 </p:sld>
 </file>
 
@@ -9235,7 +9277,7 @@
           <p:cNvPr id="49" name="Picture 48">
             <a:extLst>
               <a:ext uri="{FF2B5EF4-FFF2-40B4-BE49-F238E27FC236}">
-                <a16:creationId xmlns:a16="http://schemas.microsoft.com/office/drawing/2014/main" id="{3DB88EB2-4959-4384-B606-6EC9735683D6}"/>
+                <a16:creationId xmlns:a16="http://schemas.microsoft.com/office/drawing/2014/main" xmlns="" id="{3DB88EB2-4959-4384-B606-6EC9735683D6}"/>
               </a:ext>
             </a:extLst>
           </p:cNvPr>
@@ -9271,7 +9313,7 @@
           <p:cNvPr id="51" name="Straight Connector 50">
             <a:extLst>
               <a:ext uri="{FF2B5EF4-FFF2-40B4-BE49-F238E27FC236}">
-                <a16:creationId xmlns:a16="http://schemas.microsoft.com/office/drawing/2014/main" id="{29B44FC3-C737-4B92-B1D0-AD232099FBDF}"/>
+                <a16:creationId xmlns:a16="http://schemas.microsoft.com/office/drawing/2014/main" xmlns="" id="{29B44FC3-C737-4B92-B1D0-AD232099FBDF}"/>
               </a:ext>
             </a:extLst>
           </p:cNvPr>
@@ -9312,7 +9354,7 @@
           <p:cNvPr id="52" name="Title 1">
             <a:extLst>
               <a:ext uri="{FF2B5EF4-FFF2-40B4-BE49-F238E27FC236}">
-                <a16:creationId xmlns:a16="http://schemas.microsoft.com/office/drawing/2014/main" id="{2B8CDEBA-452A-4190-964B-37DF9F5C0EF5}"/>
+                <a16:creationId xmlns:a16="http://schemas.microsoft.com/office/drawing/2014/main" xmlns="" id="{2B8CDEBA-452A-4190-964B-37DF9F5C0EF5}"/>
               </a:ext>
             </a:extLst>
           </p:cNvPr>
@@ -9358,7 +9400,7 @@
           <p:cNvPr id="53" name="Rectangle 52">
             <a:extLst>
               <a:ext uri="{FF2B5EF4-FFF2-40B4-BE49-F238E27FC236}">
-                <a16:creationId xmlns:a16="http://schemas.microsoft.com/office/drawing/2014/main" id="{A0FB1C80-C067-49CE-95A9-A233AADF262C}"/>
+                <a16:creationId xmlns:a16="http://schemas.microsoft.com/office/drawing/2014/main" xmlns="" id="{A0FB1C80-C067-49CE-95A9-A233AADF262C}"/>
               </a:ext>
             </a:extLst>
           </p:cNvPr>
@@ -9409,7 +9451,7 @@
           <p:cNvPr id="54" name="Slide Number Placeholder 5">
             <a:extLst>
               <a:ext uri="{FF2B5EF4-FFF2-40B4-BE49-F238E27FC236}">
-                <a16:creationId xmlns:a16="http://schemas.microsoft.com/office/drawing/2014/main" id="{9AD941AF-6002-455E-B6E0-BA52F0663035}"/>
+                <a16:creationId xmlns:a16="http://schemas.microsoft.com/office/drawing/2014/main" xmlns="" id="{9AD941AF-6002-455E-B6E0-BA52F0663035}"/>
               </a:ext>
             </a:extLst>
           </p:cNvPr>
@@ -9454,7 +9496,7 @@
           <p:cNvPr id="5" name="Rectangle 4">
             <a:extLst>
               <a:ext uri="{FF2B5EF4-FFF2-40B4-BE49-F238E27FC236}">
-                <a16:creationId xmlns:a16="http://schemas.microsoft.com/office/drawing/2014/main" id="{FFEC5CA1-0BFE-477B-AB1B-B28542C07C1A}"/>
+                <a16:creationId xmlns:a16="http://schemas.microsoft.com/office/drawing/2014/main" xmlns="" id="{FFEC5CA1-0BFE-477B-AB1B-B28542C07C1A}"/>
               </a:ext>
             </a:extLst>
           </p:cNvPr>
@@ -9502,7 +9544,7 @@
           <p:cNvPr id="23" name="Footer Placeholder 4">
             <a:extLst>
               <a:ext uri="{FF2B5EF4-FFF2-40B4-BE49-F238E27FC236}">
-                <a16:creationId xmlns:a16="http://schemas.microsoft.com/office/drawing/2014/main" id="{02179F8B-404D-4A7B-97D8-5F2C479ED1C9}"/>
+                <a16:creationId xmlns:a16="http://schemas.microsoft.com/office/drawing/2014/main" xmlns="" id="{02179F8B-404D-4A7B-97D8-5F2C479ED1C9}"/>
               </a:ext>
             </a:extLst>
           </p:cNvPr>
@@ -9582,6 +9624,13 @@
       </p:transition>
     </mc:Fallback>
   </mc:AlternateContent>
+  <p:timing>
+    <p:tnLst>
+      <p:par>
+        <p:cTn id="1" dur="indefinite" restart="never" nodeType="tmRoot"/>
+      </p:par>
+    </p:tnLst>
+  </p:timing>
 </p:sld>
 </file>
 
@@ -9607,7 +9656,7 @@
           <p:cNvPr id="49" name="Picture 48">
             <a:extLst>
               <a:ext uri="{FF2B5EF4-FFF2-40B4-BE49-F238E27FC236}">
-                <a16:creationId xmlns:a16="http://schemas.microsoft.com/office/drawing/2014/main" id="{3DB88EB2-4959-4384-B606-6EC9735683D6}"/>
+                <a16:creationId xmlns:a16="http://schemas.microsoft.com/office/drawing/2014/main" xmlns="" id="{3DB88EB2-4959-4384-B606-6EC9735683D6}"/>
               </a:ext>
             </a:extLst>
           </p:cNvPr>
@@ -9643,7 +9692,7 @@
           <p:cNvPr id="51" name="Straight Connector 50">
             <a:extLst>
               <a:ext uri="{FF2B5EF4-FFF2-40B4-BE49-F238E27FC236}">
-                <a16:creationId xmlns:a16="http://schemas.microsoft.com/office/drawing/2014/main" id="{29B44FC3-C737-4B92-B1D0-AD232099FBDF}"/>
+                <a16:creationId xmlns:a16="http://schemas.microsoft.com/office/drawing/2014/main" xmlns="" id="{29B44FC3-C737-4B92-B1D0-AD232099FBDF}"/>
               </a:ext>
             </a:extLst>
           </p:cNvPr>
@@ -9684,7 +9733,7 @@
           <p:cNvPr id="52" name="Title 1">
             <a:extLst>
               <a:ext uri="{FF2B5EF4-FFF2-40B4-BE49-F238E27FC236}">
-                <a16:creationId xmlns:a16="http://schemas.microsoft.com/office/drawing/2014/main" id="{2B8CDEBA-452A-4190-964B-37DF9F5C0EF5}"/>
+                <a16:creationId xmlns:a16="http://schemas.microsoft.com/office/drawing/2014/main" xmlns="" id="{2B8CDEBA-452A-4190-964B-37DF9F5C0EF5}"/>
               </a:ext>
             </a:extLst>
           </p:cNvPr>
@@ -9730,7 +9779,7 @@
           <p:cNvPr id="53" name="Rectangle 52">
             <a:extLst>
               <a:ext uri="{FF2B5EF4-FFF2-40B4-BE49-F238E27FC236}">
-                <a16:creationId xmlns:a16="http://schemas.microsoft.com/office/drawing/2014/main" id="{A0FB1C80-C067-49CE-95A9-A233AADF262C}"/>
+                <a16:creationId xmlns:a16="http://schemas.microsoft.com/office/drawing/2014/main" xmlns="" id="{A0FB1C80-C067-49CE-95A9-A233AADF262C}"/>
               </a:ext>
             </a:extLst>
           </p:cNvPr>
@@ -9781,7 +9830,7 @@
           <p:cNvPr id="54" name="Slide Number Placeholder 5">
             <a:extLst>
               <a:ext uri="{FF2B5EF4-FFF2-40B4-BE49-F238E27FC236}">
-                <a16:creationId xmlns:a16="http://schemas.microsoft.com/office/drawing/2014/main" id="{9AD941AF-6002-455E-B6E0-BA52F0663035}"/>
+                <a16:creationId xmlns:a16="http://schemas.microsoft.com/office/drawing/2014/main" xmlns="" id="{9AD941AF-6002-455E-B6E0-BA52F0663035}"/>
               </a:ext>
             </a:extLst>
           </p:cNvPr>
@@ -9826,7 +9875,7 @@
           <p:cNvPr id="5" name="Rectangle 4">
             <a:extLst>
               <a:ext uri="{FF2B5EF4-FFF2-40B4-BE49-F238E27FC236}">
-                <a16:creationId xmlns:a16="http://schemas.microsoft.com/office/drawing/2014/main" id="{FFEC5CA1-0BFE-477B-AB1B-B28542C07C1A}"/>
+                <a16:creationId xmlns:a16="http://schemas.microsoft.com/office/drawing/2014/main" xmlns="" id="{FFEC5CA1-0BFE-477B-AB1B-B28542C07C1A}"/>
               </a:ext>
             </a:extLst>
           </p:cNvPr>
@@ -9947,7 +9996,7 @@
           <p:cNvPr id="23" name="Footer Placeholder 4">
             <a:extLst>
               <a:ext uri="{FF2B5EF4-FFF2-40B4-BE49-F238E27FC236}">
-                <a16:creationId xmlns:a16="http://schemas.microsoft.com/office/drawing/2014/main" id="{02179F8B-404D-4A7B-97D8-5F2C479ED1C9}"/>
+                <a16:creationId xmlns:a16="http://schemas.microsoft.com/office/drawing/2014/main" xmlns="" id="{02179F8B-404D-4A7B-97D8-5F2C479ED1C9}"/>
               </a:ext>
             </a:extLst>
           </p:cNvPr>
@@ -10024,7 +10073,7 @@
           <p:cNvPr id="12" name="Rectangle 11">
             <a:extLst>
               <a:ext uri="{FF2B5EF4-FFF2-40B4-BE49-F238E27FC236}">
-                <a16:creationId xmlns:a16="http://schemas.microsoft.com/office/drawing/2014/main" id="{FFEC5CA1-0BFE-477B-AB1B-B28542C07C1A}"/>
+                <a16:creationId xmlns:a16="http://schemas.microsoft.com/office/drawing/2014/main" xmlns="" id="{FFEC5CA1-0BFE-477B-AB1B-B28542C07C1A}"/>
               </a:ext>
             </a:extLst>
           </p:cNvPr>
@@ -10381,6 +10430,13 @@
       </p:transition>
     </mc:Fallback>
   </mc:AlternateContent>
+  <p:timing>
+    <p:tnLst>
+      <p:par>
+        <p:cTn id="1" dur="indefinite" restart="never" nodeType="tmRoot"/>
+      </p:par>
+    </p:tnLst>
+  </p:timing>
 </p:sld>
 </file>
 
@@ -10406,7 +10462,7 @@
           <p:cNvPr id="49" name="Picture 48">
             <a:extLst>
               <a:ext uri="{FF2B5EF4-FFF2-40B4-BE49-F238E27FC236}">
-                <a16:creationId xmlns:a16="http://schemas.microsoft.com/office/drawing/2014/main" id="{3DB88EB2-4959-4384-B606-6EC9735683D6}"/>
+                <a16:creationId xmlns:a16="http://schemas.microsoft.com/office/drawing/2014/main" xmlns="" id="{3DB88EB2-4959-4384-B606-6EC9735683D6}"/>
               </a:ext>
             </a:extLst>
           </p:cNvPr>
@@ -10442,7 +10498,7 @@
           <p:cNvPr id="51" name="Straight Connector 50">
             <a:extLst>
               <a:ext uri="{FF2B5EF4-FFF2-40B4-BE49-F238E27FC236}">
-                <a16:creationId xmlns:a16="http://schemas.microsoft.com/office/drawing/2014/main" id="{29B44FC3-C737-4B92-B1D0-AD232099FBDF}"/>
+                <a16:creationId xmlns:a16="http://schemas.microsoft.com/office/drawing/2014/main" xmlns="" id="{29B44FC3-C737-4B92-B1D0-AD232099FBDF}"/>
               </a:ext>
             </a:extLst>
           </p:cNvPr>
@@ -10483,7 +10539,7 @@
           <p:cNvPr id="52" name="Title 1">
             <a:extLst>
               <a:ext uri="{FF2B5EF4-FFF2-40B4-BE49-F238E27FC236}">
-                <a16:creationId xmlns:a16="http://schemas.microsoft.com/office/drawing/2014/main" id="{2B8CDEBA-452A-4190-964B-37DF9F5C0EF5}"/>
+                <a16:creationId xmlns:a16="http://schemas.microsoft.com/office/drawing/2014/main" xmlns="" id="{2B8CDEBA-452A-4190-964B-37DF9F5C0EF5}"/>
               </a:ext>
             </a:extLst>
           </p:cNvPr>
@@ -10529,7 +10585,7 @@
           <p:cNvPr id="53" name="Rectangle 52">
             <a:extLst>
               <a:ext uri="{FF2B5EF4-FFF2-40B4-BE49-F238E27FC236}">
-                <a16:creationId xmlns:a16="http://schemas.microsoft.com/office/drawing/2014/main" id="{A0FB1C80-C067-49CE-95A9-A233AADF262C}"/>
+                <a16:creationId xmlns:a16="http://schemas.microsoft.com/office/drawing/2014/main" xmlns="" id="{A0FB1C80-C067-49CE-95A9-A233AADF262C}"/>
               </a:ext>
             </a:extLst>
           </p:cNvPr>
@@ -10580,7 +10636,7 @@
           <p:cNvPr id="54" name="Slide Number Placeholder 5">
             <a:extLst>
               <a:ext uri="{FF2B5EF4-FFF2-40B4-BE49-F238E27FC236}">
-                <a16:creationId xmlns:a16="http://schemas.microsoft.com/office/drawing/2014/main" id="{9AD941AF-6002-455E-B6E0-BA52F0663035}"/>
+                <a16:creationId xmlns:a16="http://schemas.microsoft.com/office/drawing/2014/main" xmlns="" id="{9AD941AF-6002-455E-B6E0-BA52F0663035}"/>
               </a:ext>
             </a:extLst>
           </p:cNvPr>
@@ -10625,7 +10681,7 @@
           <p:cNvPr id="91" name="Rectangle 90">
             <a:extLst>
               <a:ext uri="{FF2B5EF4-FFF2-40B4-BE49-F238E27FC236}">
-                <a16:creationId xmlns:a16="http://schemas.microsoft.com/office/drawing/2014/main" id="{25FDE7F5-C35A-489D-B7C0-AD574DFE9AF2}"/>
+                <a16:creationId xmlns:a16="http://schemas.microsoft.com/office/drawing/2014/main" xmlns="" id="{25FDE7F5-C35A-489D-B7C0-AD574DFE9AF2}"/>
               </a:ext>
             </a:extLst>
           </p:cNvPr>
@@ -11318,7 +11374,7 @@
           <p:cNvPr id="27" name="Footer Placeholder 4">
             <a:extLst>
               <a:ext uri="{FF2B5EF4-FFF2-40B4-BE49-F238E27FC236}">
-                <a16:creationId xmlns:a16="http://schemas.microsoft.com/office/drawing/2014/main" id="{2B5F2E7F-643C-488D-8491-28AFB9677AD9}"/>
+                <a16:creationId xmlns:a16="http://schemas.microsoft.com/office/drawing/2014/main" xmlns="" id="{2B5F2E7F-643C-488D-8491-28AFB9677AD9}"/>
               </a:ext>
             </a:extLst>
           </p:cNvPr>
@@ -11409,6 +11465,13 @@
       </p:transition>
     </mc:Fallback>
   </mc:AlternateContent>
+  <p:timing>
+    <p:tnLst>
+      <p:par>
+        <p:cTn id="1" dur="indefinite" restart="never" nodeType="tmRoot"/>
+      </p:par>
+    </p:tnLst>
+  </p:timing>
 </p:sld>
 </file>
 
@@ -11434,7 +11497,7 @@
           <p:cNvPr id="49" name="Picture 48">
             <a:extLst>
               <a:ext uri="{FF2B5EF4-FFF2-40B4-BE49-F238E27FC236}">
-                <a16:creationId xmlns:a16="http://schemas.microsoft.com/office/drawing/2014/main" id="{3DB88EB2-4959-4384-B606-6EC9735683D6}"/>
+                <a16:creationId xmlns:a16="http://schemas.microsoft.com/office/drawing/2014/main" xmlns="" id="{3DB88EB2-4959-4384-B606-6EC9735683D6}"/>
               </a:ext>
             </a:extLst>
           </p:cNvPr>
@@ -11470,7 +11533,7 @@
           <p:cNvPr id="51" name="Straight Connector 50">
             <a:extLst>
               <a:ext uri="{FF2B5EF4-FFF2-40B4-BE49-F238E27FC236}">
-                <a16:creationId xmlns:a16="http://schemas.microsoft.com/office/drawing/2014/main" id="{29B44FC3-C737-4B92-B1D0-AD232099FBDF}"/>
+                <a16:creationId xmlns:a16="http://schemas.microsoft.com/office/drawing/2014/main" xmlns="" id="{29B44FC3-C737-4B92-B1D0-AD232099FBDF}"/>
               </a:ext>
             </a:extLst>
           </p:cNvPr>
@@ -11511,7 +11574,7 @@
           <p:cNvPr id="52" name="Title 1">
             <a:extLst>
               <a:ext uri="{FF2B5EF4-FFF2-40B4-BE49-F238E27FC236}">
-                <a16:creationId xmlns:a16="http://schemas.microsoft.com/office/drawing/2014/main" id="{2B8CDEBA-452A-4190-964B-37DF9F5C0EF5}"/>
+                <a16:creationId xmlns:a16="http://schemas.microsoft.com/office/drawing/2014/main" xmlns="" id="{2B8CDEBA-452A-4190-964B-37DF9F5C0EF5}"/>
               </a:ext>
             </a:extLst>
           </p:cNvPr>
@@ -11557,7 +11620,7 @@
           <p:cNvPr id="53" name="Rectangle 52">
             <a:extLst>
               <a:ext uri="{FF2B5EF4-FFF2-40B4-BE49-F238E27FC236}">
-                <a16:creationId xmlns:a16="http://schemas.microsoft.com/office/drawing/2014/main" id="{A0FB1C80-C067-49CE-95A9-A233AADF262C}"/>
+                <a16:creationId xmlns:a16="http://schemas.microsoft.com/office/drawing/2014/main" xmlns="" id="{A0FB1C80-C067-49CE-95A9-A233AADF262C}"/>
               </a:ext>
             </a:extLst>
           </p:cNvPr>
@@ -11608,7 +11671,7 @@
           <p:cNvPr id="54" name="Slide Number Placeholder 5">
             <a:extLst>
               <a:ext uri="{FF2B5EF4-FFF2-40B4-BE49-F238E27FC236}">
-                <a16:creationId xmlns:a16="http://schemas.microsoft.com/office/drawing/2014/main" id="{9AD941AF-6002-455E-B6E0-BA52F0663035}"/>
+                <a16:creationId xmlns:a16="http://schemas.microsoft.com/office/drawing/2014/main" xmlns="" id="{9AD941AF-6002-455E-B6E0-BA52F0663035}"/>
               </a:ext>
             </a:extLst>
           </p:cNvPr>
@@ -11653,7 +11716,7 @@
           <p:cNvPr id="5" name="Rectangle 4">
             <a:extLst>
               <a:ext uri="{FF2B5EF4-FFF2-40B4-BE49-F238E27FC236}">
-                <a16:creationId xmlns:a16="http://schemas.microsoft.com/office/drawing/2014/main" id="{FFEC5CA1-0BFE-477B-AB1B-B28542C07C1A}"/>
+                <a16:creationId xmlns:a16="http://schemas.microsoft.com/office/drawing/2014/main" xmlns="" id="{FFEC5CA1-0BFE-477B-AB1B-B28542C07C1A}"/>
               </a:ext>
             </a:extLst>
           </p:cNvPr>
@@ -11854,7 +11917,7 @@
           <p:cNvPr id="23" name="Footer Placeholder 4">
             <a:extLst>
               <a:ext uri="{FF2B5EF4-FFF2-40B4-BE49-F238E27FC236}">
-                <a16:creationId xmlns:a16="http://schemas.microsoft.com/office/drawing/2014/main" id="{02179F8B-404D-4A7B-97D8-5F2C479ED1C9}"/>
+                <a16:creationId xmlns:a16="http://schemas.microsoft.com/office/drawing/2014/main" xmlns="" id="{02179F8B-404D-4A7B-97D8-5F2C479ED1C9}"/>
               </a:ext>
             </a:extLst>
           </p:cNvPr>
@@ -11981,6 +12044,13 @@
       </p:transition>
     </mc:Fallback>
   </mc:AlternateContent>
+  <p:timing>
+    <p:tnLst>
+      <p:par>
+        <p:cTn id="1" dur="indefinite" restart="never" nodeType="tmRoot"/>
+      </p:par>
+    </p:tnLst>
+  </p:timing>
 </p:sld>
 </file>
 
@@ -12006,7 +12076,7 @@
           <p:cNvPr id="34" name="Group 33">
             <a:extLst>
               <a:ext uri="{FF2B5EF4-FFF2-40B4-BE49-F238E27FC236}">
-                <a16:creationId xmlns:a16="http://schemas.microsoft.com/office/drawing/2014/main" id="{599B53CD-E591-46C8-A491-CDBEF35ABA5C}"/>
+                <a16:creationId xmlns:a16="http://schemas.microsoft.com/office/drawing/2014/main" xmlns="" id="{599B53CD-E591-46C8-A491-CDBEF35ABA5C}"/>
               </a:ext>
             </a:extLst>
           </p:cNvPr>
@@ -12026,7 +12096,7 @@
             <p:cNvPr id="35" name="TextBox 34">
               <a:extLst>
                 <a:ext uri="{FF2B5EF4-FFF2-40B4-BE49-F238E27FC236}">
-                  <a16:creationId xmlns:a16="http://schemas.microsoft.com/office/drawing/2014/main" id="{78D8C8B2-514F-49DC-B789-A420D7762D4E}"/>
+                  <a16:creationId xmlns:a16="http://schemas.microsoft.com/office/drawing/2014/main" xmlns="" id="{78D8C8B2-514F-49DC-B789-A420D7762D4E}"/>
                 </a:ext>
               </a:extLst>
             </p:cNvPr>
@@ -12080,7 +12150,7 @@
             <p:cNvPr id="36" name="TextBox 35">
               <a:extLst>
                 <a:ext uri="{FF2B5EF4-FFF2-40B4-BE49-F238E27FC236}">
-                  <a16:creationId xmlns:a16="http://schemas.microsoft.com/office/drawing/2014/main" id="{F7EFAE9B-F2CE-4A25-88E5-CDEB06D09D0B}"/>
+                  <a16:creationId xmlns:a16="http://schemas.microsoft.com/office/drawing/2014/main" xmlns="" id="{F7EFAE9B-F2CE-4A25-88E5-CDEB06D09D0B}"/>
                 </a:ext>
               </a:extLst>
             </p:cNvPr>
@@ -12136,7 +12206,7 @@
           <p:cNvPr id="40" name="Group 39">
             <a:extLst>
               <a:ext uri="{FF2B5EF4-FFF2-40B4-BE49-F238E27FC236}">
-                <a16:creationId xmlns:a16="http://schemas.microsoft.com/office/drawing/2014/main" id="{3B6F129A-E905-46DF-B59D-B76BCB730E64}"/>
+                <a16:creationId xmlns:a16="http://schemas.microsoft.com/office/drawing/2014/main" xmlns="" id="{3B6F129A-E905-46DF-B59D-B76BCB730E64}"/>
               </a:ext>
             </a:extLst>
           </p:cNvPr>
@@ -12156,7 +12226,7 @@
             <p:cNvPr id="41" name="TextBox 40">
               <a:extLst>
                 <a:ext uri="{FF2B5EF4-FFF2-40B4-BE49-F238E27FC236}">
-                  <a16:creationId xmlns:a16="http://schemas.microsoft.com/office/drawing/2014/main" id="{E4C1DDBA-DD5F-47E8-8628-72C22682F91B}"/>
+                  <a16:creationId xmlns:a16="http://schemas.microsoft.com/office/drawing/2014/main" xmlns="" id="{E4C1DDBA-DD5F-47E8-8628-72C22682F91B}"/>
                 </a:ext>
               </a:extLst>
             </p:cNvPr>
@@ -12236,7 +12306,7 @@
             <p:cNvPr id="42" name="TextBox 41">
               <a:extLst>
                 <a:ext uri="{FF2B5EF4-FFF2-40B4-BE49-F238E27FC236}">
-                  <a16:creationId xmlns:a16="http://schemas.microsoft.com/office/drawing/2014/main" id="{035CDE79-FA42-4437-B0BB-58AC0E6ABBAA}"/>
+                  <a16:creationId xmlns:a16="http://schemas.microsoft.com/office/drawing/2014/main" xmlns="" id="{035CDE79-FA42-4437-B0BB-58AC0E6ABBAA}"/>
                 </a:ext>
               </a:extLst>
             </p:cNvPr>
@@ -12292,7 +12362,7 @@
           <p:cNvPr id="43" name="Group 42">
             <a:extLst>
               <a:ext uri="{FF2B5EF4-FFF2-40B4-BE49-F238E27FC236}">
-                <a16:creationId xmlns:a16="http://schemas.microsoft.com/office/drawing/2014/main" id="{C23E6284-66DF-421E-B07C-1C1EA54F031A}"/>
+                <a16:creationId xmlns:a16="http://schemas.microsoft.com/office/drawing/2014/main" xmlns="" id="{C23E6284-66DF-421E-B07C-1C1EA54F031A}"/>
               </a:ext>
             </a:extLst>
           </p:cNvPr>
@@ -12312,7 +12382,7 @@
             <p:cNvPr id="44" name="TextBox 43">
               <a:extLst>
                 <a:ext uri="{FF2B5EF4-FFF2-40B4-BE49-F238E27FC236}">
-                  <a16:creationId xmlns:a16="http://schemas.microsoft.com/office/drawing/2014/main" id="{0711BFFA-6337-4EC4-B374-6555F17D9FAB}"/>
+                  <a16:creationId xmlns:a16="http://schemas.microsoft.com/office/drawing/2014/main" xmlns="" id="{0711BFFA-6337-4EC4-B374-6555F17D9FAB}"/>
                 </a:ext>
               </a:extLst>
             </p:cNvPr>
@@ -12418,7 +12488,7 @@
             <p:cNvPr id="45" name="TextBox 44">
               <a:extLst>
                 <a:ext uri="{FF2B5EF4-FFF2-40B4-BE49-F238E27FC236}">
-                  <a16:creationId xmlns:a16="http://schemas.microsoft.com/office/drawing/2014/main" id="{AD7F53BD-2639-4664-91C8-3EA01B4A9EEE}"/>
+                  <a16:creationId xmlns:a16="http://schemas.microsoft.com/office/drawing/2014/main" xmlns="" id="{AD7F53BD-2639-4664-91C8-3EA01B4A9EEE}"/>
                 </a:ext>
               </a:extLst>
             </p:cNvPr>
@@ -12474,7 +12544,7 @@
           <p:cNvPr id="46" name="Group 45">
             <a:extLst>
               <a:ext uri="{FF2B5EF4-FFF2-40B4-BE49-F238E27FC236}">
-                <a16:creationId xmlns:a16="http://schemas.microsoft.com/office/drawing/2014/main" id="{5A4C90CA-01E5-4893-8FA8-1D806A10CC36}"/>
+                <a16:creationId xmlns:a16="http://schemas.microsoft.com/office/drawing/2014/main" xmlns="" id="{5A4C90CA-01E5-4893-8FA8-1D806A10CC36}"/>
               </a:ext>
             </a:extLst>
           </p:cNvPr>
@@ -12494,7 +12564,7 @@
             <p:cNvPr id="47" name="TextBox 46">
               <a:extLst>
                 <a:ext uri="{FF2B5EF4-FFF2-40B4-BE49-F238E27FC236}">
-                  <a16:creationId xmlns:a16="http://schemas.microsoft.com/office/drawing/2014/main" id="{E0B9E6B5-5803-45A5-A895-4391782B62E2}"/>
+                  <a16:creationId xmlns:a16="http://schemas.microsoft.com/office/drawing/2014/main" xmlns="" id="{E0B9E6B5-5803-45A5-A895-4391782B62E2}"/>
                 </a:ext>
               </a:extLst>
             </p:cNvPr>
@@ -12548,7 +12618,7 @@
             <p:cNvPr id="48" name="TextBox 47">
               <a:extLst>
                 <a:ext uri="{FF2B5EF4-FFF2-40B4-BE49-F238E27FC236}">
-                  <a16:creationId xmlns:a16="http://schemas.microsoft.com/office/drawing/2014/main" id="{25EF6E39-CB1D-480B-A137-CCB45E9F1876}"/>
+                  <a16:creationId xmlns:a16="http://schemas.microsoft.com/office/drawing/2014/main" xmlns="" id="{25EF6E39-CB1D-480B-A137-CCB45E9F1876}"/>
                 </a:ext>
               </a:extLst>
             </p:cNvPr>
@@ -12604,7 +12674,7 @@
           <p:cNvPr id="49" name="Picture 48">
             <a:extLst>
               <a:ext uri="{FF2B5EF4-FFF2-40B4-BE49-F238E27FC236}">
-                <a16:creationId xmlns:a16="http://schemas.microsoft.com/office/drawing/2014/main" id="{3DB88EB2-4959-4384-B606-6EC9735683D6}"/>
+                <a16:creationId xmlns:a16="http://schemas.microsoft.com/office/drawing/2014/main" xmlns="" id="{3DB88EB2-4959-4384-B606-6EC9735683D6}"/>
               </a:ext>
             </a:extLst>
           </p:cNvPr>
@@ -12640,7 +12710,7 @@
           <p:cNvPr id="51" name="Straight Connector 50">
             <a:extLst>
               <a:ext uri="{FF2B5EF4-FFF2-40B4-BE49-F238E27FC236}">
-                <a16:creationId xmlns:a16="http://schemas.microsoft.com/office/drawing/2014/main" id="{29B44FC3-C737-4B92-B1D0-AD232099FBDF}"/>
+                <a16:creationId xmlns:a16="http://schemas.microsoft.com/office/drawing/2014/main" xmlns="" id="{29B44FC3-C737-4B92-B1D0-AD232099FBDF}"/>
               </a:ext>
             </a:extLst>
           </p:cNvPr>
@@ -12681,7 +12751,7 @@
           <p:cNvPr id="52" name="Title 1">
             <a:extLst>
               <a:ext uri="{FF2B5EF4-FFF2-40B4-BE49-F238E27FC236}">
-                <a16:creationId xmlns:a16="http://schemas.microsoft.com/office/drawing/2014/main" id="{2B8CDEBA-452A-4190-964B-37DF9F5C0EF5}"/>
+                <a16:creationId xmlns:a16="http://schemas.microsoft.com/office/drawing/2014/main" xmlns="" id="{2B8CDEBA-452A-4190-964B-37DF9F5C0EF5}"/>
               </a:ext>
             </a:extLst>
           </p:cNvPr>
@@ -12718,7 +12788,7 @@
           <p:cNvPr id="53" name="Rectangle 52">
             <a:extLst>
               <a:ext uri="{FF2B5EF4-FFF2-40B4-BE49-F238E27FC236}">
-                <a16:creationId xmlns:a16="http://schemas.microsoft.com/office/drawing/2014/main" id="{A0FB1C80-C067-49CE-95A9-A233AADF262C}"/>
+                <a16:creationId xmlns:a16="http://schemas.microsoft.com/office/drawing/2014/main" xmlns="" id="{A0FB1C80-C067-49CE-95A9-A233AADF262C}"/>
               </a:ext>
             </a:extLst>
           </p:cNvPr>
@@ -12769,7 +12839,7 @@
           <p:cNvPr id="54" name="Slide Number Placeholder 5">
             <a:extLst>
               <a:ext uri="{FF2B5EF4-FFF2-40B4-BE49-F238E27FC236}">
-                <a16:creationId xmlns:a16="http://schemas.microsoft.com/office/drawing/2014/main" id="{9AD941AF-6002-455E-B6E0-BA52F0663035}"/>
+                <a16:creationId xmlns:a16="http://schemas.microsoft.com/office/drawing/2014/main" xmlns="" id="{9AD941AF-6002-455E-B6E0-BA52F0663035}"/>
               </a:ext>
             </a:extLst>
           </p:cNvPr>
@@ -12814,7 +12884,7 @@
           <p:cNvPr id="21" name="Footer Placeholder 4">
             <a:extLst>
               <a:ext uri="{FF2B5EF4-FFF2-40B4-BE49-F238E27FC236}">
-                <a16:creationId xmlns:a16="http://schemas.microsoft.com/office/drawing/2014/main" id="{D29CC0C7-BC40-4E0F-BCD1-4476DC94C908}"/>
+                <a16:creationId xmlns:a16="http://schemas.microsoft.com/office/drawing/2014/main" xmlns="" id="{D29CC0C7-BC40-4E0F-BCD1-4476DC94C908}"/>
               </a:ext>
             </a:extLst>
           </p:cNvPr>
@@ -12855,7 +12925,7 @@
           <p:cNvPr id="20" name="Group 19">
             <a:extLst>
               <a:ext uri="{FF2B5EF4-FFF2-40B4-BE49-F238E27FC236}">
-                <a16:creationId xmlns:a16="http://schemas.microsoft.com/office/drawing/2014/main" id="{C23E6284-66DF-421E-B07C-1C1EA54F031A}"/>
+                <a16:creationId xmlns:a16="http://schemas.microsoft.com/office/drawing/2014/main" xmlns="" id="{C23E6284-66DF-421E-B07C-1C1EA54F031A}"/>
               </a:ext>
             </a:extLst>
           </p:cNvPr>
@@ -12875,7 +12945,7 @@
             <p:cNvPr id="22" name="TextBox 21">
               <a:extLst>
                 <a:ext uri="{FF2B5EF4-FFF2-40B4-BE49-F238E27FC236}">
-                  <a16:creationId xmlns:a16="http://schemas.microsoft.com/office/drawing/2014/main" id="{0711BFFA-6337-4EC4-B374-6555F17D9FAB}"/>
+                  <a16:creationId xmlns:a16="http://schemas.microsoft.com/office/drawing/2014/main" xmlns="" id="{0711BFFA-6337-4EC4-B374-6555F17D9FAB}"/>
                 </a:ext>
               </a:extLst>
             </p:cNvPr>
@@ -12968,7 +13038,7 @@
             <p:cNvPr id="23" name="TextBox 22">
               <a:extLst>
                 <a:ext uri="{FF2B5EF4-FFF2-40B4-BE49-F238E27FC236}">
-                  <a16:creationId xmlns:a16="http://schemas.microsoft.com/office/drawing/2014/main" id="{AD7F53BD-2639-4664-91C8-3EA01B4A9EEE}"/>
+                  <a16:creationId xmlns:a16="http://schemas.microsoft.com/office/drawing/2014/main" xmlns="" id="{AD7F53BD-2639-4664-91C8-3EA01B4A9EEE}"/>
                 </a:ext>
               </a:extLst>
             </p:cNvPr>
@@ -13328,7 +13398,7 @@
           <p:cNvPr id="49" name="Picture 48">
             <a:extLst>
               <a:ext uri="{FF2B5EF4-FFF2-40B4-BE49-F238E27FC236}">
-                <a16:creationId xmlns:a16="http://schemas.microsoft.com/office/drawing/2014/main" id="{3DB88EB2-4959-4384-B606-6EC9735683D6}"/>
+                <a16:creationId xmlns:a16="http://schemas.microsoft.com/office/drawing/2014/main" xmlns="" id="{3DB88EB2-4959-4384-B606-6EC9735683D6}"/>
               </a:ext>
             </a:extLst>
           </p:cNvPr>
@@ -13364,7 +13434,7 @@
           <p:cNvPr id="51" name="Straight Connector 50">
             <a:extLst>
               <a:ext uri="{FF2B5EF4-FFF2-40B4-BE49-F238E27FC236}">
-                <a16:creationId xmlns:a16="http://schemas.microsoft.com/office/drawing/2014/main" id="{29B44FC3-C737-4B92-B1D0-AD232099FBDF}"/>
+                <a16:creationId xmlns:a16="http://schemas.microsoft.com/office/drawing/2014/main" xmlns="" id="{29B44FC3-C737-4B92-B1D0-AD232099FBDF}"/>
               </a:ext>
             </a:extLst>
           </p:cNvPr>
@@ -13405,7 +13475,7 @@
           <p:cNvPr id="52" name="Title 1">
             <a:extLst>
               <a:ext uri="{FF2B5EF4-FFF2-40B4-BE49-F238E27FC236}">
-                <a16:creationId xmlns:a16="http://schemas.microsoft.com/office/drawing/2014/main" id="{2B8CDEBA-452A-4190-964B-37DF9F5C0EF5}"/>
+                <a16:creationId xmlns:a16="http://schemas.microsoft.com/office/drawing/2014/main" xmlns="" id="{2B8CDEBA-452A-4190-964B-37DF9F5C0EF5}"/>
               </a:ext>
             </a:extLst>
           </p:cNvPr>
@@ -13451,7 +13521,7 @@
           <p:cNvPr id="53" name="Rectangle 52">
             <a:extLst>
               <a:ext uri="{FF2B5EF4-FFF2-40B4-BE49-F238E27FC236}">
-                <a16:creationId xmlns:a16="http://schemas.microsoft.com/office/drawing/2014/main" id="{A0FB1C80-C067-49CE-95A9-A233AADF262C}"/>
+                <a16:creationId xmlns:a16="http://schemas.microsoft.com/office/drawing/2014/main" xmlns="" id="{A0FB1C80-C067-49CE-95A9-A233AADF262C}"/>
               </a:ext>
             </a:extLst>
           </p:cNvPr>
@@ -13502,7 +13572,7 @@
           <p:cNvPr id="54" name="Slide Number Placeholder 5">
             <a:extLst>
               <a:ext uri="{FF2B5EF4-FFF2-40B4-BE49-F238E27FC236}">
-                <a16:creationId xmlns:a16="http://schemas.microsoft.com/office/drawing/2014/main" id="{9AD941AF-6002-455E-B6E0-BA52F0663035}"/>
+                <a16:creationId xmlns:a16="http://schemas.microsoft.com/office/drawing/2014/main" xmlns="" id="{9AD941AF-6002-455E-B6E0-BA52F0663035}"/>
               </a:ext>
             </a:extLst>
           </p:cNvPr>
@@ -13547,7 +13617,7 @@
           <p:cNvPr id="5" name="Rectangle 4">
             <a:extLst>
               <a:ext uri="{FF2B5EF4-FFF2-40B4-BE49-F238E27FC236}">
-                <a16:creationId xmlns:a16="http://schemas.microsoft.com/office/drawing/2014/main" id="{FFEC5CA1-0BFE-477B-AB1B-B28542C07C1A}"/>
+                <a16:creationId xmlns:a16="http://schemas.microsoft.com/office/drawing/2014/main" xmlns="" id="{FFEC5CA1-0BFE-477B-AB1B-B28542C07C1A}"/>
               </a:ext>
             </a:extLst>
           </p:cNvPr>
@@ -13736,7 +13806,7 @@
           <p:cNvPr id="23" name="Footer Placeholder 4">
             <a:extLst>
               <a:ext uri="{FF2B5EF4-FFF2-40B4-BE49-F238E27FC236}">
-                <a16:creationId xmlns:a16="http://schemas.microsoft.com/office/drawing/2014/main" id="{02179F8B-404D-4A7B-97D8-5F2C479ED1C9}"/>
+                <a16:creationId xmlns:a16="http://schemas.microsoft.com/office/drawing/2014/main" xmlns="" id="{02179F8B-404D-4A7B-97D8-5F2C479ED1C9}"/>
               </a:ext>
             </a:extLst>
           </p:cNvPr>
@@ -13870,7 +13940,7 @@
           <p:cNvPr id="15" name="Rectangle 14">
             <a:extLst>
               <a:ext uri="{FF2B5EF4-FFF2-40B4-BE49-F238E27FC236}">
-                <a16:creationId xmlns:a16="http://schemas.microsoft.com/office/drawing/2014/main" id="{FFEC5CA1-0BFE-477B-AB1B-B28542C07C1A}"/>
+                <a16:creationId xmlns:a16="http://schemas.microsoft.com/office/drawing/2014/main" xmlns="" id="{FFEC5CA1-0BFE-477B-AB1B-B28542C07C1A}"/>
               </a:ext>
             </a:extLst>
           </p:cNvPr>
@@ -13969,7 +14039,7 @@
           <p:cNvPr id="16" name="Picture 15">
             <a:extLst>
               <a:ext uri="{FF2B5EF4-FFF2-40B4-BE49-F238E27FC236}">
-                <a16:creationId xmlns:a16="http://schemas.microsoft.com/office/drawing/2014/main" id="{E8B39A46-F601-4FFE-B06C-83B3C7783BC5}"/>
+                <a16:creationId xmlns:a16="http://schemas.microsoft.com/office/drawing/2014/main" xmlns="" id="{E8B39A46-F601-4FFE-B06C-83B3C7783BC5}"/>
               </a:ext>
             </a:extLst>
           </p:cNvPr>
@@ -13977,7 +14047,7 @@
           <p:nvPr/>
         </p:nvPicPr>
         <p:blipFill>
-          <a:blip r:embed="rId4">
+          <a:blip r:embed="rId4" cstate="print">
             <a:extLst>
               <a:ext uri="{28A0092B-C50C-407E-A947-70E740481C1C}">
                 <a14:useLocalDpi xmlns:a14="http://schemas.microsoft.com/office/drawing/2010/main" val="0"/>
@@ -14008,7 +14078,7 @@
           <p:cNvPr id="24" name="Elbow Connector 2">
             <a:extLst>
               <a:ext uri="{FF2B5EF4-FFF2-40B4-BE49-F238E27FC236}">
-                <a16:creationId xmlns:a16="http://schemas.microsoft.com/office/drawing/2014/main" id="{90F62F21-5396-4CFB-948A-A5A7D9F247BE}"/>
+                <a16:creationId xmlns:a16="http://schemas.microsoft.com/office/drawing/2014/main" xmlns="" id="{90F62F21-5396-4CFB-948A-A5A7D9F247BE}"/>
               </a:ext>
             </a:extLst>
           </p:cNvPr>
@@ -14051,7 +14121,7 @@
           <p:cNvPr id="22" name="Oval 21">
             <a:extLst>
               <a:ext uri="{FF2B5EF4-FFF2-40B4-BE49-F238E27FC236}">
-                <a16:creationId xmlns:a16="http://schemas.microsoft.com/office/drawing/2014/main" id="{81645E48-2414-4BC1-AAA3-43D9DBD622F5}"/>
+                <a16:creationId xmlns:a16="http://schemas.microsoft.com/office/drawing/2014/main" xmlns="" id="{81645E48-2414-4BC1-AAA3-43D9DBD622F5}"/>
               </a:ext>
             </a:extLst>
           </p:cNvPr>
@@ -14115,6 +14185,13 @@
       </p:transition>
     </mc:Fallback>
   </mc:AlternateContent>
+  <p:timing>
+    <p:tnLst>
+      <p:par>
+        <p:cTn id="1" dur="indefinite" restart="never" nodeType="tmRoot"/>
+      </p:par>
+    </p:tnLst>
+  </p:timing>
 </p:sld>
 </file>
 
@@ -14140,7 +14217,7 @@
           <p:cNvPr id="37" name="Rectangle 36">
             <a:extLst>
               <a:ext uri="{FF2B5EF4-FFF2-40B4-BE49-F238E27FC236}">
-                <a16:creationId xmlns:a16="http://schemas.microsoft.com/office/drawing/2014/main" id="{1EF0C397-52F4-41E3-85FB-8FDE5E0FB260}"/>
+                <a16:creationId xmlns:a16="http://schemas.microsoft.com/office/drawing/2014/main" xmlns="" id="{1EF0C397-52F4-41E3-85FB-8FDE5E0FB260}"/>
               </a:ext>
             </a:extLst>
           </p:cNvPr>
@@ -14191,7 +14268,7 @@
           <p:cNvPr id="49" name="Picture 48">
             <a:extLst>
               <a:ext uri="{FF2B5EF4-FFF2-40B4-BE49-F238E27FC236}">
-                <a16:creationId xmlns:a16="http://schemas.microsoft.com/office/drawing/2014/main" id="{3DB88EB2-4959-4384-B606-6EC9735683D6}"/>
+                <a16:creationId xmlns:a16="http://schemas.microsoft.com/office/drawing/2014/main" xmlns="" id="{3DB88EB2-4959-4384-B606-6EC9735683D6}"/>
               </a:ext>
             </a:extLst>
           </p:cNvPr>
@@ -14227,7 +14304,7 @@
           <p:cNvPr id="51" name="Straight Connector 50">
             <a:extLst>
               <a:ext uri="{FF2B5EF4-FFF2-40B4-BE49-F238E27FC236}">
-                <a16:creationId xmlns:a16="http://schemas.microsoft.com/office/drawing/2014/main" id="{29B44FC3-C737-4B92-B1D0-AD232099FBDF}"/>
+                <a16:creationId xmlns:a16="http://schemas.microsoft.com/office/drawing/2014/main" xmlns="" id="{29B44FC3-C737-4B92-B1D0-AD232099FBDF}"/>
               </a:ext>
             </a:extLst>
           </p:cNvPr>
@@ -14268,7 +14345,7 @@
           <p:cNvPr id="52" name="Title 1">
             <a:extLst>
               <a:ext uri="{FF2B5EF4-FFF2-40B4-BE49-F238E27FC236}">
-                <a16:creationId xmlns:a16="http://schemas.microsoft.com/office/drawing/2014/main" id="{2B8CDEBA-452A-4190-964B-37DF9F5C0EF5}"/>
+                <a16:creationId xmlns:a16="http://schemas.microsoft.com/office/drawing/2014/main" xmlns="" id="{2B8CDEBA-452A-4190-964B-37DF9F5C0EF5}"/>
               </a:ext>
             </a:extLst>
           </p:cNvPr>
@@ -14314,7 +14391,7 @@
           <p:cNvPr id="54" name="Slide Number Placeholder 5">
             <a:extLst>
               <a:ext uri="{FF2B5EF4-FFF2-40B4-BE49-F238E27FC236}">
-                <a16:creationId xmlns:a16="http://schemas.microsoft.com/office/drawing/2014/main" id="{9AD941AF-6002-455E-B6E0-BA52F0663035}"/>
+                <a16:creationId xmlns:a16="http://schemas.microsoft.com/office/drawing/2014/main" xmlns="" id="{9AD941AF-6002-455E-B6E0-BA52F0663035}"/>
               </a:ext>
             </a:extLst>
           </p:cNvPr>
@@ -14359,7 +14436,7 @@
           <p:cNvPr id="9" name="Footer Placeholder 4">
             <a:extLst>
               <a:ext uri="{FF2B5EF4-FFF2-40B4-BE49-F238E27FC236}">
-                <a16:creationId xmlns:a16="http://schemas.microsoft.com/office/drawing/2014/main" id="{00A1A831-2EC7-4E89-ACF3-30BA80109F5C}"/>
+                <a16:creationId xmlns:a16="http://schemas.microsoft.com/office/drawing/2014/main" xmlns="" id="{00A1A831-2EC7-4E89-ACF3-30BA80109F5C}"/>
               </a:ext>
             </a:extLst>
           </p:cNvPr>
@@ -14456,28 +14533,28 @@
                 <a:gridCol w="1915561">
                   <a:extLst>
                     <a:ext uri="{9D8B030D-6E8A-4147-A177-3AD203B41FA5}">
-                      <a16:colId xmlns:a16="http://schemas.microsoft.com/office/drawing/2014/main" val="20000"/>
+                      <a16:colId xmlns:a16="http://schemas.microsoft.com/office/drawing/2014/main" xmlns="" val="20000"/>
                     </a:ext>
                   </a:extLst>
                 </a:gridCol>
                 <a:gridCol w="1915561">
                   <a:extLst>
                     <a:ext uri="{9D8B030D-6E8A-4147-A177-3AD203B41FA5}">
-                      <a16:colId xmlns:a16="http://schemas.microsoft.com/office/drawing/2014/main" val="20001"/>
+                      <a16:colId xmlns:a16="http://schemas.microsoft.com/office/drawing/2014/main" xmlns="" val="20001"/>
                     </a:ext>
                   </a:extLst>
                 </a:gridCol>
                 <a:gridCol w="1915561">
                   <a:extLst>
                     <a:ext uri="{9D8B030D-6E8A-4147-A177-3AD203B41FA5}">
-                      <a16:colId xmlns:a16="http://schemas.microsoft.com/office/drawing/2014/main" val="20002"/>
+                      <a16:colId xmlns:a16="http://schemas.microsoft.com/office/drawing/2014/main" xmlns="" val="20002"/>
                     </a:ext>
                   </a:extLst>
                 </a:gridCol>
                 <a:gridCol w="1915561">
                   <a:extLst>
                     <a:ext uri="{9D8B030D-6E8A-4147-A177-3AD203B41FA5}">
-                      <a16:colId xmlns:a16="http://schemas.microsoft.com/office/drawing/2014/main" val="20003"/>
+                      <a16:colId xmlns:a16="http://schemas.microsoft.com/office/drawing/2014/main" xmlns="" val="20003"/>
                     </a:ext>
                   </a:extLst>
                 </a:gridCol>
@@ -14589,7 +14666,7 @@
                 </a:tc>
                 <a:extLst>
                   <a:ext uri="{0D108BD9-81ED-4DB2-BD59-A6C34878D82A}">
-                    <a16:rowId xmlns:a16="http://schemas.microsoft.com/office/drawing/2014/main" val="10000"/>
+                    <a16:rowId xmlns:a16="http://schemas.microsoft.com/office/drawing/2014/main" xmlns="" val="10000"/>
                   </a:ext>
                 </a:extLst>
               </a:tr>
@@ -14684,7 +14761,7 @@
                 </a:tc>
                 <a:extLst>
                   <a:ext uri="{0D108BD9-81ED-4DB2-BD59-A6C34878D82A}">
-                    <a16:rowId xmlns:a16="http://schemas.microsoft.com/office/drawing/2014/main" val="10001"/>
+                    <a16:rowId xmlns:a16="http://schemas.microsoft.com/office/drawing/2014/main" xmlns="" val="10001"/>
                   </a:ext>
                 </a:extLst>
               </a:tr>
@@ -14821,7 +14898,7 @@
                 </a:tc>
                 <a:extLst>
                   <a:ext uri="{0D108BD9-81ED-4DB2-BD59-A6C34878D82A}">
-                    <a16:rowId xmlns:a16="http://schemas.microsoft.com/office/drawing/2014/main" val="10002"/>
+                    <a16:rowId xmlns:a16="http://schemas.microsoft.com/office/drawing/2014/main" xmlns="" val="10002"/>
                   </a:ext>
                 </a:extLst>
               </a:tr>
@@ -14932,7 +15009,7 @@
                 </a:tc>
                 <a:extLst>
                   <a:ext uri="{0D108BD9-81ED-4DB2-BD59-A6C34878D82A}">
-                    <a16:rowId xmlns:a16="http://schemas.microsoft.com/office/drawing/2014/main" val="10003"/>
+                    <a16:rowId xmlns:a16="http://schemas.microsoft.com/office/drawing/2014/main" xmlns="" val="10003"/>
                   </a:ext>
                 </a:extLst>
               </a:tr>
@@ -15069,7 +15146,7 @@
                 </a:tc>
                 <a:extLst>
                   <a:ext uri="{0D108BD9-81ED-4DB2-BD59-A6C34878D82A}">
-                    <a16:rowId xmlns:a16="http://schemas.microsoft.com/office/drawing/2014/main" val="10004"/>
+                    <a16:rowId xmlns:a16="http://schemas.microsoft.com/office/drawing/2014/main" xmlns="" val="10004"/>
                   </a:ext>
                 </a:extLst>
               </a:tr>
@@ -15180,7 +15257,7 @@
                 </a:tc>
                 <a:extLst>
                   <a:ext uri="{0D108BD9-81ED-4DB2-BD59-A6C34878D82A}">
-                    <a16:rowId xmlns:a16="http://schemas.microsoft.com/office/drawing/2014/main" val="10005"/>
+                    <a16:rowId xmlns:a16="http://schemas.microsoft.com/office/drawing/2014/main" xmlns="" val="10005"/>
                   </a:ext>
                 </a:extLst>
               </a:tr>
@@ -15291,7 +15368,7 @@
                 </a:tc>
                 <a:extLst>
                   <a:ext uri="{0D108BD9-81ED-4DB2-BD59-A6C34878D82A}">
-                    <a16:rowId xmlns:a16="http://schemas.microsoft.com/office/drawing/2014/main" val="10006"/>
+                    <a16:rowId xmlns:a16="http://schemas.microsoft.com/office/drawing/2014/main" xmlns="" val="10006"/>
                   </a:ext>
                 </a:extLst>
               </a:tr>
@@ -15428,7 +15505,7 @@
                 </a:tc>
                 <a:extLst>
                   <a:ext uri="{0D108BD9-81ED-4DB2-BD59-A6C34878D82A}">
-                    <a16:rowId xmlns:a16="http://schemas.microsoft.com/office/drawing/2014/main" val="10007"/>
+                    <a16:rowId xmlns:a16="http://schemas.microsoft.com/office/drawing/2014/main" xmlns="" val="10007"/>
                   </a:ext>
                 </a:extLst>
               </a:tr>
@@ -15539,7 +15616,7 @@
                 </a:tc>
                 <a:extLst>
                   <a:ext uri="{0D108BD9-81ED-4DB2-BD59-A6C34878D82A}">
-                    <a16:rowId xmlns:a16="http://schemas.microsoft.com/office/drawing/2014/main" val="10008"/>
+                    <a16:rowId xmlns:a16="http://schemas.microsoft.com/office/drawing/2014/main" xmlns="" val="10008"/>
                   </a:ext>
                 </a:extLst>
               </a:tr>
@@ -15650,7 +15727,7 @@
                 </a:tc>
                 <a:extLst>
                   <a:ext uri="{0D108BD9-81ED-4DB2-BD59-A6C34878D82A}">
-                    <a16:rowId xmlns:a16="http://schemas.microsoft.com/office/drawing/2014/main" val="10009"/>
+                    <a16:rowId xmlns:a16="http://schemas.microsoft.com/office/drawing/2014/main" xmlns="" val="10009"/>
                   </a:ext>
                 </a:extLst>
               </a:tr>
@@ -15761,7 +15838,7 @@
                 </a:tc>
                 <a:extLst>
                   <a:ext uri="{0D108BD9-81ED-4DB2-BD59-A6C34878D82A}">
-                    <a16:rowId xmlns:a16="http://schemas.microsoft.com/office/drawing/2014/main" val="10010"/>
+                    <a16:rowId xmlns:a16="http://schemas.microsoft.com/office/drawing/2014/main" xmlns="" val="10010"/>
                   </a:ext>
                 </a:extLst>
               </a:tr>
@@ -15884,7 +15961,7 @@
                 </a:tc>
                 <a:extLst>
                   <a:ext uri="{0D108BD9-81ED-4DB2-BD59-A6C34878D82A}">
-                    <a16:rowId xmlns:a16="http://schemas.microsoft.com/office/drawing/2014/main" val="10011"/>
+                    <a16:rowId xmlns:a16="http://schemas.microsoft.com/office/drawing/2014/main" xmlns="" val="10011"/>
                   </a:ext>
                 </a:extLst>
               </a:tr>
@@ -15914,6 +15991,13 @@
       </p:transition>
     </mc:Fallback>
   </mc:AlternateContent>
+  <p:timing>
+    <p:tnLst>
+      <p:par>
+        <p:cTn id="1" dur="indefinite" restart="never" nodeType="tmRoot"/>
+      </p:par>
+    </p:tnLst>
+  </p:timing>
 </p:sld>
 </file>
 
@@ -15939,7 +16023,7 @@
           <p:cNvPr id="49" name="Picture 48">
             <a:extLst>
               <a:ext uri="{FF2B5EF4-FFF2-40B4-BE49-F238E27FC236}">
-                <a16:creationId xmlns:a16="http://schemas.microsoft.com/office/drawing/2014/main" id="{3DB88EB2-4959-4384-B606-6EC9735683D6}"/>
+                <a16:creationId xmlns:a16="http://schemas.microsoft.com/office/drawing/2014/main" xmlns="" id="{3DB88EB2-4959-4384-B606-6EC9735683D6}"/>
               </a:ext>
             </a:extLst>
           </p:cNvPr>
@@ -15975,7 +16059,7 @@
           <p:cNvPr id="54" name="Slide Number Placeholder 5">
             <a:extLst>
               <a:ext uri="{FF2B5EF4-FFF2-40B4-BE49-F238E27FC236}">
-                <a16:creationId xmlns:a16="http://schemas.microsoft.com/office/drawing/2014/main" id="{9AD941AF-6002-455E-B6E0-BA52F0663035}"/>
+                <a16:creationId xmlns:a16="http://schemas.microsoft.com/office/drawing/2014/main" xmlns="" id="{9AD941AF-6002-455E-B6E0-BA52F0663035}"/>
               </a:ext>
             </a:extLst>
           </p:cNvPr>
@@ -16020,7 +16104,7 @@
           <p:cNvPr id="19" name="Title 1">
             <a:extLst>
               <a:ext uri="{FF2B5EF4-FFF2-40B4-BE49-F238E27FC236}">
-                <a16:creationId xmlns:a16="http://schemas.microsoft.com/office/drawing/2014/main" id="{45DE30A8-2F8A-4013-AF22-27C0A7388B2F}"/>
+                <a16:creationId xmlns:a16="http://schemas.microsoft.com/office/drawing/2014/main" xmlns="" id="{45DE30A8-2F8A-4013-AF22-27C0A7388B2F}"/>
               </a:ext>
             </a:extLst>
           </p:cNvPr>
@@ -16082,7 +16166,7 @@
           <p:cNvPr id="22" name="Straight Connector 21">
             <a:extLst>
               <a:ext uri="{FF2B5EF4-FFF2-40B4-BE49-F238E27FC236}">
-                <a16:creationId xmlns:a16="http://schemas.microsoft.com/office/drawing/2014/main" id="{A3C3DF79-CF3A-4E66-A575-D5A7953A6CEB}"/>
+                <a16:creationId xmlns:a16="http://schemas.microsoft.com/office/drawing/2014/main" xmlns="" id="{A3C3DF79-CF3A-4E66-A575-D5A7953A6CEB}"/>
               </a:ext>
             </a:extLst>
           </p:cNvPr>
@@ -16125,7 +16209,7 @@
           <p:cNvPr id="25" name="Straight Connector 24">
             <a:extLst>
               <a:ext uri="{FF2B5EF4-FFF2-40B4-BE49-F238E27FC236}">
-                <a16:creationId xmlns:a16="http://schemas.microsoft.com/office/drawing/2014/main" id="{1AC35EEC-E10F-4CC7-B5D7-44E576C5CC6C}"/>
+                <a16:creationId xmlns:a16="http://schemas.microsoft.com/office/drawing/2014/main" xmlns="" id="{1AC35EEC-E10F-4CC7-B5D7-44E576C5CC6C}"/>
               </a:ext>
             </a:extLst>
           </p:cNvPr>
@@ -16168,7 +16252,7 @@
           <p:cNvPr id="8" name="Footer Placeholder 4">
             <a:extLst>
               <a:ext uri="{FF2B5EF4-FFF2-40B4-BE49-F238E27FC236}">
-                <a16:creationId xmlns:a16="http://schemas.microsoft.com/office/drawing/2014/main" id="{DFEFA7AD-5B88-47F2-9729-DCA826FF3573}"/>
+                <a16:creationId xmlns:a16="http://schemas.microsoft.com/office/drawing/2014/main" xmlns="" id="{DFEFA7AD-5B88-47F2-9729-DCA826FF3573}"/>
               </a:ext>
             </a:extLst>
           </p:cNvPr>
@@ -16226,6 +16310,13 @@
       </p:transition>
     </mc:Fallback>
   </mc:AlternateContent>
+  <p:timing>
+    <p:tnLst>
+      <p:par>
+        <p:cTn id="1" dur="indefinite" restart="never" nodeType="tmRoot"/>
+      </p:par>
+    </p:tnLst>
+  </p:timing>
 </p:sld>
 </file>
 
@@ -16251,7 +16342,7 @@
           <p:cNvPr id="49" name="Picture 48">
             <a:extLst>
               <a:ext uri="{FF2B5EF4-FFF2-40B4-BE49-F238E27FC236}">
-                <a16:creationId xmlns:a16="http://schemas.microsoft.com/office/drawing/2014/main" id="{3DB88EB2-4959-4384-B606-6EC9735683D6}"/>
+                <a16:creationId xmlns:a16="http://schemas.microsoft.com/office/drawing/2014/main" xmlns="" id="{3DB88EB2-4959-4384-B606-6EC9735683D6}"/>
               </a:ext>
             </a:extLst>
           </p:cNvPr>
@@ -16287,7 +16378,7 @@
           <p:cNvPr id="51" name="Straight Connector 50">
             <a:extLst>
               <a:ext uri="{FF2B5EF4-FFF2-40B4-BE49-F238E27FC236}">
-                <a16:creationId xmlns:a16="http://schemas.microsoft.com/office/drawing/2014/main" id="{29B44FC3-C737-4B92-B1D0-AD232099FBDF}"/>
+                <a16:creationId xmlns:a16="http://schemas.microsoft.com/office/drawing/2014/main" xmlns="" id="{29B44FC3-C737-4B92-B1D0-AD232099FBDF}"/>
               </a:ext>
             </a:extLst>
           </p:cNvPr>
@@ -16328,7 +16419,7 @@
           <p:cNvPr id="52" name="Title 1">
             <a:extLst>
               <a:ext uri="{FF2B5EF4-FFF2-40B4-BE49-F238E27FC236}">
-                <a16:creationId xmlns:a16="http://schemas.microsoft.com/office/drawing/2014/main" id="{2B8CDEBA-452A-4190-964B-37DF9F5C0EF5}"/>
+                <a16:creationId xmlns:a16="http://schemas.microsoft.com/office/drawing/2014/main" xmlns="" id="{2B8CDEBA-452A-4190-964B-37DF9F5C0EF5}"/>
               </a:ext>
             </a:extLst>
           </p:cNvPr>
@@ -16374,7 +16465,7 @@
           <p:cNvPr id="53" name="Rectangle 52">
             <a:extLst>
               <a:ext uri="{FF2B5EF4-FFF2-40B4-BE49-F238E27FC236}">
-                <a16:creationId xmlns:a16="http://schemas.microsoft.com/office/drawing/2014/main" id="{A0FB1C80-C067-49CE-95A9-A233AADF262C}"/>
+                <a16:creationId xmlns:a16="http://schemas.microsoft.com/office/drawing/2014/main" xmlns="" id="{A0FB1C80-C067-49CE-95A9-A233AADF262C}"/>
               </a:ext>
             </a:extLst>
           </p:cNvPr>
@@ -16425,7 +16516,7 @@
           <p:cNvPr id="54" name="Slide Number Placeholder 5">
             <a:extLst>
               <a:ext uri="{FF2B5EF4-FFF2-40B4-BE49-F238E27FC236}">
-                <a16:creationId xmlns:a16="http://schemas.microsoft.com/office/drawing/2014/main" id="{9AD941AF-6002-455E-B6E0-BA52F0663035}"/>
+                <a16:creationId xmlns:a16="http://schemas.microsoft.com/office/drawing/2014/main" xmlns="" id="{9AD941AF-6002-455E-B6E0-BA52F0663035}"/>
               </a:ext>
             </a:extLst>
           </p:cNvPr>
@@ -16470,7 +16561,7 @@
           <p:cNvPr id="2" name="Rectangle 1">
             <a:extLst>
               <a:ext uri="{FF2B5EF4-FFF2-40B4-BE49-F238E27FC236}">
-                <a16:creationId xmlns:a16="http://schemas.microsoft.com/office/drawing/2014/main" id="{14A90B70-7F26-462A-B0D6-991DF4A67FD9}"/>
+                <a16:creationId xmlns:a16="http://schemas.microsoft.com/office/drawing/2014/main" xmlns="" id="{14A90B70-7F26-462A-B0D6-991DF4A67FD9}"/>
               </a:ext>
             </a:extLst>
           </p:cNvPr>
@@ -16618,7 +16709,7 @@
           <p:cNvPr id="4" name="Table 3">
             <a:extLst>
               <a:ext uri="{FF2B5EF4-FFF2-40B4-BE49-F238E27FC236}">
-                <a16:creationId xmlns:a16="http://schemas.microsoft.com/office/drawing/2014/main" id="{D4CFE748-C842-4C87-8347-A12276CB9ED4}"/>
+                <a16:creationId xmlns:a16="http://schemas.microsoft.com/office/drawing/2014/main" xmlns="" id="{D4CFE748-C842-4C87-8347-A12276CB9ED4}"/>
               </a:ext>
             </a:extLst>
           </p:cNvPr>
@@ -16647,14 +16738,14 @@
                 <a:gridCol w="2864919">
                   <a:extLst>
                     <a:ext uri="{9D8B030D-6E8A-4147-A177-3AD203B41FA5}">
-                      <a16:colId xmlns:a16="http://schemas.microsoft.com/office/drawing/2014/main" val="389394931"/>
+                      <a16:colId xmlns:a16="http://schemas.microsoft.com/office/drawing/2014/main" xmlns="" val="389394931"/>
                     </a:ext>
                   </a:extLst>
                 </a:gridCol>
                 <a:gridCol w="2515777">
                   <a:extLst>
                     <a:ext uri="{9D8B030D-6E8A-4147-A177-3AD203B41FA5}">
-                      <a16:colId xmlns:a16="http://schemas.microsoft.com/office/drawing/2014/main" val="2464094964"/>
+                      <a16:colId xmlns:a16="http://schemas.microsoft.com/office/drawing/2014/main" xmlns="" val="2464094964"/>
                     </a:ext>
                   </a:extLst>
                 </a:gridCol>
@@ -16794,7 +16885,7 @@
                 </a:tc>
                 <a:extLst>
                   <a:ext uri="{0D108BD9-81ED-4DB2-BD59-A6C34878D82A}">
-                    <a16:rowId xmlns:a16="http://schemas.microsoft.com/office/drawing/2014/main" val="724768073"/>
+                    <a16:rowId xmlns:a16="http://schemas.microsoft.com/office/drawing/2014/main" xmlns="" val="724768073"/>
                   </a:ext>
                 </a:extLst>
               </a:tr>
@@ -16936,7 +17027,7 @@
                 </a:tc>
                 <a:extLst>
                   <a:ext uri="{0D108BD9-81ED-4DB2-BD59-A6C34878D82A}">
-                    <a16:rowId xmlns:a16="http://schemas.microsoft.com/office/drawing/2014/main" val="4056571397"/>
+                    <a16:rowId xmlns:a16="http://schemas.microsoft.com/office/drawing/2014/main" xmlns="" val="4056571397"/>
                   </a:ext>
                 </a:extLst>
               </a:tr>
@@ -17078,7 +17169,7 @@
                 </a:tc>
                 <a:extLst>
                   <a:ext uri="{0D108BD9-81ED-4DB2-BD59-A6C34878D82A}">
-                    <a16:rowId xmlns:a16="http://schemas.microsoft.com/office/drawing/2014/main" val="1533669887"/>
+                    <a16:rowId xmlns:a16="http://schemas.microsoft.com/office/drawing/2014/main" xmlns="" val="1533669887"/>
                   </a:ext>
                 </a:extLst>
               </a:tr>
@@ -17217,7 +17308,7 @@
                 </a:tc>
                 <a:extLst>
                   <a:ext uri="{0D108BD9-81ED-4DB2-BD59-A6C34878D82A}">
-                    <a16:rowId xmlns:a16="http://schemas.microsoft.com/office/drawing/2014/main" val="961055817"/>
+                    <a16:rowId xmlns:a16="http://schemas.microsoft.com/office/drawing/2014/main" xmlns="" val="961055817"/>
                   </a:ext>
                 </a:extLst>
               </a:tr>
@@ -17371,7 +17462,7 @@
                 </a:tc>
                 <a:extLst>
                   <a:ext uri="{0D108BD9-81ED-4DB2-BD59-A6C34878D82A}">
-                    <a16:rowId xmlns:a16="http://schemas.microsoft.com/office/drawing/2014/main" val="1791182790"/>
+                    <a16:rowId xmlns:a16="http://schemas.microsoft.com/office/drawing/2014/main" xmlns="" val="1791182790"/>
                   </a:ext>
                 </a:extLst>
               </a:tr>
@@ -17516,7 +17607,7 @@
                 </a:tc>
                 <a:extLst>
                   <a:ext uri="{0D108BD9-81ED-4DB2-BD59-A6C34878D82A}">
-                    <a16:rowId xmlns:a16="http://schemas.microsoft.com/office/drawing/2014/main" val="1004552589"/>
+                    <a16:rowId xmlns:a16="http://schemas.microsoft.com/office/drawing/2014/main" xmlns="" val="1004552589"/>
                   </a:ext>
                 </a:extLst>
               </a:tr>
@@ -17664,7 +17755,7 @@
                 </a:tc>
                 <a:extLst>
                   <a:ext uri="{0D108BD9-81ED-4DB2-BD59-A6C34878D82A}">
-                    <a16:rowId xmlns:a16="http://schemas.microsoft.com/office/drawing/2014/main" val="10006"/>
+                    <a16:rowId xmlns:a16="http://schemas.microsoft.com/office/drawing/2014/main" xmlns="" val="10006"/>
                   </a:ext>
                 </a:extLst>
               </a:tr>
@@ -17797,7 +17888,7 @@
                 </a:tc>
                 <a:extLst>
                   <a:ext uri="{0D108BD9-81ED-4DB2-BD59-A6C34878D82A}">
-                    <a16:rowId xmlns:a16="http://schemas.microsoft.com/office/drawing/2014/main" val="10007"/>
+                    <a16:rowId xmlns:a16="http://schemas.microsoft.com/office/drawing/2014/main" xmlns="" val="10007"/>
                   </a:ext>
                 </a:extLst>
               </a:tr>
@@ -17945,7 +18036,7 @@
                 </a:tc>
                 <a:extLst>
                   <a:ext uri="{0D108BD9-81ED-4DB2-BD59-A6C34878D82A}">
-                    <a16:rowId xmlns:a16="http://schemas.microsoft.com/office/drawing/2014/main" val="10008"/>
+                    <a16:rowId xmlns:a16="http://schemas.microsoft.com/office/drawing/2014/main" xmlns="" val="10008"/>
                   </a:ext>
                 </a:extLst>
               </a:tr>
@@ -17958,7 +18049,7 @@
           <p:cNvPr id="5" name="Rectangle 4">
             <a:extLst>
               <a:ext uri="{FF2B5EF4-FFF2-40B4-BE49-F238E27FC236}">
-                <a16:creationId xmlns:a16="http://schemas.microsoft.com/office/drawing/2014/main" id="{AD8B247E-6BFA-4BD6-B602-45D108194651}"/>
+                <a16:creationId xmlns:a16="http://schemas.microsoft.com/office/drawing/2014/main" xmlns="" id="{AD8B247E-6BFA-4BD6-B602-45D108194651}"/>
               </a:ext>
             </a:extLst>
           </p:cNvPr>
@@ -18048,7 +18139,7 @@
           <p:cNvPr id="11" name="Footer Placeholder 4">
             <a:extLst>
               <a:ext uri="{FF2B5EF4-FFF2-40B4-BE49-F238E27FC236}">
-                <a16:creationId xmlns:a16="http://schemas.microsoft.com/office/drawing/2014/main" id="{F38A5E6C-EA26-4D2D-AD11-4A6375558785}"/>
+                <a16:creationId xmlns:a16="http://schemas.microsoft.com/office/drawing/2014/main" xmlns="" id="{F38A5E6C-EA26-4D2D-AD11-4A6375558785}"/>
               </a:ext>
             </a:extLst>
           </p:cNvPr>
@@ -18106,6 +18197,13 @@
       </p:transition>
     </mc:Fallback>
   </mc:AlternateContent>
+  <p:timing>
+    <p:tnLst>
+      <p:par>
+        <p:cTn id="1" dur="indefinite" restart="never" nodeType="tmRoot"/>
+      </p:par>
+    </p:tnLst>
+  </p:timing>
 </p:sld>
 </file>
 
@@ -18131,7 +18229,7 @@
           <p:cNvPr id="49" name="Picture 48">
             <a:extLst>
               <a:ext uri="{FF2B5EF4-FFF2-40B4-BE49-F238E27FC236}">
-                <a16:creationId xmlns:a16="http://schemas.microsoft.com/office/drawing/2014/main" id="{3DB88EB2-4959-4384-B606-6EC9735683D6}"/>
+                <a16:creationId xmlns:a16="http://schemas.microsoft.com/office/drawing/2014/main" xmlns="" id="{3DB88EB2-4959-4384-B606-6EC9735683D6}"/>
               </a:ext>
             </a:extLst>
           </p:cNvPr>
@@ -18167,7 +18265,7 @@
           <p:cNvPr id="51" name="Straight Connector 50">
             <a:extLst>
               <a:ext uri="{FF2B5EF4-FFF2-40B4-BE49-F238E27FC236}">
-                <a16:creationId xmlns:a16="http://schemas.microsoft.com/office/drawing/2014/main" id="{29B44FC3-C737-4B92-B1D0-AD232099FBDF}"/>
+                <a16:creationId xmlns:a16="http://schemas.microsoft.com/office/drawing/2014/main" xmlns="" id="{29B44FC3-C737-4B92-B1D0-AD232099FBDF}"/>
               </a:ext>
             </a:extLst>
           </p:cNvPr>
@@ -18208,7 +18306,7 @@
           <p:cNvPr id="52" name="Title 1">
             <a:extLst>
               <a:ext uri="{FF2B5EF4-FFF2-40B4-BE49-F238E27FC236}">
-                <a16:creationId xmlns:a16="http://schemas.microsoft.com/office/drawing/2014/main" id="{2B8CDEBA-452A-4190-964B-37DF9F5C0EF5}"/>
+                <a16:creationId xmlns:a16="http://schemas.microsoft.com/office/drawing/2014/main" xmlns="" id="{2B8CDEBA-452A-4190-964B-37DF9F5C0EF5}"/>
               </a:ext>
             </a:extLst>
           </p:cNvPr>
@@ -18267,7 +18365,7 @@
           <p:cNvPr id="53" name="Rectangle 52">
             <a:extLst>
               <a:ext uri="{FF2B5EF4-FFF2-40B4-BE49-F238E27FC236}">
-                <a16:creationId xmlns:a16="http://schemas.microsoft.com/office/drawing/2014/main" id="{A0FB1C80-C067-49CE-95A9-A233AADF262C}"/>
+                <a16:creationId xmlns:a16="http://schemas.microsoft.com/office/drawing/2014/main" xmlns="" id="{A0FB1C80-C067-49CE-95A9-A233AADF262C}"/>
               </a:ext>
             </a:extLst>
           </p:cNvPr>
@@ -18318,7 +18416,7 @@
           <p:cNvPr id="54" name="Slide Number Placeholder 5">
             <a:extLst>
               <a:ext uri="{FF2B5EF4-FFF2-40B4-BE49-F238E27FC236}">
-                <a16:creationId xmlns:a16="http://schemas.microsoft.com/office/drawing/2014/main" id="{9AD941AF-6002-455E-B6E0-BA52F0663035}"/>
+                <a16:creationId xmlns:a16="http://schemas.microsoft.com/office/drawing/2014/main" xmlns="" id="{9AD941AF-6002-455E-B6E0-BA52F0663035}"/>
               </a:ext>
             </a:extLst>
           </p:cNvPr>
@@ -18363,7 +18461,7 @@
           <p:cNvPr id="9" name="Rectangle 8">
             <a:extLst>
               <a:ext uri="{FF2B5EF4-FFF2-40B4-BE49-F238E27FC236}">
-                <a16:creationId xmlns:a16="http://schemas.microsoft.com/office/drawing/2014/main" id="{B2BE42D7-6087-498E-A91E-92DE2E58FF4F}"/>
+                <a16:creationId xmlns:a16="http://schemas.microsoft.com/office/drawing/2014/main" xmlns="" id="{B2BE42D7-6087-498E-A91E-92DE2E58FF4F}"/>
               </a:ext>
             </a:extLst>
           </p:cNvPr>
@@ -18644,7 +18742,7 @@
           <p:cNvPr id="10" name="Footer Placeholder 4">
             <a:extLst>
               <a:ext uri="{FF2B5EF4-FFF2-40B4-BE49-F238E27FC236}">
-                <a16:creationId xmlns:a16="http://schemas.microsoft.com/office/drawing/2014/main" id="{95B05AA7-639C-4C01-A0DA-8F1AA125095E}"/>
+                <a16:creationId xmlns:a16="http://schemas.microsoft.com/office/drawing/2014/main" xmlns="" id="{95B05AA7-639C-4C01-A0DA-8F1AA125095E}"/>
               </a:ext>
             </a:extLst>
           </p:cNvPr>
@@ -18702,6 +18800,13 @@
       </p:transition>
     </mc:Fallback>
   </mc:AlternateContent>
+  <p:timing>
+    <p:tnLst>
+      <p:par>
+        <p:cTn id="1" dur="indefinite" restart="never" nodeType="tmRoot"/>
+      </p:par>
+    </p:tnLst>
+  </p:timing>
 </p:sld>
 </file>
 
@@ -18727,7 +18832,7 @@
           <p:cNvPr id="49" name="Picture 48">
             <a:extLst>
               <a:ext uri="{FF2B5EF4-FFF2-40B4-BE49-F238E27FC236}">
-                <a16:creationId xmlns:a16="http://schemas.microsoft.com/office/drawing/2014/main" id="{3DB88EB2-4959-4384-B606-6EC9735683D6}"/>
+                <a16:creationId xmlns:a16="http://schemas.microsoft.com/office/drawing/2014/main" xmlns="" id="{3DB88EB2-4959-4384-B606-6EC9735683D6}"/>
               </a:ext>
             </a:extLst>
           </p:cNvPr>
@@ -18763,7 +18868,7 @@
           <p:cNvPr id="51" name="Straight Connector 50">
             <a:extLst>
               <a:ext uri="{FF2B5EF4-FFF2-40B4-BE49-F238E27FC236}">
-                <a16:creationId xmlns:a16="http://schemas.microsoft.com/office/drawing/2014/main" id="{29B44FC3-C737-4B92-B1D0-AD232099FBDF}"/>
+                <a16:creationId xmlns:a16="http://schemas.microsoft.com/office/drawing/2014/main" xmlns="" id="{29B44FC3-C737-4B92-B1D0-AD232099FBDF}"/>
               </a:ext>
             </a:extLst>
           </p:cNvPr>
@@ -18804,7 +18909,7 @@
           <p:cNvPr id="52" name="Title 1">
             <a:extLst>
               <a:ext uri="{FF2B5EF4-FFF2-40B4-BE49-F238E27FC236}">
-                <a16:creationId xmlns:a16="http://schemas.microsoft.com/office/drawing/2014/main" id="{2B8CDEBA-452A-4190-964B-37DF9F5C0EF5}"/>
+                <a16:creationId xmlns:a16="http://schemas.microsoft.com/office/drawing/2014/main" xmlns="" id="{2B8CDEBA-452A-4190-964B-37DF9F5C0EF5}"/>
               </a:ext>
             </a:extLst>
           </p:cNvPr>
@@ -18863,7 +18968,7 @@
           <p:cNvPr id="53" name="Rectangle 52">
             <a:extLst>
               <a:ext uri="{FF2B5EF4-FFF2-40B4-BE49-F238E27FC236}">
-                <a16:creationId xmlns:a16="http://schemas.microsoft.com/office/drawing/2014/main" id="{A0FB1C80-C067-49CE-95A9-A233AADF262C}"/>
+                <a16:creationId xmlns:a16="http://schemas.microsoft.com/office/drawing/2014/main" xmlns="" id="{A0FB1C80-C067-49CE-95A9-A233AADF262C}"/>
               </a:ext>
             </a:extLst>
           </p:cNvPr>
@@ -18914,7 +19019,7 @@
           <p:cNvPr id="54" name="Slide Number Placeholder 5">
             <a:extLst>
               <a:ext uri="{FF2B5EF4-FFF2-40B4-BE49-F238E27FC236}">
-                <a16:creationId xmlns:a16="http://schemas.microsoft.com/office/drawing/2014/main" id="{9AD941AF-6002-455E-B6E0-BA52F0663035}"/>
+                <a16:creationId xmlns:a16="http://schemas.microsoft.com/office/drawing/2014/main" xmlns="" id="{9AD941AF-6002-455E-B6E0-BA52F0663035}"/>
               </a:ext>
             </a:extLst>
           </p:cNvPr>
@@ -18959,7 +19064,7 @@
           <p:cNvPr id="9" name="Footer Placeholder 4">
             <a:extLst>
               <a:ext uri="{FF2B5EF4-FFF2-40B4-BE49-F238E27FC236}">
-                <a16:creationId xmlns:a16="http://schemas.microsoft.com/office/drawing/2014/main" id="{98ED1CA2-EC40-45AC-86C1-5BBD6F65EA11}"/>
+                <a16:creationId xmlns:a16="http://schemas.microsoft.com/office/drawing/2014/main" xmlns="" id="{98ED1CA2-EC40-45AC-86C1-5BBD6F65EA11}"/>
               </a:ext>
             </a:extLst>
           </p:cNvPr>
@@ -19023,35 +19128,35 @@
                 <a:gridCol w="2235928">
                   <a:extLst>
                     <a:ext uri="{9D8B030D-6E8A-4147-A177-3AD203B41FA5}">
-                      <a16:colId xmlns:a16="http://schemas.microsoft.com/office/drawing/2014/main" val="20000"/>
+                      <a16:colId xmlns:a16="http://schemas.microsoft.com/office/drawing/2014/main" xmlns="" val="20000"/>
                     </a:ext>
                   </a:extLst>
                 </a:gridCol>
                 <a:gridCol w="2561237">
                   <a:extLst>
                     <a:ext uri="{9D8B030D-6E8A-4147-A177-3AD203B41FA5}">
-                      <a16:colId xmlns:a16="http://schemas.microsoft.com/office/drawing/2014/main" val="20001"/>
+                      <a16:colId xmlns:a16="http://schemas.microsoft.com/office/drawing/2014/main" xmlns="" val="20001"/>
                     </a:ext>
                   </a:extLst>
                 </a:gridCol>
                 <a:gridCol w="2169492">
                   <a:extLst>
                     <a:ext uri="{9D8B030D-6E8A-4147-A177-3AD203B41FA5}">
-                      <a16:colId xmlns:a16="http://schemas.microsoft.com/office/drawing/2014/main" val="20002"/>
+                      <a16:colId xmlns:a16="http://schemas.microsoft.com/office/drawing/2014/main" xmlns="" val="20002"/>
                     </a:ext>
                   </a:extLst>
                 </a:gridCol>
                 <a:gridCol w="2245092">
                   <a:extLst>
                     <a:ext uri="{9D8B030D-6E8A-4147-A177-3AD203B41FA5}">
-                      <a16:colId xmlns:a16="http://schemas.microsoft.com/office/drawing/2014/main" val="20003"/>
+                      <a16:colId xmlns:a16="http://schemas.microsoft.com/office/drawing/2014/main" xmlns="" val="20003"/>
                     </a:ext>
                   </a:extLst>
                 </a:gridCol>
                 <a:gridCol w="2242801">
                   <a:extLst>
                     <a:ext uri="{9D8B030D-6E8A-4147-A177-3AD203B41FA5}">
-                      <a16:colId xmlns:a16="http://schemas.microsoft.com/office/drawing/2014/main" val="20004"/>
+                      <a16:colId xmlns:a16="http://schemas.microsoft.com/office/drawing/2014/main" xmlns="" val="20004"/>
                     </a:ext>
                   </a:extLst>
                 </a:gridCol>
@@ -19192,7 +19297,7 @@
                 </a:tc>
                 <a:extLst>
                   <a:ext uri="{0D108BD9-81ED-4DB2-BD59-A6C34878D82A}">
-                    <a16:rowId xmlns:a16="http://schemas.microsoft.com/office/drawing/2014/main" val="10000"/>
+                    <a16:rowId xmlns:a16="http://schemas.microsoft.com/office/drawing/2014/main" xmlns="" val="10000"/>
                   </a:ext>
                 </a:extLst>
               </a:tr>
@@ -19329,7 +19434,7 @@
                 </a:tc>
                 <a:extLst>
                   <a:ext uri="{0D108BD9-81ED-4DB2-BD59-A6C34878D82A}">
-                    <a16:rowId xmlns:a16="http://schemas.microsoft.com/office/drawing/2014/main" val="10001"/>
+                    <a16:rowId xmlns:a16="http://schemas.microsoft.com/office/drawing/2014/main" xmlns="" val="10001"/>
                   </a:ext>
                 </a:extLst>
               </a:tr>
@@ -19466,7 +19571,7 @@
                 </a:tc>
                 <a:extLst>
                   <a:ext uri="{0D108BD9-81ED-4DB2-BD59-A6C34878D82A}">
-                    <a16:rowId xmlns:a16="http://schemas.microsoft.com/office/drawing/2014/main" val="10002"/>
+                    <a16:rowId xmlns:a16="http://schemas.microsoft.com/office/drawing/2014/main" xmlns="" val="10002"/>
                   </a:ext>
                 </a:extLst>
               </a:tr>
@@ -19656,7 +19761,7 @@
                 </a:tc>
                 <a:extLst>
                   <a:ext uri="{0D108BD9-81ED-4DB2-BD59-A6C34878D82A}">
-                    <a16:rowId xmlns:a16="http://schemas.microsoft.com/office/drawing/2014/main" val="10003"/>
+                    <a16:rowId xmlns:a16="http://schemas.microsoft.com/office/drawing/2014/main" xmlns="" val="10003"/>
                   </a:ext>
                 </a:extLst>
               </a:tr>
@@ -19793,7 +19898,7 @@
                 </a:tc>
                 <a:extLst>
                   <a:ext uri="{0D108BD9-81ED-4DB2-BD59-A6C34878D82A}">
-                    <a16:rowId xmlns:a16="http://schemas.microsoft.com/office/drawing/2014/main" val="10004"/>
+                    <a16:rowId xmlns:a16="http://schemas.microsoft.com/office/drawing/2014/main" xmlns="" val="10004"/>
                   </a:ext>
                 </a:extLst>
               </a:tr>
@@ -19806,7 +19911,7 @@
           <p:cNvPr id="11" name="Rectangle 10">
             <a:extLst>
               <a:ext uri="{FF2B5EF4-FFF2-40B4-BE49-F238E27FC236}">
-                <a16:creationId xmlns:a16="http://schemas.microsoft.com/office/drawing/2014/main" id="{AD8B247E-6BFA-4BD6-B602-45D108194651}"/>
+                <a16:creationId xmlns:a16="http://schemas.microsoft.com/office/drawing/2014/main" xmlns="" id="{AD8B247E-6BFA-4BD6-B602-45D108194651}"/>
               </a:ext>
             </a:extLst>
           </p:cNvPr>
@@ -20004,6 +20109,13 @@
       </p:transition>
     </mc:Fallback>
   </mc:AlternateContent>
+  <p:timing>
+    <p:tnLst>
+      <p:par>
+        <p:cTn id="1" dur="indefinite" restart="never" nodeType="tmRoot"/>
+      </p:par>
+    </p:tnLst>
+  </p:timing>
 </p:sld>
 </file>
 
@@ -20029,7 +20141,7 @@
           <p:cNvPr id="49" name="Picture 48">
             <a:extLst>
               <a:ext uri="{FF2B5EF4-FFF2-40B4-BE49-F238E27FC236}">
-                <a16:creationId xmlns:a16="http://schemas.microsoft.com/office/drawing/2014/main" id="{3DB88EB2-4959-4384-B606-6EC9735683D6}"/>
+                <a16:creationId xmlns:a16="http://schemas.microsoft.com/office/drawing/2014/main" xmlns="" id="{3DB88EB2-4959-4384-B606-6EC9735683D6}"/>
               </a:ext>
             </a:extLst>
           </p:cNvPr>
@@ -20065,7 +20177,7 @@
           <p:cNvPr id="51" name="Straight Connector 50">
             <a:extLst>
               <a:ext uri="{FF2B5EF4-FFF2-40B4-BE49-F238E27FC236}">
-                <a16:creationId xmlns:a16="http://schemas.microsoft.com/office/drawing/2014/main" id="{29B44FC3-C737-4B92-B1D0-AD232099FBDF}"/>
+                <a16:creationId xmlns:a16="http://schemas.microsoft.com/office/drawing/2014/main" xmlns="" id="{29B44FC3-C737-4B92-B1D0-AD232099FBDF}"/>
               </a:ext>
             </a:extLst>
           </p:cNvPr>
@@ -20106,7 +20218,7 @@
           <p:cNvPr id="52" name="Title 1">
             <a:extLst>
               <a:ext uri="{FF2B5EF4-FFF2-40B4-BE49-F238E27FC236}">
-                <a16:creationId xmlns:a16="http://schemas.microsoft.com/office/drawing/2014/main" id="{2B8CDEBA-452A-4190-964B-37DF9F5C0EF5}"/>
+                <a16:creationId xmlns:a16="http://schemas.microsoft.com/office/drawing/2014/main" xmlns="" id="{2B8CDEBA-452A-4190-964B-37DF9F5C0EF5}"/>
               </a:ext>
             </a:extLst>
           </p:cNvPr>
@@ -20165,7 +20277,7 @@
           <p:cNvPr id="53" name="Rectangle 52">
             <a:extLst>
               <a:ext uri="{FF2B5EF4-FFF2-40B4-BE49-F238E27FC236}">
-                <a16:creationId xmlns:a16="http://schemas.microsoft.com/office/drawing/2014/main" id="{A0FB1C80-C067-49CE-95A9-A233AADF262C}"/>
+                <a16:creationId xmlns:a16="http://schemas.microsoft.com/office/drawing/2014/main" xmlns="" id="{A0FB1C80-C067-49CE-95A9-A233AADF262C}"/>
               </a:ext>
             </a:extLst>
           </p:cNvPr>
@@ -20216,7 +20328,7 @@
           <p:cNvPr id="54" name="Slide Number Placeholder 5">
             <a:extLst>
               <a:ext uri="{FF2B5EF4-FFF2-40B4-BE49-F238E27FC236}">
-                <a16:creationId xmlns:a16="http://schemas.microsoft.com/office/drawing/2014/main" id="{9AD941AF-6002-455E-B6E0-BA52F0663035}"/>
+                <a16:creationId xmlns:a16="http://schemas.microsoft.com/office/drawing/2014/main" xmlns="" id="{9AD941AF-6002-455E-B6E0-BA52F0663035}"/>
               </a:ext>
             </a:extLst>
           </p:cNvPr>
@@ -20261,7 +20373,7 @@
           <p:cNvPr id="9" name="Footer Placeholder 4">
             <a:extLst>
               <a:ext uri="{FF2B5EF4-FFF2-40B4-BE49-F238E27FC236}">
-                <a16:creationId xmlns:a16="http://schemas.microsoft.com/office/drawing/2014/main" id="{7EEA65CF-5D9C-44CF-BDC7-DCD4017D60FF}"/>
+                <a16:creationId xmlns:a16="http://schemas.microsoft.com/office/drawing/2014/main" xmlns="" id="{7EEA65CF-5D9C-44CF-BDC7-DCD4017D60FF}"/>
               </a:ext>
             </a:extLst>
           </p:cNvPr>
@@ -20325,28 +20437,28 @@
                 <a:gridCol w="2681167">
                   <a:extLst>
                     <a:ext uri="{9D8B030D-6E8A-4147-A177-3AD203B41FA5}">
-                      <a16:colId xmlns:a16="http://schemas.microsoft.com/office/drawing/2014/main" val="20000"/>
+                      <a16:colId xmlns:a16="http://schemas.microsoft.com/office/drawing/2014/main" xmlns="" val="20000"/>
                     </a:ext>
                   </a:extLst>
                 </a:gridCol>
                 <a:gridCol w="2198384">
                   <a:extLst>
                     <a:ext uri="{9D8B030D-6E8A-4147-A177-3AD203B41FA5}">
-                      <a16:colId xmlns:a16="http://schemas.microsoft.com/office/drawing/2014/main" val="20001"/>
+                      <a16:colId xmlns:a16="http://schemas.microsoft.com/office/drawing/2014/main" xmlns="" val="20001"/>
                     </a:ext>
                   </a:extLst>
                 </a:gridCol>
                 <a:gridCol w="2200110">
                   <a:extLst>
                     <a:ext uri="{9D8B030D-6E8A-4147-A177-3AD203B41FA5}">
-                      <a16:colId xmlns:a16="http://schemas.microsoft.com/office/drawing/2014/main" val="20002"/>
+                      <a16:colId xmlns:a16="http://schemas.microsoft.com/office/drawing/2014/main" xmlns="" val="20002"/>
                     </a:ext>
                   </a:extLst>
                 </a:gridCol>
                 <a:gridCol w="2200110">
                   <a:extLst>
                     <a:ext uri="{9D8B030D-6E8A-4147-A177-3AD203B41FA5}">
-                      <a16:colId xmlns:a16="http://schemas.microsoft.com/office/drawing/2014/main" val="20003"/>
+                      <a16:colId xmlns:a16="http://schemas.microsoft.com/office/drawing/2014/main" xmlns="" val="20003"/>
                     </a:ext>
                   </a:extLst>
                 </a:gridCol>
@@ -20494,7 +20606,7 @@
                 </a:tc>
                 <a:extLst>
                   <a:ext uri="{0D108BD9-81ED-4DB2-BD59-A6C34878D82A}">
-                    <a16:rowId xmlns:a16="http://schemas.microsoft.com/office/drawing/2014/main" val="10000"/>
+                    <a16:rowId xmlns:a16="http://schemas.microsoft.com/office/drawing/2014/main" xmlns="" val="10000"/>
                   </a:ext>
                 </a:extLst>
               </a:tr>
@@ -20605,7 +20717,7 @@
                 </a:tc>
                 <a:extLst>
                   <a:ext uri="{0D108BD9-81ED-4DB2-BD59-A6C34878D82A}">
-                    <a16:rowId xmlns:a16="http://schemas.microsoft.com/office/drawing/2014/main" val="10001"/>
+                    <a16:rowId xmlns:a16="http://schemas.microsoft.com/office/drawing/2014/main" xmlns="" val="10001"/>
                   </a:ext>
                 </a:extLst>
               </a:tr>
@@ -20716,7 +20828,7 @@
                 </a:tc>
                 <a:extLst>
                   <a:ext uri="{0D108BD9-81ED-4DB2-BD59-A6C34878D82A}">
-                    <a16:rowId xmlns:a16="http://schemas.microsoft.com/office/drawing/2014/main" val="10002"/>
+                    <a16:rowId xmlns:a16="http://schemas.microsoft.com/office/drawing/2014/main" xmlns="" val="10002"/>
                   </a:ext>
                 </a:extLst>
               </a:tr>
@@ -20827,7 +20939,7 @@
                 </a:tc>
                 <a:extLst>
                   <a:ext uri="{0D108BD9-81ED-4DB2-BD59-A6C34878D82A}">
-                    <a16:rowId xmlns:a16="http://schemas.microsoft.com/office/drawing/2014/main" val="10003"/>
+                    <a16:rowId xmlns:a16="http://schemas.microsoft.com/office/drawing/2014/main" xmlns="" val="10003"/>
                   </a:ext>
                 </a:extLst>
               </a:tr>
@@ -20938,7 +21050,7 @@
                 </a:tc>
                 <a:extLst>
                   <a:ext uri="{0D108BD9-81ED-4DB2-BD59-A6C34878D82A}">
-                    <a16:rowId xmlns:a16="http://schemas.microsoft.com/office/drawing/2014/main" val="10004"/>
+                    <a16:rowId xmlns:a16="http://schemas.microsoft.com/office/drawing/2014/main" xmlns="" val="10004"/>
                   </a:ext>
                 </a:extLst>
               </a:tr>
@@ -21049,7 +21161,7 @@
                 </a:tc>
                 <a:extLst>
                   <a:ext uri="{0D108BD9-81ED-4DB2-BD59-A6C34878D82A}">
-                    <a16:rowId xmlns:a16="http://schemas.microsoft.com/office/drawing/2014/main" val="10005"/>
+                    <a16:rowId xmlns:a16="http://schemas.microsoft.com/office/drawing/2014/main" xmlns="" val="10005"/>
                   </a:ext>
                 </a:extLst>
               </a:tr>
@@ -21203,7 +21315,7 @@
                 </a:tc>
                 <a:extLst>
                   <a:ext uri="{0D108BD9-81ED-4DB2-BD59-A6C34878D82A}">
-                    <a16:rowId xmlns:a16="http://schemas.microsoft.com/office/drawing/2014/main" val="10006"/>
+                    <a16:rowId xmlns:a16="http://schemas.microsoft.com/office/drawing/2014/main" xmlns="" val="10006"/>
                   </a:ext>
                 </a:extLst>
               </a:tr>
@@ -21314,7 +21426,7 @@
                 </a:tc>
                 <a:extLst>
                   <a:ext uri="{0D108BD9-81ED-4DB2-BD59-A6C34878D82A}">
-                    <a16:rowId xmlns:a16="http://schemas.microsoft.com/office/drawing/2014/main" val="10007"/>
+                    <a16:rowId xmlns:a16="http://schemas.microsoft.com/office/drawing/2014/main" xmlns="" val="10007"/>
                   </a:ext>
                 </a:extLst>
               </a:tr>
@@ -21425,7 +21537,7 @@
                 </a:tc>
                 <a:extLst>
                   <a:ext uri="{0D108BD9-81ED-4DB2-BD59-A6C34878D82A}">
-                    <a16:rowId xmlns:a16="http://schemas.microsoft.com/office/drawing/2014/main" val="10008"/>
+                    <a16:rowId xmlns:a16="http://schemas.microsoft.com/office/drawing/2014/main" xmlns="" val="10008"/>
                   </a:ext>
                 </a:extLst>
               </a:tr>
@@ -21536,7 +21648,7 @@
                 </a:tc>
                 <a:extLst>
                   <a:ext uri="{0D108BD9-81ED-4DB2-BD59-A6C34878D82A}">
-                    <a16:rowId xmlns:a16="http://schemas.microsoft.com/office/drawing/2014/main" val="10009"/>
+                    <a16:rowId xmlns:a16="http://schemas.microsoft.com/office/drawing/2014/main" xmlns="" val="10009"/>
                   </a:ext>
                 </a:extLst>
               </a:tr>
@@ -21549,7 +21661,7 @@
           <p:cNvPr id="11" name="Rectangle 10">
             <a:extLst>
               <a:ext uri="{FF2B5EF4-FFF2-40B4-BE49-F238E27FC236}">
-                <a16:creationId xmlns:a16="http://schemas.microsoft.com/office/drawing/2014/main" id="{AD8B247E-6BFA-4BD6-B602-45D108194651}"/>
+                <a16:creationId xmlns:a16="http://schemas.microsoft.com/office/drawing/2014/main" xmlns="" id="{AD8B247E-6BFA-4BD6-B602-45D108194651}"/>
               </a:ext>
             </a:extLst>
           </p:cNvPr>
@@ -21747,6 +21859,13 @@
       </p:transition>
     </mc:Fallback>
   </mc:AlternateContent>
+  <p:timing>
+    <p:tnLst>
+      <p:par>
+        <p:cTn id="1" dur="indefinite" restart="never" nodeType="tmRoot"/>
+      </p:par>
+    </p:tnLst>
+  </p:timing>
 </p:sld>
 </file>
 
@@ -21772,7 +21891,7 @@
           <p:cNvPr id="49" name="Picture 48">
             <a:extLst>
               <a:ext uri="{FF2B5EF4-FFF2-40B4-BE49-F238E27FC236}">
-                <a16:creationId xmlns:a16="http://schemas.microsoft.com/office/drawing/2014/main" id="{3DB88EB2-4959-4384-B606-6EC9735683D6}"/>
+                <a16:creationId xmlns:a16="http://schemas.microsoft.com/office/drawing/2014/main" xmlns="" id="{3DB88EB2-4959-4384-B606-6EC9735683D6}"/>
               </a:ext>
             </a:extLst>
           </p:cNvPr>
@@ -21808,7 +21927,7 @@
           <p:cNvPr id="51" name="Straight Connector 50">
             <a:extLst>
               <a:ext uri="{FF2B5EF4-FFF2-40B4-BE49-F238E27FC236}">
-                <a16:creationId xmlns:a16="http://schemas.microsoft.com/office/drawing/2014/main" id="{29B44FC3-C737-4B92-B1D0-AD232099FBDF}"/>
+                <a16:creationId xmlns:a16="http://schemas.microsoft.com/office/drawing/2014/main" xmlns="" id="{29B44FC3-C737-4B92-B1D0-AD232099FBDF}"/>
               </a:ext>
             </a:extLst>
           </p:cNvPr>
@@ -21849,7 +21968,7 @@
           <p:cNvPr id="52" name="Title 1">
             <a:extLst>
               <a:ext uri="{FF2B5EF4-FFF2-40B4-BE49-F238E27FC236}">
-                <a16:creationId xmlns:a16="http://schemas.microsoft.com/office/drawing/2014/main" id="{2B8CDEBA-452A-4190-964B-37DF9F5C0EF5}"/>
+                <a16:creationId xmlns:a16="http://schemas.microsoft.com/office/drawing/2014/main" xmlns="" id="{2B8CDEBA-452A-4190-964B-37DF9F5C0EF5}"/>
               </a:ext>
             </a:extLst>
           </p:cNvPr>
@@ -21908,7 +22027,7 @@
           <p:cNvPr id="53" name="Rectangle 52">
             <a:extLst>
               <a:ext uri="{FF2B5EF4-FFF2-40B4-BE49-F238E27FC236}">
-                <a16:creationId xmlns:a16="http://schemas.microsoft.com/office/drawing/2014/main" id="{A0FB1C80-C067-49CE-95A9-A233AADF262C}"/>
+                <a16:creationId xmlns:a16="http://schemas.microsoft.com/office/drawing/2014/main" xmlns="" id="{A0FB1C80-C067-49CE-95A9-A233AADF262C}"/>
               </a:ext>
             </a:extLst>
           </p:cNvPr>
@@ -21959,7 +22078,7 @@
           <p:cNvPr id="54" name="Slide Number Placeholder 5">
             <a:extLst>
               <a:ext uri="{FF2B5EF4-FFF2-40B4-BE49-F238E27FC236}">
-                <a16:creationId xmlns:a16="http://schemas.microsoft.com/office/drawing/2014/main" id="{9AD941AF-6002-455E-B6E0-BA52F0663035}"/>
+                <a16:creationId xmlns:a16="http://schemas.microsoft.com/office/drawing/2014/main" xmlns="" id="{9AD941AF-6002-455E-B6E0-BA52F0663035}"/>
               </a:ext>
             </a:extLst>
           </p:cNvPr>
@@ -22004,7 +22123,7 @@
           <p:cNvPr id="9" name="Rectangle 8">
             <a:extLst>
               <a:ext uri="{FF2B5EF4-FFF2-40B4-BE49-F238E27FC236}">
-                <a16:creationId xmlns:a16="http://schemas.microsoft.com/office/drawing/2014/main" id="{0155F3D7-48CF-4E29-9BE7-F5607546C2C2}"/>
+                <a16:creationId xmlns:a16="http://schemas.microsoft.com/office/drawing/2014/main" xmlns="" id="{0155F3D7-48CF-4E29-9BE7-F5607546C2C2}"/>
               </a:ext>
             </a:extLst>
           </p:cNvPr>
@@ -22585,7 +22704,7 @@
           <p:cNvPr id="11" name="Footer Placeholder 4">
             <a:extLst>
               <a:ext uri="{FF2B5EF4-FFF2-40B4-BE49-F238E27FC236}">
-                <a16:creationId xmlns:a16="http://schemas.microsoft.com/office/drawing/2014/main" id="{E30F3B67-218D-4539-B8A0-E802D89089C9}"/>
+                <a16:creationId xmlns:a16="http://schemas.microsoft.com/office/drawing/2014/main" xmlns="" id="{E30F3B67-218D-4539-B8A0-E802D89089C9}"/>
               </a:ext>
             </a:extLst>
           </p:cNvPr>
@@ -22643,6 +22762,13 @@
       </p:transition>
     </mc:Fallback>
   </mc:AlternateContent>
+  <p:timing>
+    <p:tnLst>
+      <p:par>
+        <p:cTn id="1" dur="indefinite" restart="never" nodeType="tmRoot"/>
+      </p:par>
+    </p:tnLst>
+  </p:timing>
 </p:sld>
 </file>
 
@@ -22668,7 +22794,7 @@
           <p:cNvPr id="49" name="Picture 48">
             <a:extLst>
               <a:ext uri="{FF2B5EF4-FFF2-40B4-BE49-F238E27FC236}">
-                <a16:creationId xmlns:a16="http://schemas.microsoft.com/office/drawing/2014/main" id="{3DB88EB2-4959-4384-B606-6EC9735683D6}"/>
+                <a16:creationId xmlns:a16="http://schemas.microsoft.com/office/drawing/2014/main" xmlns="" id="{3DB88EB2-4959-4384-B606-6EC9735683D6}"/>
               </a:ext>
             </a:extLst>
           </p:cNvPr>
@@ -22704,7 +22830,7 @@
           <p:cNvPr id="51" name="Straight Connector 50">
             <a:extLst>
               <a:ext uri="{FF2B5EF4-FFF2-40B4-BE49-F238E27FC236}">
-                <a16:creationId xmlns:a16="http://schemas.microsoft.com/office/drawing/2014/main" id="{29B44FC3-C737-4B92-B1D0-AD232099FBDF}"/>
+                <a16:creationId xmlns:a16="http://schemas.microsoft.com/office/drawing/2014/main" xmlns="" id="{29B44FC3-C737-4B92-B1D0-AD232099FBDF}"/>
               </a:ext>
             </a:extLst>
           </p:cNvPr>
@@ -22745,7 +22871,7 @@
           <p:cNvPr id="52" name="Title 1">
             <a:extLst>
               <a:ext uri="{FF2B5EF4-FFF2-40B4-BE49-F238E27FC236}">
-                <a16:creationId xmlns:a16="http://schemas.microsoft.com/office/drawing/2014/main" id="{2B8CDEBA-452A-4190-964B-37DF9F5C0EF5}"/>
+                <a16:creationId xmlns:a16="http://schemas.microsoft.com/office/drawing/2014/main" xmlns="" id="{2B8CDEBA-452A-4190-964B-37DF9F5C0EF5}"/>
               </a:ext>
             </a:extLst>
           </p:cNvPr>
@@ -22804,7 +22930,7 @@
           <p:cNvPr id="53" name="Rectangle 52">
             <a:extLst>
               <a:ext uri="{FF2B5EF4-FFF2-40B4-BE49-F238E27FC236}">
-                <a16:creationId xmlns:a16="http://schemas.microsoft.com/office/drawing/2014/main" id="{A0FB1C80-C067-49CE-95A9-A233AADF262C}"/>
+                <a16:creationId xmlns:a16="http://schemas.microsoft.com/office/drawing/2014/main" xmlns="" id="{A0FB1C80-C067-49CE-95A9-A233AADF262C}"/>
               </a:ext>
             </a:extLst>
           </p:cNvPr>
@@ -22855,7 +22981,7 @@
           <p:cNvPr id="54" name="Slide Number Placeholder 5">
             <a:extLst>
               <a:ext uri="{FF2B5EF4-FFF2-40B4-BE49-F238E27FC236}">
-                <a16:creationId xmlns:a16="http://schemas.microsoft.com/office/drawing/2014/main" id="{9AD941AF-6002-455E-B6E0-BA52F0663035}"/>
+                <a16:creationId xmlns:a16="http://schemas.microsoft.com/office/drawing/2014/main" xmlns="" id="{9AD941AF-6002-455E-B6E0-BA52F0663035}"/>
               </a:ext>
             </a:extLst>
           </p:cNvPr>
@@ -22900,7 +23026,7 @@
           <p:cNvPr id="9" name="Footer Placeholder 4">
             <a:extLst>
               <a:ext uri="{FF2B5EF4-FFF2-40B4-BE49-F238E27FC236}">
-                <a16:creationId xmlns:a16="http://schemas.microsoft.com/office/drawing/2014/main" id="{829FB96C-2293-49F4-98CC-049EF9D74402}"/>
+                <a16:creationId xmlns:a16="http://schemas.microsoft.com/office/drawing/2014/main" xmlns="" id="{829FB96C-2293-49F4-98CC-049EF9D74402}"/>
               </a:ext>
             </a:extLst>
           </p:cNvPr>
@@ -22964,14 +23090,14 @@
                 <a:gridCol w="4228183">
                   <a:extLst>
                     <a:ext uri="{9D8B030D-6E8A-4147-A177-3AD203B41FA5}">
-                      <a16:colId xmlns:a16="http://schemas.microsoft.com/office/drawing/2014/main" val="20000"/>
+                      <a16:colId xmlns:a16="http://schemas.microsoft.com/office/drawing/2014/main" xmlns="" val="20000"/>
                     </a:ext>
                   </a:extLst>
                 </a:gridCol>
                 <a:gridCol w="4230360">
                   <a:extLst>
                     <a:ext uri="{9D8B030D-6E8A-4147-A177-3AD203B41FA5}">
-                      <a16:colId xmlns:a16="http://schemas.microsoft.com/office/drawing/2014/main" val="20001"/>
+                      <a16:colId xmlns:a16="http://schemas.microsoft.com/office/drawing/2014/main" xmlns="" val="20001"/>
                     </a:ext>
                   </a:extLst>
                 </a:gridCol>
@@ -23037,7 +23163,7 @@
                 </a:tc>
                 <a:extLst>
                   <a:ext uri="{0D108BD9-81ED-4DB2-BD59-A6C34878D82A}">
-                    <a16:rowId xmlns:a16="http://schemas.microsoft.com/office/drawing/2014/main" val="10000"/>
+                    <a16:rowId xmlns:a16="http://schemas.microsoft.com/office/drawing/2014/main" xmlns="" val="10000"/>
                   </a:ext>
                 </a:extLst>
               </a:tr>
@@ -23096,7 +23222,7 @@
                 </a:tc>
                 <a:extLst>
                   <a:ext uri="{0D108BD9-81ED-4DB2-BD59-A6C34878D82A}">
-                    <a16:rowId xmlns:a16="http://schemas.microsoft.com/office/drawing/2014/main" val="10001"/>
+                    <a16:rowId xmlns:a16="http://schemas.microsoft.com/office/drawing/2014/main" xmlns="" val="10001"/>
                   </a:ext>
                 </a:extLst>
               </a:tr>
@@ -23155,7 +23281,7 @@
                 </a:tc>
                 <a:extLst>
                   <a:ext uri="{0D108BD9-81ED-4DB2-BD59-A6C34878D82A}">
-                    <a16:rowId xmlns:a16="http://schemas.microsoft.com/office/drawing/2014/main" val="10002"/>
+                    <a16:rowId xmlns:a16="http://schemas.microsoft.com/office/drawing/2014/main" xmlns="" val="10002"/>
                   </a:ext>
                 </a:extLst>
               </a:tr>
@@ -23214,7 +23340,7 @@
                 </a:tc>
                 <a:extLst>
                   <a:ext uri="{0D108BD9-81ED-4DB2-BD59-A6C34878D82A}">
-                    <a16:rowId xmlns:a16="http://schemas.microsoft.com/office/drawing/2014/main" val="10003"/>
+                    <a16:rowId xmlns:a16="http://schemas.microsoft.com/office/drawing/2014/main" xmlns="" val="10003"/>
                   </a:ext>
                 </a:extLst>
               </a:tr>
@@ -23273,7 +23399,7 @@
                 </a:tc>
                 <a:extLst>
                   <a:ext uri="{0D108BD9-81ED-4DB2-BD59-A6C34878D82A}">
-                    <a16:rowId xmlns:a16="http://schemas.microsoft.com/office/drawing/2014/main" val="10004"/>
+                    <a16:rowId xmlns:a16="http://schemas.microsoft.com/office/drawing/2014/main" xmlns="" val="10004"/>
                   </a:ext>
                 </a:extLst>
               </a:tr>
@@ -23332,7 +23458,7 @@
                 </a:tc>
                 <a:extLst>
                   <a:ext uri="{0D108BD9-81ED-4DB2-BD59-A6C34878D82A}">
-                    <a16:rowId xmlns:a16="http://schemas.microsoft.com/office/drawing/2014/main" val="10005"/>
+                    <a16:rowId xmlns:a16="http://schemas.microsoft.com/office/drawing/2014/main" xmlns="" val="10005"/>
                   </a:ext>
                 </a:extLst>
               </a:tr>
@@ -23391,7 +23517,7 @@
                 </a:tc>
                 <a:extLst>
                   <a:ext uri="{0D108BD9-81ED-4DB2-BD59-A6C34878D82A}">
-                    <a16:rowId xmlns:a16="http://schemas.microsoft.com/office/drawing/2014/main" val="10006"/>
+                    <a16:rowId xmlns:a16="http://schemas.microsoft.com/office/drawing/2014/main" xmlns="" val="10006"/>
                   </a:ext>
                 </a:extLst>
               </a:tr>
@@ -23464,7 +23590,7 @@
                 </a:tc>
                 <a:extLst>
                   <a:ext uri="{0D108BD9-81ED-4DB2-BD59-A6C34878D82A}">
-                    <a16:rowId xmlns:a16="http://schemas.microsoft.com/office/drawing/2014/main" val="10007"/>
+                    <a16:rowId xmlns:a16="http://schemas.microsoft.com/office/drawing/2014/main" xmlns="" val="10007"/>
                   </a:ext>
                 </a:extLst>
               </a:tr>
@@ -23494,6 +23620,13 @@
       </p:transition>
     </mc:Fallback>
   </mc:AlternateContent>
+  <p:timing>
+    <p:tnLst>
+      <p:par>
+        <p:cTn id="1" dur="indefinite" restart="never" nodeType="tmRoot"/>
+      </p:par>
+    </p:tnLst>
+  </p:timing>
 </p:sld>
 </file>
 
@@ -23519,7 +23652,7 @@
           <p:cNvPr id="49" name="Picture 48">
             <a:extLst>
               <a:ext uri="{FF2B5EF4-FFF2-40B4-BE49-F238E27FC236}">
-                <a16:creationId xmlns:a16="http://schemas.microsoft.com/office/drawing/2014/main" id="{3DB88EB2-4959-4384-B606-6EC9735683D6}"/>
+                <a16:creationId xmlns:a16="http://schemas.microsoft.com/office/drawing/2014/main" xmlns="" id="{3DB88EB2-4959-4384-B606-6EC9735683D6}"/>
               </a:ext>
             </a:extLst>
           </p:cNvPr>
@@ -23555,7 +23688,7 @@
           <p:cNvPr id="51" name="Straight Connector 50">
             <a:extLst>
               <a:ext uri="{FF2B5EF4-FFF2-40B4-BE49-F238E27FC236}">
-                <a16:creationId xmlns:a16="http://schemas.microsoft.com/office/drawing/2014/main" id="{29B44FC3-C737-4B92-B1D0-AD232099FBDF}"/>
+                <a16:creationId xmlns:a16="http://schemas.microsoft.com/office/drawing/2014/main" xmlns="" id="{29B44FC3-C737-4B92-B1D0-AD232099FBDF}"/>
               </a:ext>
             </a:extLst>
           </p:cNvPr>
@@ -23596,7 +23729,7 @@
           <p:cNvPr id="52" name="Title 1">
             <a:extLst>
               <a:ext uri="{FF2B5EF4-FFF2-40B4-BE49-F238E27FC236}">
-                <a16:creationId xmlns:a16="http://schemas.microsoft.com/office/drawing/2014/main" id="{2B8CDEBA-452A-4190-964B-37DF9F5C0EF5}"/>
+                <a16:creationId xmlns:a16="http://schemas.microsoft.com/office/drawing/2014/main" xmlns="" id="{2B8CDEBA-452A-4190-964B-37DF9F5C0EF5}"/>
               </a:ext>
             </a:extLst>
           </p:cNvPr>
@@ -23655,7 +23788,7 @@
           <p:cNvPr id="53" name="Rectangle 52">
             <a:extLst>
               <a:ext uri="{FF2B5EF4-FFF2-40B4-BE49-F238E27FC236}">
-                <a16:creationId xmlns:a16="http://schemas.microsoft.com/office/drawing/2014/main" id="{A0FB1C80-C067-49CE-95A9-A233AADF262C}"/>
+                <a16:creationId xmlns:a16="http://schemas.microsoft.com/office/drawing/2014/main" xmlns="" id="{A0FB1C80-C067-49CE-95A9-A233AADF262C}"/>
               </a:ext>
             </a:extLst>
           </p:cNvPr>
@@ -23706,7 +23839,7 @@
           <p:cNvPr id="54" name="Slide Number Placeholder 5">
             <a:extLst>
               <a:ext uri="{FF2B5EF4-FFF2-40B4-BE49-F238E27FC236}">
-                <a16:creationId xmlns:a16="http://schemas.microsoft.com/office/drawing/2014/main" id="{9AD941AF-6002-455E-B6E0-BA52F0663035}"/>
+                <a16:creationId xmlns:a16="http://schemas.microsoft.com/office/drawing/2014/main" xmlns="" id="{9AD941AF-6002-455E-B6E0-BA52F0663035}"/>
               </a:ext>
             </a:extLst>
           </p:cNvPr>
@@ -23751,7 +23884,7 @@
           <p:cNvPr id="9" name="Footer Placeholder 4">
             <a:extLst>
               <a:ext uri="{FF2B5EF4-FFF2-40B4-BE49-F238E27FC236}">
-                <a16:creationId xmlns:a16="http://schemas.microsoft.com/office/drawing/2014/main" id="{829FB96C-2293-49F4-98CC-049EF9D74402}"/>
+                <a16:creationId xmlns:a16="http://schemas.microsoft.com/office/drawing/2014/main" xmlns="" id="{829FB96C-2293-49F4-98CC-049EF9D74402}"/>
               </a:ext>
             </a:extLst>
           </p:cNvPr>
@@ -23792,7 +23925,7 @@
           <p:cNvPr id="10" name="Rectangle 9">
             <a:extLst>
               <a:ext uri="{FF2B5EF4-FFF2-40B4-BE49-F238E27FC236}">
-                <a16:creationId xmlns:a16="http://schemas.microsoft.com/office/drawing/2014/main" id="{0155F3D7-48CF-4E29-9BE7-F5607546C2C2}"/>
+                <a16:creationId xmlns:a16="http://schemas.microsoft.com/office/drawing/2014/main" xmlns="" id="{0155F3D7-48CF-4E29-9BE7-F5607546C2C2}"/>
               </a:ext>
             </a:extLst>
           </p:cNvPr>
@@ -24763,6 +24896,13 @@
       </p:transition>
     </mc:Fallback>
   </mc:AlternateContent>
+  <p:timing>
+    <p:tnLst>
+      <p:par>
+        <p:cTn id="1" dur="indefinite" restart="never" nodeType="tmRoot"/>
+      </p:par>
+    </p:tnLst>
+  </p:timing>
 </p:sld>
 </file>
 
@@ -24788,7 +24928,7 @@
           <p:cNvPr id="49" name="Picture 48">
             <a:extLst>
               <a:ext uri="{FF2B5EF4-FFF2-40B4-BE49-F238E27FC236}">
-                <a16:creationId xmlns:a16="http://schemas.microsoft.com/office/drawing/2014/main" id="{3DB88EB2-4959-4384-B606-6EC9735683D6}"/>
+                <a16:creationId xmlns:a16="http://schemas.microsoft.com/office/drawing/2014/main" xmlns="" id="{3DB88EB2-4959-4384-B606-6EC9735683D6}"/>
               </a:ext>
             </a:extLst>
           </p:cNvPr>
@@ -24824,7 +24964,7 @@
           <p:cNvPr id="54" name="Slide Number Placeholder 5">
             <a:extLst>
               <a:ext uri="{FF2B5EF4-FFF2-40B4-BE49-F238E27FC236}">
-                <a16:creationId xmlns:a16="http://schemas.microsoft.com/office/drawing/2014/main" id="{9AD941AF-6002-455E-B6E0-BA52F0663035}"/>
+                <a16:creationId xmlns:a16="http://schemas.microsoft.com/office/drawing/2014/main" xmlns="" id="{9AD941AF-6002-455E-B6E0-BA52F0663035}"/>
               </a:ext>
             </a:extLst>
           </p:cNvPr>
@@ -24869,7 +25009,7 @@
           <p:cNvPr id="19" name="Title 1">
             <a:extLst>
               <a:ext uri="{FF2B5EF4-FFF2-40B4-BE49-F238E27FC236}">
-                <a16:creationId xmlns:a16="http://schemas.microsoft.com/office/drawing/2014/main" id="{45DE30A8-2F8A-4013-AF22-27C0A7388B2F}"/>
+                <a16:creationId xmlns:a16="http://schemas.microsoft.com/office/drawing/2014/main" xmlns="" id="{45DE30A8-2F8A-4013-AF22-27C0A7388B2F}"/>
               </a:ext>
             </a:extLst>
           </p:cNvPr>
@@ -24931,7 +25071,7 @@
           <p:cNvPr id="22" name="Straight Connector 21">
             <a:extLst>
               <a:ext uri="{FF2B5EF4-FFF2-40B4-BE49-F238E27FC236}">
-                <a16:creationId xmlns:a16="http://schemas.microsoft.com/office/drawing/2014/main" id="{A3C3DF79-CF3A-4E66-A575-D5A7953A6CEB}"/>
+                <a16:creationId xmlns:a16="http://schemas.microsoft.com/office/drawing/2014/main" xmlns="" id="{A3C3DF79-CF3A-4E66-A575-D5A7953A6CEB}"/>
               </a:ext>
             </a:extLst>
           </p:cNvPr>
@@ -24974,7 +25114,7 @@
           <p:cNvPr id="25" name="Straight Connector 24">
             <a:extLst>
               <a:ext uri="{FF2B5EF4-FFF2-40B4-BE49-F238E27FC236}">
-                <a16:creationId xmlns:a16="http://schemas.microsoft.com/office/drawing/2014/main" id="{1AC35EEC-E10F-4CC7-B5D7-44E576C5CC6C}"/>
+                <a16:creationId xmlns:a16="http://schemas.microsoft.com/office/drawing/2014/main" xmlns="" id="{1AC35EEC-E10F-4CC7-B5D7-44E576C5CC6C}"/>
               </a:ext>
             </a:extLst>
           </p:cNvPr>
@@ -25017,7 +25157,7 @@
           <p:cNvPr id="9" name="Footer Placeholder 4">
             <a:extLst>
               <a:ext uri="{FF2B5EF4-FFF2-40B4-BE49-F238E27FC236}">
-                <a16:creationId xmlns:a16="http://schemas.microsoft.com/office/drawing/2014/main" id="{1E190F19-047A-4086-B3C2-5AED2105529F}"/>
+                <a16:creationId xmlns:a16="http://schemas.microsoft.com/office/drawing/2014/main" xmlns="" id="{1E190F19-047A-4086-B3C2-5AED2105529F}"/>
               </a:ext>
             </a:extLst>
           </p:cNvPr>
@@ -25075,6 +25215,13 @@
       </p:transition>
     </mc:Fallback>
   </mc:AlternateContent>
+  <p:timing>
+    <p:tnLst>
+      <p:par>
+        <p:cTn id="1" dur="indefinite" restart="never" nodeType="tmRoot"/>
+      </p:par>
+    </p:tnLst>
+  </p:timing>
 </p:sld>
 </file>
 
@@ -25100,7 +25247,7 @@
           <p:cNvPr id="49" name="Picture 48">
             <a:extLst>
               <a:ext uri="{FF2B5EF4-FFF2-40B4-BE49-F238E27FC236}">
-                <a16:creationId xmlns:a16="http://schemas.microsoft.com/office/drawing/2014/main" id="{3DB88EB2-4959-4384-B606-6EC9735683D6}"/>
+                <a16:creationId xmlns:a16="http://schemas.microsoft.com/office/drawing/2014/main" xmlns="" id="{3DB88EB2-4959-4384-B606-6EC9735683D6}"/>
               </a:ext>
             </a:extLst>
           </p:cNvPr>
@@ -25136,7 +25283,7 @@
           <p:cNvPr id="51" name="Straight Connector 50">
             <a:extLst>
               <a:ext uri="{FF2B5EF4-FFF2-40B4-BE49-F238E27FC236}">
-                <a16:creationId xmlns:a16="http://schemas.microsoft.com/office/drawing/2014/main" id="{29B44FC3-C737-4B92-B1D0-AD232099FBDF}"/>
+                <a16:creationId xmlns:a16="http://schemas.microsoft.com/office/drawing/2014/main" xmlns="" id="{29B44FC3-C737-4B92-B1D0-AD232099FBDF}"/>
               </a:ext>
             </a:extLst>
           </p:cNvPr>
@@ -25177,7 +25324,7 @@
           <p:cNvPr id="52" name="Title 1">
             <a:extLst>
               <a:ext uri="{FF2B5EF4-FFF2-40B4-BE49-F238E27FC236}">
-                <a16:creationId xmlns:a16="http://schemas.microsoft.com/office/drawing/2014/main" id="{2B8CDEBA-452A-4190-964B-37DF9F5C0EF5}"/>
+                <a16:creationId xmlns:a16="http://schemas.microsoft.com/office/drawing/2014/main" xmlns="" id="{2B8CDEBA-452A-4190-964B-37DF9F5C0EF5}"/>
               </a:ext>
             </a:extLst>
           </p:cNvPr>
@@ -25236,7 +25383,7 @@
           <p:cNvPr id="53" name="Rectangle 52">
             <a:extLst>
               <a:ext uri="{FF2B5EF4-FFF2-40B4-BE49-F238E27FC236}">
-                <a16:creationId xmlns:a16="http://schemas.microsoft.com/office/drawing/2014/main" id="{A0FB1C80-C067-49CE-95A9-A233AADF262C}"/>
+                <a16:creationId xmlns:a16="http://schemas.microsoft.com/office/drawing/2014/main" xmlns="" id="{A0FB1C80-C067-49CE-95A9-A233AADF262C}"/>
               </a:ext>
             </a:extLst>
           </p:cNvPr>
@@ -25287,7 +25434,7 @@
           <p:cNvPr id="54" name="Slide Number Placeholder 5">
             <a:extLst>
               <a:ext uri="{FF2B5EF4-FFF2-40B4-BE49-F238E27FC236}">
-                <a16:creationId xmlns:a16="http://schemas.microsoft.com/office/drawing/2014/main" id="{9AD941AF-6002-455E-B6E0-BA52F0663035}"/>
+                <a16:creationId xmlns:a16="http://schemas.microsoft.com/office/drawing/2014/main" xmlns="" id="{9AD941AF-6002-455E-B6E0-BA52F0663035}"/>
               </a:ext>
             </a:extLst>
           </p:cNvPr>
@@ -25332,7 +25479,7 @@
           <p:cNvPr id="9" name="Footer Placeholder 4">
             <a:extLst>
               <a:ext uri="{FF2B5EF4-FFF2-40B4-BE49-F238E27FC236}">
-                <a16:creationId xmlns:a16="http://schemas.microsoft.com/office/drawing/2014/main" id="{829FB96C-2293-49F4-98CC-049EF9D74402}"/>
+                <a16:creationId xmlns:a16="http://schemas.microsoft.com/office/drawing/2014/main" xmlns="" id="{829FB96C-2293-49F4-98CC-049EF9D74402}"/>
               </a:ext>
             </a:extLst>
           </p:cNvPr>
@@ -25373,7 +25520,7 @@
           <p:cNvPr id="2" name="Table 1">
             <a:extLst>
               <a:ext uri="{FF2B5EF4-FFF2-40B4-BE49-F238E27FC236}">
-                <a16:creationId xmlns:a16="http://schemas.microsoft.com/office/drawing/2014/main" id="{A6CD5A93-7C5E-43BC-933B-4DF3798AF66E}"/>
+                <a16:creationId xmlns:a16="http://schemas.microsoft.com/office/drawing/2014/main" xmlns="" id="{A6CD5A93-7C5E-43BC-933B-4DF3798AF66E}"/>
               </a:ext>
             </a:extLst>
           </p:cNvPr>
@@ -25402,28 +25549,28 @@
                 <a:gridCol w="1598979">
                   <a:extLst>
                     <a:ext uri="{9D8B030D-6E8A-4147-A177-3AD203B41FA5}">
-                      <a16:colId xmlns:a16="http://schemas.microsoft.com/office/drawing/2014/main" val="2098199913"/>
+                      <a16:colId xmlns:a16="http://schemas.microsoft.com/office/drawing/2014/main" xmlns="" val="2098199913"/>
                     </a:ext>
                   </a:extLst>
                 </a:gridCol>
                 <a:gridCol w="1987208">
                   <a:extLst>
                     <a:ext uri="{9D8B030D-6E8A-4147-A177-3AD203B41FA5}">
-                      <a16:colId xmlns:a16="http://schemas.microsoft.com/office/drawing/2014/main" val="590052217"/>
+                      <a16:colId xmlns:a16="http://schemas.microsoft.com/office/drawing/2014/main" xmlns="" val="590052217"/>
                     </a:ext>
                   </a:extLst>
                 </a:gridCol>
                 <a:gridCol w="2541587">
                   <a:extLst>
                     <a:ext uri="{9D8B030D-6E8A-4147-A177-3AD203B41FA5}">
-                      <a16:colId xmlns:a16="http://schemas.microsoft.com/office/drawing/2014/main" val="843145037"/>
+                      <a16:colId xmlns:a16="http://schemas.microsoft.com/office/drawing/2014/main" xmlns="" val="843145037"/>
                     </a:ext>
                   </a:extLst>
                 </a:gridCol>
                 <a:gridCol w="2538297">
                   <a:extLst>
                     <a:ext uri="{9D8B030D-6E8A-4147-A177-3AD203B41FA5}">
-                      <a16:colId xmlns:a16="http://schemas.microsoft.com/office/drawing/2014/main" val="2284456405"/>
+                      <a16:colId xmlns:a16="http://schemas.microsoft.com/office/drawing/2014/main" xmlns="" val="2284456405"/>
                     </a:ext>
                   </a:extLst>
                 </a:gridCol>
@@ -25535,7 +25682,7 @@
                 </a:tc>
                 <a:extLst>
                   <a:ext uri="{0D108BD9-81ED-4DB2-BD59-A6C34878D82A}">
-                    <a16:rowId xmlns:a16="http://schemas.microsoft.com/office/drawing/2014/main" val="2908543184"/>
+                    <a16:rowId xmlns:a16="http://schemas.microsoft.com/office/drawing/2014/main" xmlns="" val="2908543184"/>
                   </a:ext>
                 </a:extLst>
               </a:tr>
@@ -25646,7 +25793,7 @@
                 </a:tc>
                 <a:extLst>
                   <a:ext uri="{0D108BD9-81ED-4DB2-BD59-A6C34878D82A}">
-                    <a16:rowId xmlns:a16="http://schemas.microsoft.com/office/drawing/2014/main" val="4251034647"/>
+                    <a16:rowId xmlns:a16="http://schemas.microsoft.com/office/drawing/2014/main" xmlns="" val="4251034647"/>
                   </a:ext>
                 </a:extLst>
               </a:tr>
@@ -25757,7 +25904,7 @@
                 </a:tc>
                 <a:extLst>
                   <a:ext uri="{0D108BD9-81ED-4DB2-BD59-A6C34878D82A}">
-                    <a16:rowId xmlns:a16="http://schemas.microsoft.com/office/drawing/2014/main" val="362858257"/>
+                    <a16:rowId xmlns:a16="http://schemas.microsoft.com/office/drawing/2014/main" xmlns="" val="362858257"/>
                   </a:ext>
                 </a:extLst>
               </a:tr>
@@ -25868,7 +26015,7 @@
                 </a:tc>
                 <a:extLst>
                   <a:ext uri="{0D108BD9-81ED-4DB2-BD59-A6C34878D82A}">
-                    <a16:rowId xmlns:a16="http://schemas.microsoft.com/office/drawing/2014/main" val="771226168"/>
+                    <a16:rowId xmlns:a16="http://schemas.microsoft.com/office/drawing/2014/main" xmlns="" val="771226168"/>
                   </a:ext>
                 </a:extLst>
               </a:tr>
@@ -25979,7 +26126,7 @@
                 </a:tc>
                 <a:extLst>
                   <a:ext uri="{0D108BD9-81ED-4DB2-BD59-A6C34878D82A}">
-                    <a16:rowId xmlns:a16="http://schemas.microsoft.com/office/drawing/2014/main" val="1582872211"/>
+                    <a16:rowId xmlns:a16="http://schemas.microsoft.com/office/drawing/2014/main" xmlns="" val="1582872211"/>
                   </a:ext>
                 </a:extLst>
               </a:tr>
@@ -26074,7 +26221,7 @@
                 </a:tc>
                 <a:extLst>
                   <a:ext uri="{0D108BD9-81ED-4DB2-BD59-A6C34878D82A}">
-                    <a16:rowId xmlns:a16="http://schemas.microsoft.com/office/drawing/2014/main" val="2951060372"/>
+                    <a16:rowId xmlns:a16="http://schemas.microsoft.com/office/drawing/2014/main" xmlns="" val="2951060372"/>
                   </a:ext>
                 </a:extLst>
               </a:tr>
@@ -26104,6 +26251,13 @@
       </p:transition>
     </mc:Fallback>
   </mc:AlternateContent>
+  <p:timing>
+    <p:tnLst>
+      <p:par>
+        <p:cTn id="1" dur="indefinite" restart="never" nodeType="tmRoot"/>
+      </p:par>
+    </p:tnLst>
+  </p:timing>
 </p:sld>
 </file>
 
@@ -26129,7 +26283,7 @@
           <p:cNvPr id="49" name="Picture 48">
             <a:extLst>
               <a:ext uri="{FF2B5EF4-FFF2-40B4-BE49-F238E27FC236}">
-                <a16:creationId xmlns:a16="http://schemas.microsoft.com/office/drawing/2014/main" id="{3DB88EB2-4959-4384-B606-6EC9735683D6}"/>
+                <a16:creationId xmlns:a16="http://schemas.microsoft.com/office/drawing/2014/main" xmlns="" id="{3DB88EB2-4959-4384-B606-6EC9735683D6}"/>
               </a:ext>
             </a:extLst>
           </p:cNvPr>
@@ -26165,7 +26319,7 @@
           <p:cNvPr id="51" name="Straight Connector 50">
             <a:extLst>
               <a:ext uri="{FF2B5EF4-FFF2-40B4-BE49-F238E27FC236}">
-                <a16:creationId xmlns:a16="http://schemas.microsoft.com/office/drawing/2014/main" id="{29B44FC3-C737-4B92-B1D0-AD232099FBDF}"/>
+                <a16:creationId xmlns:a16="http://schemas.microsoft.com/office/drawing/2014/main" xmlns="" id="{29B44FC3-C737-4B92-B1D0-AD232099FBDF}"/>
               </a:ext>
             </a:extLst>
           </p:cNvPr>
@@ -26206,7 +26360,7 @@
           <p:cNvPr id="52" name="Title 1">
             <a:extLst>
               <a:ext uri="{FF2B5EF4-FFF2-40B4-BE49-F238E27FC236}">
-                <a16:creationId xmlns:a16="http://schemas.microsoft.com/office/drawing/2014/main" id="{2B8CDEBA-452A-4190-964B-37DF9F5C0EF5}"/>
+                <a16:creationId xmlns:a16="http://schemas.microsoft.com/office/drawing/2014/main" xmlns="" id="{2B8CDEBA-452A-4190-964B-37DF9F5C0EF5}"/>
               </a:ext>
             </a:extLst>
           </p:cNvPr>
@@ -26265,7 +26419,7 @@
           <p:cNvPr id="53" name="Rectangle 52">
             <a:extLst>
               <a:ext uri="{FF2B5EF4-FFF2-40B4-BE49-F238E27FC236}">
-                <a16:creationId xmlns:a16="http://schemas.microsoft.com/office/drawing/2014/main" id="{A0FB1C80-C067-49CE-95A9-A233AADF262C}"/>
+                <a16:creationId xmlns:a16="http://schemas.microsoft.com/office/drawing/2014/main" xmlns="" id="{A0FB1C80-C067-49CE-95A9-A233AADF262C}"/>
               </a:ext>
             </a:extLst>
           </p:cNvPr>
@@ -26316,7 +26470,7 @@
           <p:cNvPr id="54" name="Slide Number Placeholder 5">
             <a:extLst>
               <a:ext uri="{FF2B5EF4-FFF2-40B4-BE49-F238E27FC236}">
-                <a16:creationId xmlns:a16="http://schemas.microsoft.com/office/drawing/2014/main" id="{9AD941AF-6002-455E-B6E0-BA52F0663035}"/>
+                <a16:creationId xmlns:a16="http://schemas.microsoft.com/office/drawing/2014/main" xmlns="" id="{9AD941AF-6002-455E-B6E0-BA52F0663035}"/>
               </a:ext>
             </a:extLst>
           </p:cNvPr>
@@ -26361,7 +26515,7 @@
           <p:cNvPr id="9" name="Footer Placeholder 4">
             <a:extLst>
               <a:ext uri="{FF2B5EF4-FFF2-40B4-BE49-F238E27FC236}">
-                <a16:creationId xmlns:a16="http://schemas.microsoft.com/office/drawing/2014/main" id="{829FB96C-2293-49F4-98CC-049EF9D74402}"/>
+                <a16:creationId xmlns:a16="http://schemas.microsoft.com/office/drawing/2014/main" xmlns="" id="{829FB96C-2293-49F4-98CC-049EF9D74402}"/>
               </a:ext>
             </a:extLst>
           </p:cNvPr>
@@ -26425,28 +26579,28 @@
                 <a:gridCol w="751026">
                   <a:extLst>
                     <a:ext uri="{9D8B030D-6E8A-4147-A177-3AD203B41FA5}">
-                      <a16:colId xmlns:a16="http://schemas.microsoft.com/office/drawing/2014/main" val="20000"/>
+                      <a16:colId xmlns:a16="http://schemas.microsoft.com/office/drawing/2014/main" xmlns="" val="20000"/>
                     </a:ext>
                   </a:extLst>
                 </a:gridCol>
                 <a:gridCol w="2024564">
                   <a:extLst>
                     <a:ext uri="{9D8B030D-6E8A-4147-A177-3AD203B41FA5}">
-                      <a16:colId xmlns:a16="http://schemas.microsoft.com/office/drawing/2014/main" val="20001"/>
+                      <a16:colId xmlns:a16="http://schemas.microsoft.com/office/drawing/2014/main" xmlns="" val="20001"/>
                     </a:ext>
                   </a:extLst>
                 </a:gridCol>
                 <a:gridCol w="1769322">
                   <a:extLst>
                     <a:ext uri="{9D8B030D-6E8A-4147-A177-3AD203B41FA5}">
-                      <a16:colId xmlns:a16="http://schemas.microsoft.com/office/drawing/2014/main" val="20002"/>
+                      <a16:colId xmlns:a16="http://schemas.microsoft.com/office/drawing/2014/main" xmlns="" val="20002"/>
                     </a:ext>
                   </a:extLst>
                 </a:gridCol>
                 <a:gridCol w="2102072">
                   <a:extLst>
                     <a:ext uri="{9D8B030D-6E8A-4147-A177-3AD203B41FA5}">
-                      <a16:colId xmlns:a16="http://schemas.microsoft.com/office/drawing/2014/main" val="20003"/>
+                      <a16:colId xmlns:a16="http://schemas.microsoft.com/office/drawing/2014/main" xmlns="" val="20003"/>
                     </a:ext>
                   </a:extLst>
                 </a:gridCol>
@@ -26558,7 +26712,7 @@
                 </a:tc>
                 <a:extLst>
                   <a:ext uri="{0D108BD9-81ED-4DB2-BD59-A6C34878D82A}">
-                    <a16:rowId xmlns:a16="http://schemas.microsoft.com/office/drawing/2014/main" val="10000"/>
+                    <a16:rowId xmlns:a16="http://schemas.microsoft.com/office/drawing/2014/main" xmlns="" val="10000"/>
                   </a:ext>
                 </a:extLst>
               </a:tr>
@@ -26681,7 +26835,7 @@
                 </a:tc>
                 <a:extLst>
                   <a:ext uri="{0D108BD9-81ED-4DB2-BD59-A6C34878D82A}">
-                    <a16:rowId xmlns:a16="http://schemas.microsoft.com/office/drawing/2014/main" val="10001"/>
+                    <a16:rowId xmlns:a16="http://schemas.microsoft.com/office/drawing/2014/main" xmlns="" val="10001"/>
                   </a:ext>
                 </a:extLst>
               </a:tr>
@@ -26804,7 +26958,7 @@
                 </a:tc>
                 <a:extLst>
                   <a:ext uri="{0D108BD9-81ED-4DB2-BD59-A6C34878D82A}">
-                    <a16:rowId xmlns:a16="http://schemas.microsoft.com/office/drawing/2014/main" val="10002"/>
+                    <a16:rowId xmlns:a16="http://schemas.microsoft.com/office/drawing/2014/main" xmlns="" val="10002"/>
                   </a:ext>
                 </a:extLst>
               </a:tr>
@@ -26927,7 +27081,7 @@
                 </a:tc>
                 <a:extLst>
                   <a:ext uri="{0D108BD9-81ED-4DB2-BD59-A6C34878D82A}">
-                    <a16:rowId xmlns:a16="http://schemas.microsoft.com/office/drawing/2014/main" val="10003"/>
+                    <a16:rowId xmlns:a16="http://schemas.microsoft.com/office/drawing/2014/main" xmlns="" val="10003"/>
                   </a:ext>
                 </a:extLst>
               </a:tr>
@@ -27050,7 +27204,7 @@
                 </a:tc>
                 <a:extLst>
                   <a:ext uri="{0D108BD9-81ED-4DB2-BD59-A6C34878D82A}">
-                    <a16:rowId xmlns:a16="http://schemas.microsoft.com/office/drawing/2014/main" val="2927252052"/>
+                    <a16:rowId xmlns:a16="http://schemas.microsoft.com/office/drawing/2014/main" xmlns="" val="2927252052"/>
                   </a:ext>
                 </a:extLst>
               </a:tr>
@@ -27154,7 +27308,7 @@
                 </a:tc>
                 <a:extLst>
                   <a:ext uri="{0D108BD9-81ED-4DB2-BD59-A6C34878D82A}">
-                    <a16:rowId xmlns:a16="http://schemas.microsoft.com/office/drawing/2014/main" val="10004"/>
+                    <a16:rowId xmlns:a16="http://schemas.microsoft.com/office/drawing/2014/main" xmlns="" val="10004"/>
                   </a:ext>
                 </a:extLst>
               </a:tr>
@@ -27167,7 +27321,7 @@
           <p:cNvPr id="10" name="Rectangle 9">
             <a:extLst>
               <a:ext uri="{FF2B5EF4-FFF2-40B4-BE49-F238E27FC236}">
-                <a16:creationId xmlns:a16="http://schemas.microsoft.com/office/drawing/2014/main" id="{0155F3D7-48CF-4E29-9BE7-F5607546C2C2}"/>
+                <a16:creationId xmlns:a16="http://schemas.microsoft.com/office/drawing/2014/main" xmlns="" id="{0155F3D7-48CF-4E29-9BE7-F5607546C2C2}"/>
               </a:ext>
             </a:extLst>
           </p:cNvPr>
@@ -27390,6 +27544,13 @@
       </p:transition>
     </mc:Fallback>
   </mc:AlternateContent>
+  <p:timing>
+    <p:tnLst>
+      <p:par>
+        <p:cTn id="1" dur="indefinite" restart="never" nodeType="tmRoot"/>
+      </p:par>
+    </p:tnLst>
+  </p:timing>
 </p:sld>
 </file>
 
@@ -27415,7 +27576,7 @@
           <p:cNvPr id="49" name="Picture 48">
             <a:extLst>
               <a:ext uri="{FF2B5EF4-FFF2-40B4-BE49-F238E27FC236}">
-                <a16:creationId xmlns:a16="http://schemas.microsoft.com/office/drawing/2014/main" id="{3DB88EB2-4959-4384-B606-6EC9735683D6}"/>
+                <a16:creationId xmlns:a16="http://schemas.microsoft.com/office/drawing/2014/main" xmlns="" id="{3DB88EB2-4959-4384-B606-6EC9735683D6}"/>
               </a:ext>
             </a:extLst>
           </p:cNvPr>
@@ -27451,7 +27612,7 @@
           <p:cNvPr id="54" name="Slide Number Placeholder 5">
             <a:extLst>
               <a:ext uri="{FF2B5EF4-FFF2-40B4-BE49-F238E27FC236}">
-                <a16:creationId xmlns:a16="http://schemas.microsoft.com/office/drawing/2014/main" id="{9AD941AF-6002-455E-B6E0-BA52F0663035}"/>
+                <a16:creationId xmlns:a16="http://schemas.microsoft.com/office/drawing/2014/main" xmlns="" id="{9AD941AF-6002-455E-B6E0-BA52F0663035}"/>
               </a:ext>
             </a:extLst>
           </p:cNvPr>
@@ -27496,7 +27657,7 @@
           <p:cNvPr id="19" name="Title 1">
             <a:extLst>
               <a:ext uri="{FF2B5EF4-FFF2-40B4-BE49-F238E27FC236}">
-                <a16:creationId xmlns:a16="http://schemas.microsoft.com/office/drawing/2014/main" id="{45DE30A8-2F8A-4013-AF22-27C0A7388B2F}"/>
+                <a16:creationId xmlns:a16="http://schemas.microsoft.com/office/drawing/2014/main" xmlns="" id="{45DE30A8-2F8A-4013-AF22-27C0A7388B2F}"/>
               </a:ext>
             </a:extLst>
           </p:cNvPr>
@@ -27570,7 +27731,7 @@
           <p:cNvPr id="22" name="Straight Connector 21">
             <a:extLst>
               <a:ext uri="{FF2B5EF4-FFF2-40B4-BE49-F238E27FC236}">
-                <a16:creationId xmlns:a16="http://schemas.microsoft.com/office/drawing/2014/main" id="{A3C3DF79-CF3A-4E66-A575-D5A7953A6CEB}"/>
+                <a16:creationId xmlns:a16="http://schemas.microsoft.com/office/drawing/2014/main" xmlns="" id="{A3C3DF79-CF3A-4E66-A575-D5A7953A6CEB}"/>
               </a:ext>
             </a:extLst>
           </p:cNvPr>
@@ -27613,7 +27774,7 @@
           <p:cNvPr id="25" name="Straight Connector 24">
             <a:extLst>
               <a:ext uri="{FF2B5EF4-FFF2-40B4-BE49-F238E27FC236}">
-                <a16:creationId xmlns:a16="http://schemas.microsoft.com/office/drawing/2014/main" id="{1AC35EEC-E10F-4CC7-B5D7-44E576C5CC6C}"/>
+                <a16:creationId xmlns:a16="http://schemas.microsoft.com/office/drawing/2014/main" xmlns="" id="{1AC35EEC-E10F-4CC7-B5D7-44E576C5CC6C}"/>
               </a:ext>
             </a:extLst>
           </p:cNvPr>
@@ -27656,7 +27817,7 @@
           <p:cNvPr id="8" name="Footer Placeholder 4">
             <a:extLst>
               <a:ext uri="{FF2B5EF4-FFF2-40B4-BE49-F238E27FC236}">
-                <a16:creationId xmlns:a16="http://schemas.microsoft.com/office/drawing/2014/main" id="{4A295400-4D04-49BA-8AFF-2A4070D9EAF8}"/>
+                <a16:creationId xmlns:a16="http://schemas.microsoft.com/office/drawing/2014/main" xmlns="" id="{4A295400-4D04-49BA-8AFF-2A4070D9EAF8}"/>
               </a:ext>
             </a:extLst>
           </p:cNvPr>
@@ -27714,6 +27875,13 @@
       </p:transition>
     </mc:Fallback>
   </mc:AlternateContent>
+  <p:timing>
+    <p:tnLst>
+      <p:par>
+        <p:cTn id="1" dur="indefinite" restart="never" nodeType="tmRoot"/>
+      </p:par>
+    </p:tnLst>
+  </p:timing>
 </p:sld>
 </file>
 
@@ -27739,7 +27907,7 @@
           <p:cNvPr id="49" name="Picture 48">
             <a:extLst>
               <a:ext uri="{FF2B5EF4-FFF2-40B4-BE49-F238E27FC236}">
-                <a16:creationId xmlns:a16="http://schemas.microsoft.com/office/drawing/2014/main" id="{3DB88EB2-4959-4384-B606-6EC9735683D6}"/>
+                <a16:creationId xmlns:a16="http://schemas.microsoft.com/office/drawing/2014/main" xmlns="" id="{3DB88EB2-4959-4384-B606-6EC9735683D6}"/>
               </a:ext>
             </a:extLst>
           </p:cNvPr>
@@ -27775,7 +27943,7 @@
           <p:cNvPr id="51" name="Straight Connector 50">
             <a:extLst>
               <a:ext uri="{FF2B5EF4-FFF2-40B4-BE49-F238E27FC236}">
-                <a16:creationId xmlns:a16="http://schemas.microsoft.com/office/drawing/2014/main" id="{29B44FC3-C737-4B92-B1D0-AD232099FBDF}"/>
+                <a16:creationId xmlns:a16="http://schemas.microsoft.com/office/drawing/2014/main" xmlns="" id="{29B44FC3-C737-4B92-B1D0-AD232099FBDF}"/>
               </a:ext>
             </a:extLst>
           </p:cNvPr>
@@ -27816,7 +27984,7 @@
           <p:cNvPr id="52" name="Title 1">
             <a:extLst>
               <a:ext uri="{FF2B5EF4-FFF2-40B4-BE49-F238E27FC236}">
-                <a16:creationId xmlns:a16="http://schemas.microsoft.com/office/drawing/2014/main" id="{2B8CDEBA-452A-4190-964B-37DF9F5C0EF5}"/>
+                <a16:creationId xmlns:a16="http://schemas.microsoft.com/office/drawing/2014/main" xmlns="" id="{2B8CDEBA-452A-4190-964B-37DF9F5C0EF5}"/>
               </a:ext>
             </a:extLst>
           </p:cNvPr>
@@ -27875,7 +28043,7 @@
           <p:cNvPr id="53" name="Rectangle 52">
             <a:extLst>
               <a:ext uri="{FF2B5EF4-FFF2-40B4-BE49-F238E27FC236}">
-                <a16:creationId xmlns:a16="http://schemas.microsoft.com/office/drawing/2014/main" id="{A0FB1C80-C067-49CE-95A9-A233AADF262C}"/>
+                <a16:creationId xmlns:a16="http://schemas.microsoft.com/office/drawing/2014/main" xmlns="" id="{A0FB1C80-C067-49CE-95A9-A233AADF262C}"/>
               </a:ext>
             </a:extLst>
           </p:cNvPr>
@@ -27926,7 +28094,7 @@
           <p:cNvPr id="54" name="Slide Number Placeholder 5">
             <a:extLst>
               <a:ext uri="{FF2B5EF4-FFF2-40B4-BE49-F238E27FC236}">
-                <a16:creationId xmlns:a16="http://schemas.microsoft.com/office/drawing/2014/main" id="{9AD941AF-6002-455E-B6E0-BA52F0663035}"/>
+                <a16:creationId xmlns:a16="http://schemas.microsoft.com/office/drawing/2014/main" xmlns="" id="{9AD941AF-6002-455E-B6E0-BA52F0663035}"/>
               </a:ext>
             </a:extLst>
           </p:cNvPr>
@@ -27971,7 +28139,7 @@
           <p:cNvPr id="9" name="Footer Placeholder 4">
             <a:extLst>
               <a:ext uri="{FF2B5EF4-FFF2-40B4-BE49-F238E27FC236}">
-                <a16:creationId xmlns:a16="http://schemas.microsoft.com/office/drawing/2014/main" id="{829FB96C-2293-49F4-98CC-049EF9D74402}"/>
+                <a16:creationId xmlns:a16="http://schemas.microsoft.com/office/drawing/2014/main" xmlns="" id="{829FB96C-2293-49F4-98CC-049EF9D74402}"/>
               </a:ext>
             </a:extLst>
           </p:cNvPr>
@@ -28561,6 +28729,13 @@
       </p:transition>
     </mc:Fallback>
   </mc:AlternateContent>
+  <p:timing>
+    <p:tnLst>
+      <p:par>
+        <p:cTn id="1" dur="indefinite" restart="never" nodeType="tmRoot"/>
+      </p:par>
+    </p:tnLst>
+  </p:timing>
 </p:sld>
 </file>
 
@@ -28586,7 +28761,7 @@
           <p:cNvPr id="49" name="Picture 48">
             <a:extLst>
               <a:ext uri="{FF2B5EF4-FFF2-40B4-BE49-F238E27FC236}">
-                <a16:creationId xmlns:a16="http://schemas.microsoft.com/office/drawing/2014/main" id="{3DB88EB2-4959-4384-B606-6EC9735683D6}"/>
+                <a16:creationId xmlns:a16="http://schemas.microsoft.com/office/drawing/2014/main" xmlns="" id="{3DB88EB2-4959-4384-B606-6EC9735683D6}"/>
               </a:ext>
             </a:extLst>
           </p:cNvPr>
@@ -28622,7 +28797,7 @@
           <p:cNvPr id="51" name="Straight Connector 50">
             <a:extLst>
               <a:ext uri="{FF2B5EF4-FFF2-40B4-BE49-F238E27FC236}">
-                <a16:creationId xmlns:a16="http://schemas.microsoft.com/office/drawing/2014/main" id="{29B44FC3-C737-4B92-B1D0-AD232099FBDF}"/>
+                <a16:creationId xmlns:a16="http://schemas.microsoft.com/office/drawing/2014/main" xmlns="" id="{29B44FC3-C737-4B92-B1D0-AD232099FBDF}"/>
               </a:ext>
             </a:extLst>
           </p:cNvPr>
@@ -28663,7 +28838,7 @@
           <p:cNvPr id="52" name="Title 1">
             <a:extLst>
               <a:ext uri="{FF2B5EF4-FFF2-40B4-BE49-F238E27FC236}">
-                <a16:creationId xmlns:a16="http://schemas.microsoft.com/office/drawing/2014/main" id="{2B8CDEBA-452A-4190-964B-37DF9F5C0EF5}"/>
+                <a16:creationId xmlns:a16="http://schemas.microsoft.com/office/drawing/2014/main" xmlns="" id="{2B8CDEBA-452A-4190-964B-37DF9F5C0EF5}"/>
               </a:ext>
             </a:extLst>
           </p:cNvPr>
@@ -28722,7 +28897,7 @@
           <p:cNvPr id="53" name="Rectangle 52">
             <a:extLst>
               <a:ext uri="{FF2B5EF4-FFF2-40B4-BE49-F238E27FC236}">
-                <a16:creationId xmlns:a16="http://schemas.microsoft.com/office/drawing/2014/main" id="{A0FB1C80-C067-49CE-95A9-A233AADF262C}"/>
+                <a16:creationId xmlns:a16="http://schemas.microsoft.com/office/drawing/2014/main" xmlns="" id="{A0FB1C80-C067-49CE-95A9-A233AADF262C}"/>
               </a:ext>
             </a:extLst>
           </p:cNvPr>
@@ -28773,7 +28948,7 @@
           <p:cNvPr id="54" name="Slide Number Placeholder 5">
             <a:extLst>
               <a:ext uri="{FF2B5EF4-FFF2-40B4-BE49-F238E27FC236}">
-                <a16:creationId xmlns:a16="http://schemas.microsoft.com/office/drawing/2014/main" id="{9AD941AF-6002-455E-B6E0-BA52F0663035}"/>
+                <a16:creationId xmlns:a16="http://schemas.microsoft.com/office/drawing/2014/main" xmlns="" id="{9AD941AF-6002-455E-B6E0-BA52F0663035}"/>
               </a:ext>
             </a:extLst>
           </p:cNvPr>
@@ -28818,7 +28993,7 @@
           <p:cNvPr id="9" name="Footer Placeholder 4">
             <a:extLst>
               <a:ext uri="{FF2B5EF4-FFF2-40B4-BE49-F238E27FC236}">
-                <a16:creationId xmlns:a16="http://schemas.microsoft.com/office/drawing/2014/main" id="{829FB96C-2293-49F4-98CC-049EF9D74402}"/>
+                <a16:creationId xmlns:a16="http://schemas.microsoft.com/office/drawing/2014/main" xmlns="" id="{829FB96C-2293-49F4-98CC-049EF9D74402}"/>
               </a:ext>
             </a:extLst>
           </p:cNvPr>
@@ -29319,6 +29494,13 @@
       </p:transition>
     </mc:Fallback>
   </mc:AlternateContent>
+  <p:timing>
+    <p:tnLst>
+      <p:par>
+        <p:cTn id="1" dur="indefinite" restart="never" nodeType="tmRoot"/>
+      </p:par>
+    </p:tnLst>
+  </p:timing>
 </p:sld>
 </file>
 
@@ -29344,7 +29526,7 @@
           <p:cNvPr id="49" name="Picture 48">
             <a:extLst>
               <a:ext uri="{FF2B5EF4-FFF2-40B4-BE49-F238E27FC236}">
-                <a16:creationId xmlns:a16="http://schemas.microsoft.com/office/drawing/2014/main" id="{3DB88EB2-4959-4384-B606-6EC9735683D6}"/>
+                <a16:creationId xmlns:a16="http://schemas.microsoft.com/office/drawing/2014/main" xmlns="" id="{3DB88EB2-4959-4384-B606-6EC9735683D6}"/>
               </a:ext>
             </a:extLst>
           </p:cNvPr>
@@ -29380,7 +29562,7 @@
           <p:cNvPr id="51" name="Straight Connector 50">
             <a:extLst>
               <a:ext uri="{FF2B5EF4-FFF2-40B4-BE49-F238E27FC236}">
-                <a16:creationId xmlns:a16="http://schemas.microsoft.com/office/drawing/2014/main" id="{29B44FC3-C737-4B92-B1D0-AD232099FBDF}"/>
+                <a16:creationId xmlns:a16="http://schemas.microsoft.com/office/drawing/2014/main" xmlns="" id="{29B44FC3-C737-4B92-B1D0-AD232099FBDF}"/>
               </a:ext>
             </a:extLst>
           </p:cNvPr>
@@ -29421,7 +29603,7 @@
           <p:cNvPr id="52" name="Title 1">
             <a:extLst>
               <a:ext uri="{FF2B5EF4-FFF2-40B4-BE49-F238E27FC236}">
-                <a16:creationId xmlns:a16="http://schemas.microsoft.com/office/drawing/2014/main" id="{2B8CDEBA-452A-4190-964B-37DF9F5C0EF5}"/>
+                <a16:creationId xmlns:a16="http://schemas.microsoft.com/office/drawing/2014/main" xmlns="" id="{2B8CDEBA-452A-4190-964B-37DF9F5C0EF5}"/>
               </a:ext>
             </a:extLst>
           </p:cNvPr>
@@ -29480,7 +29662,7 @@
           <p:cNvPr id="53" name="Rectangle 52">
             <a:extLst>
               <a:ext uri="{FF2B5EF4-FFF2-40B4-BE49-F238E27FC236}">
-                <a16:creationId xmlns:a16="http://schemas.microsoft.com/office/drawing/2014/main" id="{A0FB1C80-C067-49CE-95A9-A233AADF262C}"/>
+                <a16:creationId xmlns:a16="http://schemas.microsoft.com/office/drawing/2014/main" xmlns="" id="{A0FB1C80-C067-49CE-95A9-A233AADF262C}"/>
               </a:ext>
             </a:extLst>
           </p:cNvPr>
@@ -29531,7 +29713,7 @@
           <p:cNvPr id="54" name="Slide Number Placeholder 5">
             <a:extLst>
               <a:ext uri="{FF2B5EF4-FFF2-40B4-BE49-F238E27FC236}">
-                <a16:creationId xmlns:a16="http://schemas.microsoft.com/office/drawing/2014/main" id="{9AD941AF-6002-455E-B6E0-BA52F0663035}"/>
+                <a16:creationId xmlns:a16="http://schemas.microsoft.com/office/drawing/2014/main" xmlns="" id="{9AD941AF-6002-455E-B6E0-BA52F0663035}"/>
               </a:ext>
             </a:extLst>
           </p:cNvPr>
@@ -29576,7 +29758,7 @@
           <p:cNvPr id="9" name="Footer Placeholder 4">
             <a:extLst>
               <a:ext uri="{FF2B5EF4-FFF2-40B4-BE49-F238E27FC236}">
-                <a16:creationId xmlns:a16="http://schemas.microsoft.com/office/drawing/2014/main" id="{829FB96C-2293-49F4-98CC-049EF9D74402}"/>
+                <a16:creationId xmlns:a16="http://schemas.microsoft.com/office/drawing/2014/main" xmlns="" id="{829FB96C-2293-49F4-98CC-049EF9D74402}"/>
               </a:ext>
             </a:extLst>
           </p:cNvPr>
@@ -29748,7 +29930,7 @@
           <p:cNvPr id="14" name="Picture 13">
             <a:extLst>
               <a:ext uri="{FF2B5EF4-FFF2-40B4-BE49-F238E27FC236}">
-                <a16:creationId xmlns:a16="http://schemas.microsoft.com/office/drawing/2014/main" id="{6EF37E4D-1AEB-4EA9-9A8B-DE747D09C42C}"/>
+                <a16:creationId xmlns:a16="http://schemas.microsoft.com/office/drawing/2014/main" xmlns="" id="{6EF37E4D-1AEB-4EA9-9A8B-DE747D09C42C}"/>
               </a:ext>
             </a:extLst>
           </p:cNvPr>
@@ -29787,7 +29969,7 @@
           <p:cNvPr id="15" name="Picture 14">
             <a:extLst>
               <a:ext uri="{FF2B5EF4-FFF2-40B4-BE49-F238E27FC236}">
-                <a16:creationId xmlns:a16="http://schemas.microsoft.com/office/drawing/2014/main" id="{AA2B7335-2762-403E-8A94-0ABCF7E6CABA}"/>
+                <a16:creationId xmlns:a16="http://schemas.microsoft.com/office/drawing/2014/main" xmlns="" id="{AA2B7335-2762-403E-8A94-0ABCF7E6CABA}"/>
               </a:ext>
             </a:extLst>
           </p:cNvPr>
@@ -29843,6 +30025,13 @@
       </p:transition>
     </mc:Fallback>
   </mc:AlternateContent>
+  <p:timing>
+    <p:tnLst>
+      <p:par>
+        <p:cTn id="1" dur="indefinite" restart="never" nodeType="tmRoot"/>
+      </p:par>
+    </p:tnLst>
+  </p:timing>
 </p:sld>
 </file>
 
@@ -29868,7 +30057,7 @@
           <p:cNvPr id="49" name="Picture 48">
             <a:extLst>
               <a:ext uri="{FF2B5EF4-FFF2-40B4-BE49-F238E27FC236}">
-                <a16:creationId xmlns:a16="http://schemas.microsoft.com/office/drawing/2014/main" id="{3DB88EB2-4959-4384-B606-6EC9735683D6}"/>
+                <a16:creationId xmlns:a16="http://schemas.microsoft.com/office/drawing/2014/main" xmlns="" id="{3DB88EB2-4959-4384-B606-6EC9735683D6}"/>
               </a:ext>
             </a:extLst>
           </p:cNvPr>
@@ -29904,7 +30093,7 @@
           <p:cNvPr id="51" name="Straight Connector 50">
             <a:extLst>
               <a:ext uri="{FF2B5EF4-FFF2-40B4-BE49-F238E27FC236}">
-                <a16:creationId xmlns:a16="http://schemas.microsoft.com/office/drawing/2014/main" id="{29B44FC3-C737-4B92-B1D0-AD232099FBDF}"/>
+                <a16:creationId xmlns:a16="http://schemas.microsoft.com/office/drawing/2014/main" xmlns="" id="{29B44FC3-C737-4B92-B1D0-AD232099FBDF}"/>
               </a:ext>
             </a:extLst>
           </p:cNvPr>
@@ -29945,7 +30134,7 @@
           <p:cNvPr id="52" name="Title 1">
             <a:extLst>
               <a:ext uri="{FF2B5EF4-FFF2-40B4-BE49-F238E27FC236}">
-                <a16:creationId xmlns:a16="http://schemas.microsoft.com/office/drawing/2014/main" id="{2B8CDEBA-452A-4190-964B-37DF9F5C0EF5}"/>
+                <a16:creationId xmlns:a16="http://schemas.microsoft.com/office/drawing/2014/main" xmlns="" id="{2B8CDEBA-452A-4190-964B-37DF9F5C0EF5}"/>
               </a:ext>
             </a:extLst>
           </p:cNvPr>
@@ -30004,7 +30193,7 @@
           <p:cNvPr id="53" name="Rectangle 52">
             <a:extLst>
               <a:ext uri="{FF2B5EF4-FFF2-40B4-BE49-F238E27FC236}">
-                <a16:creationId xmlns:a16="http://schemas.microsoft.com/office/drawing/2014/main" id="{A0FB1C80-C067-49CE-95A9-A233AADF262C}"/>
+                <a16:creationId xmlns:a16="http://schemas.microsoft.com/office/drawing/2014/main" xmlns="" id="{A0FB1C80-C067-49CE-95A9-A233AADF262C}"/>
               </a:ext>
             </a:extLst>
           </p:cNvPr>
@@ -30055,7 +30244,7 @@
           <p:cNvPr id="54" name="Slide Number Placeholder 5">
             <a:extLst>
               <a:ext uri="{FF2B5EF4-FFF2-40B4-BE49-F238E27FC236}">
-                <a16:creationId xmlns:a16="http://schemas.microsoft.com/office/drawing/2014/main" id="{9AD941AF-6002-455E-B6E0-BA52F0663035}"/>
+                <a16:creationId xmlns:a16="http://schemas.microsoft.com/office/drawing/2014/main" xmlns="" id="{9AD941AF-6002-455E-B6E0-BA52F0663035}"/>
               </a:ext>
             </a:extLst>
           </p:cNvPr>
@@ -30100,7 +30289,7 @@
           <p:cNvPr id="9" name="Footer Placeholder 4">
             <a:extLst>
               <a:ext uri="{FF2B5EF4-FFF2-40B4-BE49-F238E27FC236}">
-                <a16:creationId xmlns:a16="http://schemas.microsoft.com/office/drawing/2014/main" id="{829FB96C-2293-49F4-98CC-049EF9D74402}"/>
+                <a16:creationId xmlns:a16="http://schemas.microsoft.com/office/drawing/2014/main" xmlns="" id="{829FB96C-2293-49F4-98CC-049EF9D74402}"/>
               </a:ext>
             </a:extLst>
           </p:cNvPr>
@@ -30141,7 +30330,7 @@
           <p:cNvPr id="4" name="Content Placeholder 3">
             <a:extLst>
               <a:ext uri="{FF2B5EF4-FFF2-40B4-BE49-F238E27FC236}">
-                <a16:creationId xmlns:a16="http://schemas.microsoft.com/office/drawing/2014/main" id="{F5C54ACA-78FB-47A7-9830-6060D236CC29}"/>
+                <a16:creationId xmlns:a16="http://schemas.microsoft.com/office/drawing/2014/main" xmlns="" id="{F5C54ACA-78FB-47A7-9830-6060D236CC29}"/>
               </a:ext>
             </a:extLst>
           </p:cNvPr>
@@ -30196,7 +30385,7 @@
           <p:cNvPr id="16" name="Picture 15">
             <a:extLst>
               <a:ext uri="{FF2B5EF4-FFF2-40B4-BE49-F238E27FC236}">
-                <a16:creationId xmlns:a16="http://schemas.microsoft.com/office/drawing/2014/main" id="{714CA646-F71D-4D33-BD25-2D14951A51BD}"/>
+                <a16:creationId xmlns:a16="http://schemas.microsoft.com/office/drawing/2014/main" xmlns="" id="{714CA646-F71D-4D33-BD25-2D14951A51BD}"/>
               </a:ext>
             </a:extLst>
           </p:cNvPr>
@@ -30238,7 +30427,7 @@
           <p:cNvPr id="17" name="Content Placeholder 3">
             <a:extLst>
               <a:ext uri="{FF2B5EF4-FFF2-40B4-BE49-F238E27FC236}">
-                <a16:creationId xmlns:a16="http://schemas.microsoft.com/office/drawing/2014/main" id="{33155E4B-8B57-47EB-9AEB-576EAB8A9325}"/>
+                <a16:creationId xmlns:a16="http://schemas.microsoft.com/office/drawing/2014/main" xmlns="" id="{33155E4B-8B57-47EB-9AEB-576EAB8A9325}"/>
               </a:ext>
             </a:extLst>
           </p:cNvPr>
@@ -30462,7 +30651,7 @@
           <p:cNvPr id="18" name="Content Placeholder 3">
             <a:extLst>
               <a:ext uri="{FF2B5EF4-FFF2-40B4-BE49-F238E27FC236}">
-                <a16:creationId xmlns:a16="http://schemas.microsoft.com/office/drawing/2014/main" id="{410FD6F7-A4B0-47D5-8550-140B62FA4B93}"/>
+                <a16:creationId xmlns:a16="http://schemas.microsoft.com/office/drawing/2014/main" xmlns="" id="{410FD6F7-A4B0-47D5-8550-140B62FA4B93}"/>
               </a:ext>
             </a:extLst>
           </p:cNvPr>
@@ -30686,7 +30875,7 @@
           <p:cNvPr id="19" name="Content Placeholder 3">
             <a:extLst>
               <a:ext uri="{FF2B5EF4-FFF2-40B4-BE49-F238E27FC236}">
-                <a16:creationId xmlns:a16="http://schemas.microsoft.com/office/drawing/2014/main" id="{0C656A42-C3EB-4315-BC13-A032BEB8406A}"/>
+                <a16:creationId xmlns:a16="http://schemas.microsoft.com/office/drawing/2014/main" xmlns="" id="{0C656A42-C3EB-4315-BC13-A032BEB8406A}"/>
               </a:ext>
             </a:extLst>
           </p:cNvPr>
@@ -30915,6 +31104,13 @@
       </p:transition>
     </mc:Fallback>
   </mc:AlternateContent>
+  <p:timing>
+    <p:tnLst>
+      <p:par>
+        <p:cTn id="1" dur="indefinite" restart="never" nodeType="tmRoot"/>
+      </p:par>
+    </p:tnLst>
+  </p:timing>
 </p:sld>
 </file>
 
@@ -30940,7 +31136,7 @@
           <p:cNvPr id="49" name="Picture 48">
             <a:extLst>
               <a:ext uri="{FF2B5EF4-FFF2-40B4-BE49-F238E27FC236}">
-                <a16:creationId xmlns:a16="http://schemas.microsoft.com/office/drawing/2014/main" id="{3DB88EB2-4959-4384-B606-6EC9735683D6}"/>
+                <a16:creationId xmlns:a16="http://schemas.microsoft.com/office/drawing/2014/main" xmlns="" id="{3DB88EB2-4959-4384-B606-6EC9735683D6}"/>
               </a:ext>
             </a:extLst>
           </p:cNvPr>
@@ -30976,7 +31172,7 @@
           <p:cNvPr id="54" name="Slide Number Placeholder 5">
             <a:extLst>
               <a:ext uri="{FF2B5EF4-FFF2-40B4-BE49-F238E27FC236}">
-                <a16:creationId xmlns:a16="http://schemas.microsoft.com/office/drawing/2014/main" id="{9AD941AF-6002-455E-B6E0-BA52F0663035}"/>
+                <a16:creationId xmlns:a16="http://schemas.microsoft.com/office/drawing/2014/main" xmlns="" id="{9AD941AF-6002-455E-B6E0-BA52F0663035}"/>
               </a:ext>
             </a:extLst>
           </p:cNvPr>
@@ -31021,7 +31217,7 @@
           <p:cNvPr id="19" name="Title 1">
             <a:extLst>
               <a:ext uri="{FF2B5EF4-FFF2-40B4-BE49-F238E27FC236}">
-                <a16:creationId xmlns:a16="http://schemas.microsoft.com/office/drawing/2014/main" id="{45DE30A8-2F8A-4013-AF22-27C0A7388B2F}"/>
+                <a16:creationId xmlns:a16="http://schemas.microsoft.com/office/drawing/2014/main" xmlns="" id="{45DE30A8-2F8A-4013-AF22-27C0A7388B2F}"/>
               </a:ext>
             </a:extLst>
           </p:cNvPr>
@@ -31095,7 +31291,7 @@
           <p:cNvPr id="22" name="Straight Connector 21">
             <a:extLst>
               <a:ext uri="{FF2B5EF4-FFF2-40B4-BE49-F238E27FC236}">
-                <a16:creationId xmlns:a16="http://schemas.microsoft.com/office/drawing/2014/main" id="{A3C3DF79-CF3A-4E66-A575-D5A7953A6CEB}"/>
+                <a16:creationId xmlns:a16="http://schemas.microsoft.com/office/drawing/2014/main" xmlns="" id="{A3C3DF79-CF3A-4E66-A575-D5A7953A6CEB}"/>
               </a:ext>
             </a:extLst>
           </p:cNvPr>
@@ -31138,7 +31334,7 @@
           <p:cNvPr id="25" name="Straight Connector 24">
             <a:extLst>
               <a:ext uri="{FF2B5EF4-FFF2-40B4-BE49-F238E27FC236}">
-                <a16:creationId xmlns:a16="http://schemas.microsoft.com/office/drawing/2014/main" id="{1AC35EEC-E10F-4CC7-B5D7-44E576C5CC6C}"/>
+                <a16:creationId xmlns:a16="http://schemas.microsoft.com/office/drawing/2014/main" xmlns="" id="{1AC35EEC-E10F-4CC7-B5D7-44E576C5CC6C}"/>
               </a:ext>
             </a:extLst>
           </p:cNvPr>
@@ -31181,7 +31377,7 @@
           <p:cNvPr id="8" name="Footer Placeholder 4">
             <a:extLst>
               <a:ext uri="{FF2B5EF4-FFF2-40B4-BE49-F238E27FC236}">
-                <a16:creationId xmlns:a16="http://schemas.microsoft.com/office/drawing/2014/main" id="{4A295400-4D04-49BA-8AFF-2A4070D9EAF8}"/>
+                <a16:creationId xmlns:a16="http://schemas.microsoft.com/office/drawing/2014/main" xmlns="" id="{4A295400-4D04-49BA-8AFF-2A4070D9EAF8}"/>
               </a:ext>
             </a:extLst>
           </p:cNvPr>
@@ -31239,6 +31435,13 @@
       </p:transition>
     </mc:Fallback>
   </mc:AlternateContent>
+  <p:timing>
+    <p:tnLst>
+      <p:par>
+        <p:cTn id="1" dur="indefinite" restart="never" nodeType="tmRoot"/>
+      </p:par>
+    </p:tnLst>
+  </p:timing>
 </p:sld>
 </file>
 
@@ -31264,7 +31467,7 @@
           <p:cNvPr id="49" name="Picture 48">
             <a:extLst>
               <a:ext uri="{FF2B5EF4-FFF2-40B4-BE49-F238E27FC236}">
-                <a16:creationId xmlns:a16="http://schemas.microsoft.com/office/drawing/2014/main" id="{3DB88EB2-4959-4384-B606-6EC9735683D6}"/>
+                <a16:creationId xmlns:a16="http://schemas.microsoft.com/office/drawing/2014/main" xmlns="" id="{3DB88EB2-4959-4384-B606-6EC9735683D6}"/>
               </a:ext>
             </a:extLst>
           </p:cNvPr>
@@ -31300,7 +31503,7 @@
           <p:cNvPr id="51" name="Straight Connector 50">
             <a:extLst>
               <a:ext uri="{FF2B5EF4-FFF2-40B4-BE49-F238E27FC236}">
-                <a16:creationId xmlns:a16="http://schemas.microsoft.com/office/drawing/2014/main" id="{29B44FC3-C737-4B92-B1D0-AD232099FBDF}"/>
+                <a16:creationId xmlns:a16="http://schemas.microsoft.com/office/drawing/2014/main" xmlns="" id="{29B44FC3-C737-4B92-B1D0-AD232099FBDF}"/>
               </a:ext>
             </a:extLst>
           </p:cNvPr>
@@ -31341,7 +31544,7 @@
           <p:cNvPr id="52" name="Title 1">
             <a:extLst>
               <a:ext uri="{FF2B5EF4-FFF2-40B4-BE49-F238E27FC236}">
-                <a16:creationId xmlns:a16="http://schemas.microsoft.com/office/drawing/2014/main" id="{2B8CDEBA-452A-4190-964B-37DF9F5C0EF5}"/>
+                <a16:creationId xmlns:a16="http://schemas.microsoft.com/office/drawing/2014/main" xmlns="" id="{2B8CDEBA-452A-4190-964B-37DF9F5C0EF5}"/>
               </a:ext>
             </a:extLst>
           </p:cNvPr>
@@ -31400,7 +31603,7 @@
           <p:cNvPr id="53" name="Rectangle 52">
             <a:extLst>
               <a:ext uri="{FF2B5EF4-FFF2-40B4-BE49-F238E27FC236}">
-                <a16:creationId xmlns:a16="http://schemas.microsoft.com/office/drawing/2014/main" id="{A0FB1C80-C067-49CE-95A9-A233AADF262C}"/>
+                <a16:creationId xmlns:a16="http://schemas.microsoft.com/office/drawing/2014/main" xmlns="" id="{A0FB1C80-C067-49CE-95A9-A233AADF262C}"/>
               </a:ext>
             </a:extLst>
           </p:cNvPr>
@@ -31451,7 +31654,7 @@
           <p:cNvPr id="54" name="Slide Number Placeholder 5">
             <a:extLst>
               <a:ext uri="{FF2B5EF4-FFF2-40B4-BE49-F238E27FC236}">
-                <a16:creationId xmlns:a16="http://schemas.microsoft.com/office/drawing/2014/main" id="{9AD941AF-6002-455E-B6E0-BA52F0663035}"/>
+                <a16:creationId xmlns:a16="http://schemas.microsoft.com/office/drawing/2014/main" xmlns="" id="{9AD941AF-6002-455E-B6E0-BA52F0663035}"/>
               </a:ext>
             </a:extLst>
           </p:cNvPr>
@@ -31496,7 +31699,7 @@
           <p:cNvPr id="9" name="Footer Placeholder 4">
             <a:extLst>
               <a:ext uri="{FF2B5EF4-FFF2-40B4-BE49-F238E27FC236}">
-                <a16:creationId xmlns:a16="http://schemas.microsoft.com/office/drawing/2014/main" id="{829FB96C-2293-49F4-98CC-049EF9D74402}"/>
+                <a16:creationId xmlns:a16="http://schemas.microsoft.com/office/drawing/2014/main" xmlns="" id="{829FB96C-2293-49F4-98CC-049EF9D74402}"/>
               </a:ext>
             </a:extLst>
           </p:cNvPr>
@@ -31698,59 +31901,95 @@
               <a:t> </a:t>
             </a:r>
             <a:r>
-              <a:rPr lang="en-US" dirty="0" err="1"/>
-              <a:t>terbaik</a:t>
+              <a:rPr lang="en-US" dirty="0" smtClean="0"/>
+              <a:t>plat </a:t>
+            </a:r>
+            <a:r>
+              <a:rPr lang="en-US" dirty="0" err="1" smtClean="0"/>
+              <a:t>nomor</a:t>
+            </a:r>
+            <a:r>
+              <a:rPr lang="en-US" dirty="0" smtClean="0"/>
+              <a:t> </a:t>
+            </a:r>
+            <a:r>
+              <a:rPr lang="en-US" dirty="0" err="1" smtClean="0"/>
+              <a:t>menggunakan</a:t>
+            </a:r>
+            <a:r>
+              <a:rPr lang="en-US" dirty="0" smtClean="0"/>
+              <a:t> YOLO </a:t>
+            </a:r>
+            <a:r>
+              <a:rPr lang="en-US" dirty="0" err="1" smtClean="0"/>
+              <a:t>lebih</a:t>
+            </a:r>
+            <a:r>
+              <a:rPr lang="en-US" dirty="0" smtClean="0"/>
+              <a:t> </a:t>
+            </a:r>
+            <a:r>
+              <a:rPr lang="en-US" dirty="0" err="1" smtClean="0"/>
+              <a:t>baik</a:t>
+            </a:r>
+            <a:r>
+              <a:rPr lang="en-US" dirty="0" smtClean="0"/>
+              <a:t> </a:t>
+            </a:r>
+            <a:r>
+              <a:rPr lang="en-US" dirty="0" err="1" smtClean="0"/>
+              <a:t>dibandingkan</a:t>
+            </a:r>
+            <a:r>
+              <a:rPr lang="en-US" dirty="0" smtClean="0"/>
+              <a:t> </a:t>
             </a:r>
             <a:r>
               <a:rPr lang="en-US" dirty="0"/>
-              <a:t> </a:t>
-            </a:r>
-            <a:r>
-              <a:rPr lang="en-US" dirty="0" err="1"/>
-              <a:t>didapatkan</a:t>
+              <a:t>SIFT </a:t>
+            </a:r>
+            <a:r>
+              <a:rPr lang="en-US" dirty="0" err="1" smtClean="0"/>
+              <a:t>dan</a:t>
+            </a:r>
+            <a:r>
+              <a:rPr lang="en-US" dirty="0" smtClean="0"/>
+              <a:t> Tracker </a:t>
+            </a:r>
+            <a:r>
+              <a:rPr lang="en-US" dirty="0" err="1" smtClean="0"/>
+              <a:t>yaitu</a:t>
+            </a:r>
+            <a:r>
+              <a:rPr lang="en-US" dirty="0" smtClean="0"/>
+              <a:t> </a:t>
+            </a:r>
+            <a:r>
+              <a:rPr lang="en-US" dirty="0" err="1" smtClean="0"/>
+              <a:t>sebesar</a:t>
+            </a:r>
+            <a:r>
+              <a:rPr lang="en-US" dirty="0" smtClean="0"/>
+              <a:t> </a:t>
             </a:r>
             <a:r>
               <a:rPr lang="en-US" dirty="0"/>
-              <a:t> </a:t>
-            </a:r>
-            <a:r>
-              <a:rPr lang="en-US" dirty="0" err="1"/>
-              <a:t>dengan</a:t>
-            </a:r>
-            <a:r>
-              <a:rPr lang="en-US" dirty="0"/>
-              <a:t> </a:t>
-            </a:r>
-            <a:r>
-              <a:rPr lang="en-US" dirty="0" err="1"/>
-              <a:t>menggunakan</a:t>
-            </a:r>
-            <a:r>
-              <a:rPr lang="en-US" dirty="0"/>
-              <a:t> YOLO </a:t>
-            </a:r>
-            <a:r>
-              <a:rPr lang="en-US" dirty="0" err="1"/>
-              <a:t>dibandingkan</a:t>
-            </a:r>
-            <a:r>
-              <a:rPr lang="en-US" dirty="0"/>
-              <a:t> SIFT + Tracker </a:t>
-            </a:r>
-            <a:r>
-              <a:rPr lang="en-US" dirty="0" err="1"/>
-              <a:t>sebagai</a:t>
-            </a:r>
-            <a:r>
-              <a:rPr lang="en-US" dirty="0"/>
-              <a:t> </a:t>
-            </a:r>
-            <a:r>
-              <a:rPr lang="en-US" dirty="0" err="1"/>
-              <a:t>metode</a:t>
-            </a:r>
-            <a:r>
-              <a:rPr lang="en-US" dirty="0"/>
+              <a:t>100% </a:t>
+            </a:r>
+            <a:r>
+              <a:rPr lang="en-US" dirty="0" err="1" smtClean="0"/>
+              <a:t>sedangkan</a:t>
+            </a:r>
+            <a:r>
+              <a:rPr lang="en-US" dirty="0" smtClean="0"/>
+              <a:t> </a:t>
+            </a:r>
+            <a:r>
+              <a:rPr lang="en-US" dirty="0" err="1" smtClean="0"/>
+              <a:t>akurasi</a:t>
+            </a:r>
+            <a:r>
+              <a:rPr lang="en-US" dirty="0" smtClean="0"/>
               <a:t> </a:t>
             </a:r>
             <a:r>
@@ -31759,95 +31998,31 @@
             </a:r>
             <a:r>
               <a:rPr lang="en-US" dirty="0"/>
-              <a:t>. </a:t>
-            </a:r>
-            <a:r>
-              <a:rPr lang="en-US" dirty="0" err="1"/>
-              <a:t>Terbukti</a:t>
+              <a:t> SIFT </a:t>
+            </a:r>
+            <a:r>
+              <a:rPr lang="en-US" dirty="0" err="1" smtClean="0"/>
+              <a:t>dan</a:t>
+            </a:r>
+            <a:r>
+              <a:rPr lang="en-US" dirty="0" smtClean="0"/>
+              <a:t> </a:t>
             </a:r>
             <a:r>
               <a:rPr lang="en-US" dirty="0"/>
-              <a:t> </a:t>
-            </a:r>
-            <a:r>
-              <a:rPr lang="en-US" dirty="0" err="1"/>
-              <a:t>dengan</a:t>
+              <a:t>Tracking </a:t>
+            </a:r>
+            <a:r>
+              <a:rPr lang="en-US" dirty="0" err="1" smtClean="0"/>
+              <a:t>sebesar</a:t>
+            </a:r>
+            <a:r>
+              <a:rPr lang="en-US" dirty="0" smtClean="0"/>
+              <a:t> </a:t>
             </a:r>
             <a:r>
               <a:rPr lang="en-US" dirty="0"/>
-              <a:t> </a:t>
-            </a:r>
-            <a:r>
-              <a:rPr lang="en-US" dirty="0" err="1"/>
-              <a:t>akurasi</a:t>
-            </a:r>
-            <a:r>
-              <a:rPr lang="en-US" dirty="0"/>
-              <a:t> rata-rata </a:t>
-            </a:r>
-            <a:r>
-              <a:rPr lang="en-US" dirty="0" err="1"/>
-              <a:t>lokalisasi</a:t>
-            </a:r>
-            <a:r>
-              <a:rPr lang="en-US" dirty="0"/>
-              <a:t> YOLO </a:t>
-            </a:r>
-            <a:r>
-              <a:rPr lang="en-US" dirty="0" err="1"/>
-              <a:t>sebesar</a:t>
-            </a:r>
-            <a:r>
-              <a:rPr lang="en-US" dirty="0"/>
-              <a:t> 100% </a:t>
-            </a:r>
-            <a:r>
-              <a:rPr lang="en-US" dirty="0" err="1"/>
-              <a:t>dibandingkan</a:t>
-            </a:r>
-            <a:r>
-              <a:rPr lang="en-US" dirty="0"/>
-              <a:t> </a:t>
-            </a:r>
-            <a:r>
-              <a:rPr lang="en-US" dirty="0" err="1"/>
-              <a:t>dengan</a:t>
-            </a:r>
-            <a:r>
-              <a:rPr lang="en-US" dirty="0"/>
-              <a:t> </a:t>
-            </a:r>
-            <a:r>
-              <a:rPr lang="en-US" dirty="0" err="1"/>
-              <a:t>akurasi</a:t>
-            </a:r>
-            <a:r>
-              <a:rPr lang="en-US" dirty="0"/>
-              <a:t> </a:t>
-            </a:r>
-            <a:r>
-              <a:rPr lang="en-US" dirty="0" err="1"/>
-              <a:t>lokalisasi</a:t>
-            </a:r>
-            <a:r>
-              <a:rPr lang="en-US" dirty="0"/>
-              <a:t> SIFT + Tracking </a:t>
-            </a:r>
-            <a:r>
-              <a:rPr lang="en-US" dirty="0" err="1"/>
-              <a:t>yaitu</a:t>
-            </a:r>
-            <a:r>
-              <a:rPr lang="en-US" dirty="0"/>
-              <a:t> </a:t>
-            </a:r>
-            <a:r>
-              <a:rPr lang="en-US" dirty="0" err="1"/>
-              <a:t>sebesar</a:t>
-            </a:r>
-            <a:r>
-              <a:rPr lang="en-US" dirty="0"/>
-              <a:t> 26,33%.</a:t>
+              <a:t>26,33%.</a:t>
             </a:r>
             <a:endParaRPr lang="en-ID" dirty="0"/>
           </a:p>
@@ -31881,44 +32056,48 @@
               <a:t> </a:t>
             </a:r>
             <a:r>
+              <a:rPr lang="en-US" dirty="0" err="1" smtClean="0"/>
+              <a:t>menghasilkan</a:t>
+            </a:r>
+            <a:r>
+              <a:rPr lang="en-US" dirty="0" smtClean="0"/>
+              <a:t> rata-rata </a:t>
+            </a:r>
+            <a:r>
+              <a:rPr lang="en-US" dirty="0" err="1" smtClean="0"/>
+              <a:t>akurasi</a:t>
+            </a:r>
+            <a:r>
+              <a:rPr lang="en-US" dirty="0" smtClean="0"/>
+              <a:t> </a:t>
+            </a:r>
+            <a:r>
+              <a:rPr lang="en-US" dirty="0" err="1" smtClean="0"/>
+              <a:t>segmentasi</a:t>
+            </a:r>
+            <a:r>
+              <a:rPr lang="en-US" dirty="0" smtClean="0"/>
+              <a:t> </a:t>
+            </a:r>
+            <a:r>
+              <a:rPr lang="en-US" dirty="0" err="1" smtClean="0"/>
+              <a:t>sebesar</a:t>
+            </a:r>
+            <a:r>
+              <a:rPr lang="en-US" dirty="0" smtClean="0"/>
+              <a:t> 71,23</a:t>
+            </a:r>
+            <a:r>
+              <a:rPr lang="en-US" dirty="0"/>
+              <a:t>%  </a:t>
+            </a:r>
+            <a:r>
               <a:rPr lang="en-US" dirty="0" err="1"/>
-              <a:t>sudah</a:t>
+              <a:t>pada</a:t>
             </a:r>
             <a:r>
               <a:rPr lang="en-US" dirty="0"/>
-              <a:t> </a:t>
-            </a:r>
-            <a:r>
-              <a:rPr lang="en-US" dirty="0" err="1"/>
-              <a:t>cukup</a:t>
-            </a:r>
-            <a:r>
-              <a:rPr lang="en-US" dirty="0"/>
-              <a:t> </a:t>
-            </a:r>
-            <a:r>
-              <a:rPr lang="en-US" dirty="0" err="1"/>
-              <a:t>berhasil</a:t>
-            </a:r>
-            <a:r>
-              <a:rPr lang="en-US" dirty="0"/>
-              <a:t> </a:t>
-            </a:r>
-            <a:r>
-              <a:rPr lang="en-US" dirty="0" err="1"/>
-              <a:t>melakukan</a:t>
-            </a:r>
-            <a:r>
-              <a:rPr lang="en-US" dirty="0"/>
-              <a:t> </a:t>
-            </a:r>
-            <a:r>
-              <a:rPr lang="en-US" dirty="0" err="1"/>
-              <a:t>segmentasi</a:t>
-            </a:r>
-            <a:r>
-              <a:rPr lang="en-US" dirty="0"/>
-              <a:t> pada area plat </a:t>
+              <a:t> area plat </a:t>
             </a:r>
             <a:r>
               <a:rPr lang="en-US" dirty="0" err="1"/>
@@ -31929,44 +32108,12 @@
               <a:t> yang </a:t>
             </a:r>
             <a:r>
-              <a:rPr lang="en-US" dirty="0" err="1"/>
+              <a:rPr lang="en-US" dirty="0" err="1" smtClean="0"/>
               <a:t>terdeteksi</a:t>
             </a:r>
             <a:r>
-              <a:rPr lang="en-US" dirty="0"/>
-              <a:t>, </a:t>
-            </a:r>
-            <a:r>
-              <a:rPr lang="en-US" dirty="0" err="1"/>
-              <a:t>dengan</a:t>
-            </a:r>
-            <a:r>
-              <a:rPr lang="en-US" dirty="0"/>
-              <a:t> </a:t>
-            </a:r>
-            <a:r>
-              <a:rPr lang="en-US" dirty="0" err="1"/>
-              <a:t>akurasi</a:t>
-            </a:r>
-            <a:r>
-              <a:rPr lang="en-US" dirty="0"/>
-              <a:t> rata-rata </a:t>
-            </a:r>
-            <a:r>
-              <a:rPr lang="en-US" dirty="0" err="1"/>
-              <a:t>segmentasi</a:t>
-            </a:r>
-            <a:r>
-              <a:rPr lang="en-US" dirty="0"/>
-              <a:t> </a:t>
-            </a:r>
-            <a:r>
-              <a:rPr lang="en-US" dirty="0" err="1"/>
-              <a:t>mencapai</a:t>
-            </a:r>
-            <a:r>
-              <a:rPr lang="en-US" dirty="0"/>
-              <a:t> 71,23%.</a:t>
+              <a:rPr lang="en-US" dirty="0" smtClean="0"/>
+              <a:t>.</a:t>
             </a:r>
             <a:endParaRPr lang="en-ID" dirty="0"/>
           </a:p>
@@ -32008,12 +32155,20 @@
               <a:t> </a:t>
             </a:r>
             <a:r>
-              <a:rPr lang="en-US" dirty="0" err="1"/>
+              <a:rPr lang="en-US" dirty="0" err="1" smtClean="0"/>
               <a:t>kendaraan</a:t>
             </a:r>
             <a:r>
-              <a:rPr lang="en-US" dirty="0"/>
-              <a:t> </a:t>
+              <a:rPr lang="en-US" dirty="0" smtClean="0"/>
+              <a:t> </a:t>
+            </a:r>
+            <a:r>
+              <a:rPr lang="en-US" dirty="0" err="1" smtClean="0"/>
+              <a:t>menggunakan</a:t>
+            </a:r>
+            <a:r>
+              <a:rPr lang="en-US" dirty="0" smtClean="0"/>
+              <a:t> CNN </a:t>
             </a:r>
             <a:r>
               <a:rPr lang="en-US" dirty="0" err="1"/>
@@ -32160,6 +32315,13 @@
       </p:transition>
     </mc:Fallback>
   </mc:AlternateContent>
+  <p:timing>
+    <p:tnLst>
+      <p:par>
+        <p:cTn id="1" dur="indefinite" restart="never" nodeType="tmRoot"/>
+      </p:par>
+    </p:tnLst>
+  </p:timing>
 </p:sld>
 </file>
 
@@ -32185,7 +32347,7 @@
           <p:cNvPr id="49" name="Picture 48">
             <a:extLst>
               <a:ext uri="{FF2B5EF4-FFF2-40B4-BE49-F238E27FC236}">
-                <a16:creationId xmlns:a16="http://schemas.microsoft.com/office/drawing/2014/main" id="{3DB88EB2-4959-4384-B606-6EC9735683D6}"/>
+                <a16:creationId xmlns:a16="http://schemas.microsoft.com/office/drawing/2014/main" xmlns="" id="{3DB88EB2-4959-4384-B606-6EC9735683D6}"/>
               </a:ext>
             </a:extLst>
           </p:cNvPr>
@@ -32221,7 +32383,7 @@
           <p:cNvPr id="51" name="Straight Connector 50">
             <a:extLst>
               <a:ext uri="{FF2B5EF4-FFF2-40B4-BE49-F238E27FC236}">
-                <a16:creationId xmlns:a16="http://schemas.microsoft.com/office/drawing/2014/main" id="{29B44FC3-C737-4B92-B1D0-AD232099FBDF}"/>
+                <a16:creationId xmlns:a16="http://schemas.microsoft.com/office/drawing/2014/main" xmlns="" id="{29B44FC3-C737-4B92-B1D0-AD232099FBDF}"/>
               </a:ext>
             </a:extLst>
           </p:cNvPr>
@@ -32262,7 +32424,7 @@
           <p:cNvPr id="52" name="Title 1">
             <a:extLst>
               <a:ext uri="{FF2B5EF4-FFF2-40B4-BE49-F238E27FC236}">
-                <a16:creationId xmlns:a16="http://schemas.microsoft.com/office/drawing/2014/main" id="{2B8CDEBA-452A-4190-964B-37DF9F5C0EF5}"/>
+                <a16:creationId xmlns:a16="http://schemas.microsoft.com/office/drawing/2014/main" xmlns="" id="{2B8CDEBA-452A-4190-964B-37DF9F5C0EF5}"/>
               </a:ext>
             </a:extLst>
           </p:cNvPr>
@@ -32321,7 +32483,7 @@
           <p:cNvPr id="53" name="Rectangle 52">
             <a:extLst>
               <a:ext uri="{FF2B5EF4-FFF2-40B4-BE49-F238E27FC236}">
-                <a16:creationId xmlns:a16="http://schemas.microsoft.com/office/drawing/2014/main" id="{A0FB1C80-C067-49CE-95A9-A233AADF262C}"/>
+                <a16:creationId xmlns:a16="http://schemas.microsoft.com/office/drawing/2014/main" xmlns="" id="{A0FB1C80-C067-49CE-95A9-A233AADF262C}"/>
               </a:ext>
             </a:extLst>
           </p:cNvPr>
@@ -32372,7 +32534,7 @@
           <p:cNvPr id="54" name="Slide Number Placeholder 5">
             <a:extLst>
               <a:ext uri="{FF2B5EF4-FFF2-40B4-BE49-F238E27FC236}">
-                <a16:creationId xmlns:a16="http://schemas.microsoft.com/office/drawing/2014/main" id="{9AD941AF-6002-455E-B6E0-BA52F0663035}"/>
+                <a16:creationId xmlns:a16="http://schemas.microsoft.com/office/drawing/2014/main" xmlns="" id="{9AD941AF-6002-455E-B6E0-BA52F0663035}"/>
               </a:ext>
             </a:extLst>
           </p:cNvPr>
@@ -32417,7 +32579,7 @@
           <p:cNvPr id="9" name="Footer Placeholder 4">
             <a:extLst>
               <a:ext uri="{FF2B5EF4-FFF2-40B4-BE49-F238E27FC236}">
-                <a16:creationId xmlns:a16="http://schemas.microsoft.com/office/drawing/2014/main" id="{829FB96C-2293-49F4-98CC-049EF9D74402}"/>
+                <a16:creationId xmlns:a16="http://schemas.microsoft.com/office/drawing/2014/main" xmlns="" id="{829FB96C-2293-49F4-98CC-049EF9D74402}"/>
               </a:ext>
             </a:extLst>
           </p:cNvPr>
@@ -32630,82 +32792,11 @@
               <a:buAutoNum type="arabicPeriod"/>
             </a:pPr>
             <a:r>
-              <a:rPr lang="en-US" dirty="0" err="1"/>
-              <a:t>Pengembangan</a:t>
-            </a:r>
-            <a:r>
-              <a:rPr lang="en-US" dirty="0"/>
-              <a:t> </a:t>
-            </a:r>
-            <a:r>
-              <a:rPr lang="en-US" dirty="0" err="1"/>
-              <a:t>sistem</a:t>
-            </a:r>
-            <a:r>
-              <a:rPr lang="en-US" dirty="0"/>
-              <a:t> </a:t>
-            </a:r>
-            <a:r>
-              <a:rPr lang="en-US" dirty="0" err="1"/>
-              <a:t>dengan</a:t>
-            </a:r>
-            <a:r>
-              <a:rPr lang="en-US" dirty="0"/>
-              <a:t> </a:t>
-            </a:r>
-            <a:r>
-              <a:rPr lang="en-US" dirty="0" err="1"/>
-              <a:t>arsitektur</a:t>
-            </a:r>
-            <a:r>
-              <a:rPr lang="en-US" dirty="0"/>
-              <a:t> yang </a:t>
-            </a:r>
-            <a:r>
-              <a:rPr lang="en-US" dirty="0" err="1"/>
-              <a:t>menghasilkan</a:t>
-            </a:r>
-            <a:r>
-              <a:rPr lang="en-US" dirty="0"/>
-              <a:t> </a:t>
-            </a:r>
-            <a:r>
-              <a:rPr lang="en-US" dirty="0" err="1"/>
-              <a:t>performa</a:t>
-            </a:r>
-            <a:r>
-              <a:rPr lang="en-US" dirty="0"/>
-              <a:t> yang </a:t>
-            </a:r>
-            <a:r>
-              <a:rPr lang="en-US" dirty="0" err="1"/>
-              <a:t>lebih</a:t>
-            </a:r>
-            <a:r>
-              <a:rPr lang="en-US" dirty="0"/>
-              <a:t> </a:t>
-            </a:r>
-            <a:r>
-              <a:rPr lang="en-US" dirty="0" err="1"/>
-              <a:t>baik</a:t>
-            </a:r>
-            <a:r>
-              <a:rPr lang="en-US" i="1" dirty="0"/>
-              <a:t>.</a:t>
-            </a:r>
-            <a:endParaRPr lang="en-ID" dirty="0"/>
-          </a:p>
-          <a:p>
-            <a:pPr marL="446088" lvl="3" indent="-446088">
-              <a:buFont typeface="+mj-lt"/>
-              <a:buAutoNum type="arabicPeriod"/>
-            </a:pPr>
-            <a:r>
-              <a:rPr lang="en-US" dirty="0" err="1"/>
+              <a:rPr lang="en-US" dirty="0" err="1" smtClean="0"/>
               <a:t>Melakukan</a:t>
             </a:r>
             <a:r>
-              <a:rPr lang="en-US" dirty="0"/>
+              <a:rPr lang="en-US" dirty="0" smtClean="0"/>
               <a:t> </a:t>
             </a:r>
             <a:r>
@@ -32862,6 +32953,13 @@
       </p:transition>
     </mc:Fallback>
   </mc:AlternateContent>
+  <p:timing>
+    <p:tnLst>
+      <p:par>
+        <p:cTn id="1" dur="indefinite" restart="never" nodeType="tmRoot"/>
+      </p:par>
+    </p:tnLst>
+  </p:timing>
 </p:sld>
 </file>
 
@@ -32887,7 +32985,7 @@
           <p:cNvPr id="49" name="Picture 48">
             <a:extLst>
               <a:ext uri="{FF2B5EF4-FFF2-40B4-BE49-F238E27FC236}">
-                <a16:creationId xmlns:a16="http://schemas.microsoft.com/office/drawing/2014/main" id="{3DB88EB2-4959-4384-B606-6EC9735683D6}"/>
+                <a16:creationId xmlns:a16="http://schemas.microsoft.com/office/drawing/2014/main" xmlns="" id="{3DB88EB2-4959-4384-B606-6EC9735683D6}"/>
               </a:ext>
             </a:extLst>
           </p:cNvPr>
@@ -32923,7 +33021,7 @@
           <p:cNvPr id="51" name="Straight Connector 50">
             <a:extLst>
               <a:ext uri="{FF2B5EF4-FFF2-40B4-BE49-F238E27FC236}">
-                <a16:creationId xmlns:a16="http://schemas.microsoft.com/office/drawing/2014/main" id="{29B44FC3-C737-4B92-B1D0-AD232099FBDF}"/>
+                <a16:creationId xmlns:a16="http://schemas.microsoft.com/office/drawing/2014/main" xmlns="" id="{29B44FC3-C737-4B92-B1D0-AD232099FBDF}"/>
               </a:ext>
             </a:extLst>
           </p:cNvPr>
@@ -32964,7 +33062,7 @@
           <p:cNvPr id="52" name="Title 1">
             <a:extLst>
               <a:ext uri="{FF2B5EF4-FFF2-40B4-BE49-F238E27FC236}">
-                <a16:creationId xmlns:a16="http://schemas.microsoft.com/office/drawing/2014/main" id="{2B8CDEBA-452A-4190-964B-37DF9F5C0EF5}"/>
+                <a16:creationId xmlns:a16="http://schemas.microsoft.com/office/drawing/2014/main" xmlns="" id="{2B8CDEBA-452A-4190-964B-37DF9F5C0EF5}"/>
               </a:ext>
             </a:extLst>
           </p:cNvPr>
@@ -33010,7 +33108,7 @@
           <p:cNvPr id="53" name="Rectangle 52">
             <a:extLst>
               <a:ext uri="{FF2B5EF4-FFF2-40B4-BE49-F238E27FC236}">
-                <a16:creationId xmlns:a16="http://schemas.microsoft.com/office/drawing/2014/main" id="{A0FB1C80-C067-49CE-95A9-A233AADF262C}"/>
+                <a16:creationId xmlns:a16="http://schemas.microsoft.com/office/drawing/2014/main" xmlns="" id="{A0FB1C80-C067-49CE-95A9-A233AADF262C}"/>
               </a:ext>
             </a:extLst>
           </p:cNvPr>
@@ -33061,7 +33159,7 @@
           <p:cNvPr id="54" name="Slide Number Placeholder 5">
             <a:extLst>
               <a:ext uri="{FF2B5EF4-FFF2-40B4-BE49-F238E27FC236}">
-                <a16:creationId xmlns:a16="http://schemas.microsoft.com/office/drawing/2014/main" id="{9AD941AF-6002-455E-B6E0-BA52F0663035}"/>
+                <a16:creationId xmlns:a16="http://schemas.microsoft.com/office/drawing/2014/main" xmlns="" id="{9AD941AF-6002-455E-B6E0-BA52F0663035}"/>
               </a:ext>
             </a:extLst>
           </p:cNvPr>
@@ -33106,7 +33204,7 @@
           <p:cNvPr id="23" name="Content Placeholder 2">
             <a:extLst>
               <a:ext uri="{FF2B5EF4-FFF2-40B4-BE49-F238E27FC236}">
-                <a16:creationId xmlns:a16="http://schemas.microsoft.com/office/drawing/2014/main" id="{B1BC4ECC-9DB4-47DC-A168-FE20EA3589F3}"/>
+                <a16:creationId xmlns:a16="http://schemas.microsoft.com/office/drawing/2014/main" xmlns="" id="{B1BC4ECC-9DB4-47DC-A168-FE20EA3589F3}"/>
               </a:ext>
             </a:extLst>
           </p:cNvPr>
@@ -33763,7 +33861,7 @@
           <p:cNvPr id="11" name="Footer Placeholder 4">
             <a:extLst>
               <a:ext uri="{FF2B5EF4-FFF2-40B4-BE49-F238E27FC236}">
-                <a16:creationId xmlns:a16="http://schemas.microsoft.com/office/drawing/2014/main" id="{65A6326F-4A78-4B11-BD0A-7C5E74F56BF8}"/>
+                <a16:creationId xmlns:a16="http://schemas.microsoft.com/office/drawing/2014/main" xmlns="" id="{65A6326F-4A78-4B11-BD0A-7C5E74F56BF8}"/>
               </a:ext>
             </a:extLst>
           </p:cNvPr>
@@ -33843,6 +33941,13 @@
       </p:transition>
     </mc:Fallback>
   </mc:AlternateContent>
+  <p:timing>
+    <p:tnLst>
+      <p:par>
+        <p:cTn id="1" dur="indefinite" restart="never" nodeType="tmRoot"/>
+      </p:par>
+    </p:tnLst>
+  </p:timing>
 </p:sld>
 </file>
 
@@ -33868,7 +33973,7 @@
           <p:cNvPr id="49" name="Picture 48">
             <a:extLst>
               <a:ext uri="{FF2B5EF4-FFF2-40B4-BE49-F238E27FC236}">
-                <a16:creationId xmlns:a16="http://schemas.microsoft.com/office/drawing/2014/main" id="{3DB88EB2-4959-4384-B606-6EC9735683D6}"/>
+                <a16:creationId xmlns:a16="http://schemas.microsoft.com/office/drawing/2014/main" xmlns="" id="{3DB88EB2-4959-4384-B606-6EC9735683D6}"/>
               </a:ext>
             </a:extLst>
           </p:cNvPr>
@@ -33904,7 +34009,7 @@
           <p:cNvPr id="54" name="Slide Number Placeholder 5">
             <a:extLst>
               <a:ext uri="{FF2B5EF4-FFF2-40B4-BE49-F238E27FC236}">
-                <a16:creationId xmlns:a16="http://schemas.microsoft.com/office/drawing/2014/main" id="{9AD941AF-6002-455E-B6E0-BA52F0663035}"/>
+                <a16:creationId xmlns:a16="http://schemas.microsoft.com/office/drawing/2014/main" xmlns="" id="{9AD941AF-6002-455E-B6E0-BA52F0663035}"/>
               </a:ext>
             </a:extLst>
           </p:cNvPr>
@@ -33949,7 +34054,7 @@
           <p:cNvPr id="19" name="Title 1">
             <a:extLst>
               <a:ext uri="{FF2B5EF4-FFF2-40B4-BE49-F238E27FC236}">
-                <a16:creationId xmlns:a16="http://schemas.microsoft.com/office/drawing/2014/main" id="{45DE30A8-2F8A-4013-AF22-27C0A7388B2F}"/>
+                <a16:creationId xmlns:a16="http://schemas.microsoft.com/office/drawing/2014/main" xmlns="" id="{45DE30A8-2F8A-4013-AF22-27C0A7388B2F}"/>
               </a:ext>
             </a:extLst>
           </p:cNvPr>
@@ -34023,7 +34128,7 @@
           <p:cNvPr id="22" name="Straight Connector 21">
             <a:extLst>
               <a:ext uri="{FF2B5EF4-FFF2-40B4-BE49-F238E27FC236}">
-                <a16:creationId xmlns:a16="http://schemas.microsoft.com/office/drawing/2014/main" id="{A3C3DF79-CF3A-4E66-A575-D5A7953A6CEB}"/>
+                <a16:creationId xmlns:a16="http://schemas.microsoft.com/office/drawing/2014/main" xmlns="" id="{A3C3DF79-CF3A-4E66-A575-D5A7953A6CEB}"/>
               </a:ext>
             </a:extLst>
           </p:cNvPr>
@@ -34066,7 +34171,7 @@
           <p:cNvPr id="25" name="Straight Connector 24">
             <a:extLst>
               <a:ext uri="{FF2B5EF4-FFF2-40B4-BE49-F238E27FC236}">
-                <a16:creationId xmlns:a16="http://schemas.microsoft.com/office/drawing/2014/main" id="{1AC35EEC-E10F-4CC7-B5D7-44E576C5CC6C}"/>
+                <a16:creationId xmlns:a16="http://schemas.microsoft.com/office/drawing/2014/main" xmlns="" id="{1AC35EEC-E10F-4CC7-B5D7-44E576C5CC6C}"/>
               </a:ext>
             </a:extLst>
           </p:cNvPr>
@@ -34109,7 +34214,7 @@
           <p:cNvPr id="7" name="Footer Placeholder 4">
             <a:extLst>
               <a:ext uri="{FF2B5EF4-FFF2-40B4-BE49-F238E27FC236}">
-                <a16:creationId xmlns:a16="http://schemas.microsoft.com/office/drawing/2014/main" id="{4730E8F9-0717-4F82-8623-CFD9AA997650}"/>
+                <a16:creationId xmlns:a16="http://schemas.microsoft.com/office/drawing/2014/main" xmlns="" id="{4730E8F9-0717-4F82-8623-CFD9AA997650}"/>
               </a:ext>
             </a:extLst>
           </p:cNvPr>
@@ -34167,6 +34272,13 @@
       </p:transition>
     </mc:Fallback>
   </mc:AlternateContent>
+  <p:timing>
+    <p:tnLst>
+      <p:par>
+        <p:cTn id="1" dur="indefinite" restart="never" nodeType="tmRoot"/>
+      </p:par>
+    </p:tnLst>
+  </p:timing>
 </p:sld>
 </file>
 
@@ -34192,7 +34304,7 @@
           <p:cNvPr id="49" name="Picture 48">
             <a:extLst>
               <a:ext uri="{FF2B5EF4-FFF2-40B4-BE49-F238E27FC236}">
-                <a16:creationId xmlns:a16="http://schemas.microsoft.com/office/drawing/2014/main" id="{3DB88EB2-4959-4384-B606-6EC9735683D6}"/>
+                <a16:creationId xmlns:a16="http://schemas.microsoft.com/office/drawing/2014/main" xmlns="" id="{3DB88EB2-4959-4384-B606-6EC9735683D6}"/>
               </a:ext>
             </a:extLst>
           </p:cNvPr>
@@ -34228,7 +34340,7 @@
           <p:cNvPr id="51" name="Straight Connector 50">
             <a:extLst>
               <a:ext uri="{FF2B5EF4-FFF2-40B4-BE49-F238E27FC236}">
-                <a16:creationId xmlns:a16="http://schemas.microsoft.com/office/drawing/2014/main" id="{29B44FC3-C737-4B92-B1D0-AD232099FBDF}"/>
+                <a16:creationId xmlns:a16="http://schemas.microsoft.com/office/drawing/2014/main" xmlns="" id="{29B44FC3-C737-4B92-B1D0-AD232099FBDF}"/>
               </a:ext>
             </a:extLst>
           </p:cNvPr>
@@ -34269,7 +34381,7 @@
           <p:cNvPr id="52" name="Title 1">
             <a:extLst>
               <a:ext uri="{FF2B5EF4-FFF2-40B4-BE49-F238E27FC236}">
-                <a16:creationId xmlns:a16="http://schemas.microsoft.com/office/drawing/2014/main" id="{2B8CDEBA-452A-4190-964B-37DF9F5C0EF5}"/>
+                <a16:creationId xmlns:a16="http://schemas.microsoft.com/office/drawing/2014/main" xmlns="" id="{2B8CDEBA-452A-4190-964B-37DF9F5C0EF5}"/>
               </a:ext>
             </a:extLst>
           </p:cNvPr>
@@ -34315,7 +34427,7 @@
           <p:cNvPr id="53" name="Rectangle 52">
             <a:extLst>
               <a:ext uri="{FF2B5EF4-FFF2-40B4-BE49-F238E27FC236}">
-                <a16:creationId xmlns:a16="http://schemas.microsoft.com/office/drawing/2014/main" id="{A0FB1C80-C067-49CE-95A9-A233AADF262C}"/>
+                <a16:creationId xmlns:a16="http://schemas.microsoft.com/office/drawing/2014/main" xmlns="" id="{A0FB1C80-C067-49CE-95A9-A233AADF262C}"/>
               </a:ext>
             </a:extLst>
           </p:cNvPr>
@@ -34366,7 +34478,7 @@
           <p:cNvPr id="54" name="Slide Number Placeholder 5">
             <a:extLst>
               <a:ext uri="{FF2B5EF4-FFF2-40B4-BE49-F238E27FC236}">
-                <a16:creationId xmlns:a16="http://schemas.microsoft.com/office/drawing/2014/main" id="{9AD941AF-6002-455E-B6E0-BA52F0663035}"/>
+                <a16:creationId xmlns:a16="http://schemas.microsoft.com/office/drawing/2014/main" xmlns="" id="{9AD941AF-6002-455E-B6E0-BA52F0663035}"/>
               </a:ext>
             </a:extLst>
           </p:cNvPr>
@@ -34411,7 +34523,7 @@
           <p:cNvPr id="2" name="Rectangle 1">
             <a:extLst>
               <a:ext uri="{FF2B5EF4-FFF2-40B4-BE49-F238E27FC236}">
-                <a16:creationId xmlns:a16="http://schemas.microsoft.com/office/drawing/2014/main" id="{C6793AE4-C636-4AD8-823F-5FF1891CDD7E}"/>
+                <a16:creationId xmlns:a16="http://schemas.microsoft.com/office/drawing/2014/main" xmlns="" id="{C6793AE4-C636-4AD8-823F-5FF1891CDD7E}"/>
               </a:ext>
             </a:extLst>
           </p:cNvPr>
@@ -34997,7 +35109,7 @@
           <p:cNvPr id="9" name="Footer Placeholder 4">
             <a:extLst>
               <a:ext uri="{FF2B5EF4-FFF2-40B4-BE49-F238E27FC236}">
-                <a16:creationId xmlns:a16="http://schemas.microsoft.com/office/drawing/2014/main" id="{B49FBB66-0588-49B1-BEC3-8B20F1129C78}"/>
+                <a16:creationId xmlns:a16="http://schemas.microsoft.com/office/drawing/2014/main" xmlns="" id="{B49FBB66-0588-49B1-BEC3-8B20F1129C78}"/>
               </a:ext>
             </a:extLst>
           </p:cNvPr>
@@ -35055,6 +35167,13 @@
       </p:transition>
     </mc:Fallback>
   </mc:AlternateContent>
+  <p:timing>
+    <p:tnLst>
+      <p:par>
+        <p:cTn id="1" dur="indefinite" restart="never" nodeType="tmRoot"/>
+      </p:par>
+    </p:tnLst>
+  </p:timing>
 </p:sld>
 </file>
 
@@ -35080,7 +35199,7 @@
           <p:cNvPr id="49" name="Picture 48">
             <a:extLst>
               <a:ext uri="{FF2B5EF4-FFF2-40B4-BE49-F238E27FC236}">
-                <a16:creationId xmlns:a16="http://schemas.microsoft.com/office/drawing/2014/main" id="{3DB88EB2-4959-4384-B606-6EC9735683D6}"/>
+                <a16:creationId xmlns:a16="http://schemas.microsoft.com/office/drawing/2014/main" xmlns="" id="{3DB88EB2-4959-4384-B606-6EC9735683D6}"/>
               </a:ext>
             </a:extLst>
           </p:cNvPr>
@@ -35116,7 +35235,7 @@
           <p:cNvPr id="51" name="Straight Connector 50">
             <a:extLst>
               <a:ext uri="{FF2B5EF4-FFF2-40B4-BE49-F238E27FC236}">
-                <a16:creationId xmlns:a16="http://schemas.microsoft.com/office/drawing/2014/main" id="{29B44FC3-C737-4B92-B1D0-AD232099FBDF}"/>
+                <a16:creationId xmlns:a16="http://schemas.microsoft.com/office/drawing/2014/main" xmlns="" id="{29B44FC3-C737-4B92-B1D0-AD232099FBDF}"/>
               </a:ext>
             </a:extLst>
           </p:cNvPr>
@@ -35157,7 +35276,7 @@
           <p:cNvPr id="52" name="Title 1">
             <a:extLst>
               <a:ext uri="{FF2B5EF4-FFF2-40B4-BE49-F238E27FC236}">
-                <a16:creationId xmlns:a16="http://schemas.microsoft.com/office/drawing/2014/main" id="{2B8CDEBA-452A-4190-964B-37DF9F5C0EF5}"/>
+                <a16:creationId xmlns:a16="http://schemas.microsoft.com/office/drawing/2014/main" xmlns="" id="{2B8CDEBA-452A-4190-964B-37DF9F5C0EF5}"/>
               </a:ext>
             </a:extLst>
           </p:cNvPr>
@@ -35203,7 +35322,7 @@
           <p:cNvPr id="53" name="Rectangle 52">
             <a:extLst>
               <a:ext uri="{FF2B5EF4-FFF2-40B4-BE49-F238E27FC236}">
-                <a16:creationId xmlns:a16="http://schemas.microsoft.com/office/drawing/2014/main" id="{A0FB1C80-C067-49CE-95A9-A233AADF262C}"/>
+                <a16:creationId xmlns:a16="http://schemas.microsoft.com/office/drawing/2014/main" xmlns="" id="{A0FB1C80-C067-49CE-95A9-A233AADF262C}"/>
               </a:ext>
             </a:extLst>
           </p:cNvPr>
@@ -35254,7 +35373,7 @@
           <p:cNvPr id="54" name="Slide Number Placeholder 5">
             <a:extLst>
               <a:ext uri="{FF2B5EF4-FFF2-40B4-BE49-F238E27FC236}">
-                <a16:creationId xmlns:a16="http://schemas.microsoft.com/office/drawing/2014/main" id="{9AD941AF-6002-455E-B6E0-BA52F0663035}"/>
+                <a16:creationId xmlns:a16="http://schemas.microsoft.com/office/drawing/2014/main" xmlns="" id="{9AD941AF-6002-455E-B6E0-BA52F0663035}"/>
               </a:ext>
             </a:extLst>
           </p:cNvPr>
@@ -35299,7 +35418,7 @@
           <p:cNvPr id="9" name="Rectangle 8">
             <a:extLst>
               <a:ext uri="{FF2B5EF4-FFF2-40B4-BE49-F238E27FC236}">
-                <a16:creationId xmlns:a16="http://schemas.microsoft.com/office/drawing/2014/main" id="{48EEF59C-5FD7-452A-96F0-60ECF3B4902D}"/>
+                <a16:creationId xmlns:a16="http://schemas.microsoft.com/office/drawing/2014/main" xmlns="" id="{48EEF59C-5FD7-452A-96F0-60ECF3B4902D}"/>
               </a:ext>
             </a:extLst>
           </p:cNvPr>
@@ -35675,7 +35794,7 @@
           <p:cNvPr id="10" name="Footer Placeholder 4">
             <a:extLst>
               <a:ext uri="{FF2B5EF4-FFF2-40B4-BE49-F238E27FC236}">
-                <a16:creationId xmlns:a16="http://schemas.microsoft.com/office/drawing/2014/main" id="{92735924-1640-4018-AA64-0520C4488DF6}"/>
+                <a16:creationId xmlns:a16="http://schemas.microsoft.com/office/drawing/2014/main" xmlns="" id="{92735924-1640-4018-AA64-0520C4488DF6}"/>
               </a:ext>
             </a:extLst>
           </p:cNvPr>
@@ -35733,6 +35852,13 @@
       </p:transition>
     </mc:Fallback>
   </mc:AlternateContent>
+  <p:timing>
+    <p:tnLst>
+      <p:par>
+        <p:cTn id="1" dur="indefinite" restart="never" nodeType="tmRoot"/>
+      </p:par>
+    </p:tnLst>
+  </p:timing>
 </p:sld>
 </file>
 
@@ -35758,7 +35884,7 @@
           <p:cNvPr id="49" name="Picture 48">
             <a:extLst>
               <a:ext uri="{FF2B5EF4-FFF2-40B4-BE49-F238E27FC236}">
-                <a16:creationId xmlns:a16="http://schemas.microsoft.com/office/drawing/2014/main" id="{3DB88EB2-4959-4384-B606-6EC9735683D6}"/>
+                <a16:creationId xmlns:a16="http://schemas.microsoft.com/office/drawing/2014/main" xmlns="" id="{3DB88EB2-4959-4384-B606-6EC9735683D6}"/>
               </a:ext>
             </a:extLst>
           </p:cNvPr>
@@ -35794,7 +35920,7 @@
           <p:cNvPr id="51" name="Straight Connector 50">
             <a:extLst>
               <a:ext uri="{FF2B5EF4-FFF2-40B4-BE49-F238E27FC236}">
-                <a16:creationId xmlns:a16="http://schemas.microsoft.com/office/drawing/2014/main" id="{29B44FC3-C737-4B92-B1D0-AD232099FBDF}"/>
+                <a16:creationId xmlns:a16="http://schemas.microsoft.com/office/drawing/2014/main" xmlns="" id="{29B44FC3-C737-4B92-B1D0-AD232099FBDF}"/>
               </a:ext>
             </a:extLst>
           </p:cNvPr>
@@ -35835,7 +35961,7 @@
           <p:cNvPr id="52" name="Title 1">
             <a:extLst>
               <a:ext uri="{FF2B5EF4-FFF2-40B4-BE49-F238E27FC236}">
-                <a16:creationId xmlns:a16="http://schemas.microsoft.com/office/drawing/2014/main" id="{2B8CDEBA-452A-4190-964B-37DF9F5C0EF5}"/>
+                <a16:creationId xmlns:a16="http://schemas.microsoft.com/office/drawing/2014/main" xmlns="" id="{2B8CDEBA-452A-4190-964B-37DF9F5C0EF5}"/>
               </a:ext>
             </a:extLst>
           </p:cNvPr>
@@ -35881,7 +36007,7 @@
           <p:cNvPr id="53" name="Rectangle 52">
             <a:extLst>
               <a:ext uri="{FF2B5EF4-FFF2-40B4-BE49-F238E27FC236}">
-                <a16:creationId xmlns:a16="http://schemas.microsoft.com/office/drawing/2014/main" id="{A0FB1C80-C067-49CE-95A9-A233AADF262C}"/>
+                <a16:creationId xmlns:a16="http://schemas.microsoft.com/office/drawing/2014/main" xmlns="" id="{A0FB1C80-C067-49CE-95A9-A233AADF262C}"/>
               </a:ext>
             </a:extLst>
           </p:cNvPr>
@@ -35932,7 +36058,7 @@
           <p:cNvPr id="54" name="Slide Number Placeholder 5">
             <a:extLst>
               <a:ext uri="{FF2B5EF4-FFF2-40B4-BE49-F238E27FC236}">
-                <a16:creationId xmlns:a16="http://schemas.microsoft.com/office/drawing/2014/main" id="{9AD941AF-6002-455E-B6E0-BA52F0663035}"/>
+                <a16:creationId xmlns:a16="http://schemas.microsoft.com/office/drawing/2014/main" xmlns="" id="{9AD941AF-6002-455E-B6E0-BA52F0663035}"/>
               </a:ext>
             </a:extLst>
           </p:cNvPr>
@@ -35977,7 +36103,7 @@
           <p:cNvPr id="12" name="Rectangle 11">
             <a:extLst>
               <a:ext uri="{FF2B5EF4-FFF2-40B4-BE49-F238E27FC236}">
-                <a16:creationId xmlns:a16="http://schemas.microsoft.com/office/drawing/2014/main" id="{B44CAC18-C0E8-465C-BCB4-66BDAD74B38F}"/>
+                <a16:creationId xmlns:a16="http://schemas.microsoft.com/office/drawing/2014/main" xmlns="" id="{B44CAC18-C0E8-465C-BCB4-66BDAD74B38F}"/>
               </a:ext>
             </a:extLst>
           </p:cNvPr>
@@ -36312,7 +36438,7 @@
           <p:cNvPr id="9" name="Footer Placeholder 4">
             <a:extLst>
               <a:ext uri="{FF2B5EF4-FFF2-40B4-BE49-F238E27FC236}">
-                <a16:creationId xmlns:a16="http://schemas.microsoft.com/office/drawing/2014/main" id="{093BBBE3-DF79-4256-A5A6-39302F108CAF}"/>
+                <a16:creationId xmlns:a16="http://schemas.microsoft.com/office/drawing/2014/main" xmlns="" id="{093BBBE3-DF79-4256-A5A6-39302F108CAF}"/>
               </a:ext>
             </a:extLst>
           </p:cNvPr>
@@ -36370,6 +36496,13 @@
       </p:transition>
     </mc:Fallback>
   </mc:AlternateContent>
+  <p:timing>
+    <p:tnLst>
+      <p:par>
+        <p:cTn id="1" dur="indefinite" restart="never" nodeType="tmRoot"/>
+      </p:par>
+    </p:tnLst>
+  </p:timing>
 </p:sld>
 </file>
 
@@ -36395,7 +36528,7 @@
           <p:cNvPr id="49" name="Picture 48">
             <a:extLst>
               <a:ext uri="{FF2B5EF4-FFF2-40B4-BE49-F238E27FC236}">
-                <a16:creationId xmlns:a16="http://schemas.microsoft.com/office/drawing/2014/main" id="{3DB88EB2-4959-4384-B606-6EC9735683D6}"/>
+                <a16:creationId xmlns:a16="http://schemas.microsoft.com/office/drawing/2014/main" xmlns="" id="{3DB88EB2-4959-4384-B606-6EC9735683D6}"/>
               </a:ext>
             </a:extLst>
           </p:cNvPr>
@@ -36431,7 +36564,7 @@
           <p:cNvPr id="51" name="Straight Connector 50">
             <a:extLst>
               <a:ext uri="{FF2B5EF4-FFF2-40B4-BE49-F238E27FC236}">
-                <a16:creationId xmlns:a16="http://schemas.microsoft.com/office/drawing/2014/main" id="{29B44FC3-C737-4B92-B1D0-AD232099FBDF}"/>
+                <a16:creationId xmlns:a16="http://schemas.microsoft.com/office/drawing/2014/main" xmlns="" id="{29B44FC3-C737-4B92-B1D0-AD232099FBDF}"/>
               </a:ext>
             </a:extLst>
           </p:cNvPr>
@@ -36472,7 +36605,7 @@
           <p:cNvPr id="52" name="Title 1">
             <a:extLst>
               <a:ext uri="{FF2B5EF4-FFF2-40B4-BE49-F238E27FC236}">
-                <a16:creationId xmlns:a16="http://schemas.microsoft.com/office/drawing/2014/main" id="{2B8CDEBA-452A-4190-964B-37DF9F5C0EF5}"/>
+                <a16:creationId xmlns:a16="http://schemas.microsoft.com/office/drawing/2014/main" xmlns="" id="{2B8CDEBA-452A-4190-964B-37DF9F5C0EF5}"/>
               </a:ext>
             </a:extLst>
           </p:cNvPr>
@@ -36518,7 +36651,7 @@
           <p:cNvPr id="53" name="Rectangle 52">
             <a:extLst>
               <a:ext uri="{FF2B5EF4-FFF2-40B4-BE49-F238E27FC236}">
-                <a16:creationId xmlns:a16="http://schemas.microsoft.com/office/drawing/2014/main" id="{A0FB1C80-C067-49CE-95A9-A233AADF262C}"/>
+                <a16:creationId xmlns:a16="http://schemas.microsoft.com/office/drawing/2014/main" xmlns="" id="{A0FB1C80-C067-49CE-95A9-A233AADF262C}"/>
               </a:ext>
             </a:extLst>
           </p:cNvPr>
@@ -36569,7 +36702,7 @@
           <p:cNvPr id="54" name="Slide Number Placeholder 5">
             <a:extLst>
               <a:ext uri="{FF2B5EF4-FFF2-40B4-BE49-F238E27FC236}">
-                <a16:creationId xmlns:a16="http://schemas.microsoft.com/office/drawing/2014/main" id="{9AD941AF-6002-455E-B6E0-BA52F0663035}"/>
+                <a16:creationId xmlns:a16="http://schemas.microsoft.com/office/drawing/2014/main" xmlns="" id="{9AD941AF-6002-455E-B6E0-BA52F0663035}"/>
               </a:ext>
             </a:extLst>
           </p:cNvPr>
@@ -36614,7 +36747,7 @@
           <p:cNvPr id="12" name="Rectangle 11">
             <a:extLst>
               <a:ext uri="{FF2B5EF4-FFF2-40B4-BE49-F238E27FC236}">
-                <a16:creationId xmlns:a16="http://schemas.microsoft.com/office/drawing/2014/main" id="{B44CAC18-C0E8-465C-BCB4-66BDAD74B38F}"/>
+                <a16:creationId xmlns:a16="http://schemas.microsoft.com/office/drawing/2014/main" xmlns="" id="{B44CAC18-C0E8-465C-BCB4-66BDAD74B38F}"/>
               </a:ext>
             </a:extLst>
           </p:cNvPr>
@@ -36997,7 +37130,7 @@
           <p:cNvPr id="9" name="Footer Placeholder 4">
             <a:extLst>
               <a:ext uri="{FF2B5EF4-FFF2-40B4-BE49-F238E27FC236}">
-                <a16:creationId xmlns:a16="http://schemas.microsoft.com/office/drawing/2014/main" id="{FA92116D-0015-43EC-AF4F-3C9416DD1149}"/>
+                <a16:creationId xmlns:a16="http://schemas.microsoft.com/office/drawing/2014/main" xmlns="" id="{FA92116D-0015-43EC-AF4F-3C9416DD1149}"/>
               </a:ext>
             </a:extLst>
           </p:cNvPr>
@@ -37055,6 +37188,13 @@
       </p:transition>
     </mc:Fallback>
   </mc:AlternateContent>
+  <p:timing>
+    <p:tnLst>
+      <p:par>
+        <p:cTn id="1" dur="indefinite" restart="never" nodeType="tmRoot"/>
+      </p:par>
+    </p:tnLst>
+  </p:timing>
 </p:sld>
 </file>
 
@@ -37080,7 +37220,7 @@
           <p:cNvPr id="49" name="Picture 48">
             <a:extLst>
               <a:ext uri="{FF2B5EF4-FFF2-40B4-BE49-F238E27FC236}">
-                <a16:creationId xmlns:a16="http://schemas.microsoft.com/office/drawing/2014/main" id="{3DB88EB2-4959-4384-B606-6EC9735683D6}"/>
+                <a16:creationId xmlns:a16="http://schemas.microsoft.com/office/drawing/2014/main" xmlns="" id="{3DB88EB2-4959-4384-B606-6EC9735683D6}"/>
               </a:ext>
             </a:extLst>
           </p:cNvPr>
@@ -37116,7 +37256,7 @@
           <p:cNvPr id="54" name="Slide Number Placeholder 5">
             <a:extLst>
               <a:ext uri="{FF2B5EF4-FFF2-40B4-BE49-F238E27FC236}">
-                <a16:creationId xmlns:a16="http://schemas.microsoft.com/office/drawing/2014/main" id="{9AD941AF-6002-455E-B6E0-BA52F0663035}"/>
+                <a16:creationId xmlns:a16="http://schemas.microsoft.com/office/drawing/2014/main" xmlns="" id="{9AD941AF-6002-455E-B6E0-BA52F0663035}"/>
               </a:ext>
             </a:extLst>
           </p:cNvPr>
@@ -37161,7 +37301,7 @@
           <p:cNvPr id="19" name="Title 1">
             <a:extLst>
               <a:ext uri="{FF2B5EF4-FFF2-40B4-BE49-F238E27FC236}">
-                <a16:creationId xmlns:a16="http://schemas.microsoft.com/office/drawing/2014/main" id="{45DE30A8-2F8A-4013-AF22-27C0A7388B2F}"/>
+                <a16:creationId xmlns:a16="http://schemas.microsoft.com/office/drawing/2014/main" xmlns="" id="{45DE30A8-2F8A-4013-AF22-27C0A7388B2F}"/>
               </a:ext>
             </a:extLst>
           </p:cNvPr>
@@ -37223,7 +37363,7 @@
           <p:cNvPr id="22" name="Straight Connector 21">
             <a:extLst>
               <a:ext uri="{FF2B5EF4-FFF2-40B4-BE49-F238E27FC236}">
-                <a16:creationId xmlns:a16="http://schemas.microsoft.com/office/drawing/2014/main" id="{A3C3DF79-CF3A-4E66-A575-D5A7953A6CEB}"/>
+                <a16:creationId xmlns:a16="http://schemas.microsoft.com/office/drawing/2014/main" xmlns="" id="{A3C3DF79-CF3A-4E66-A575-D5A7953A6CEB}"/>
               </a:ext>
             </a:extLst>
           </p:cNvPr>
@@ -37266,7 +37406,7 @@
           <p:cNvPr id="25" name="Straight Connector 24">
             <a:extLst>
               <a:ext uri="{FF2B5EF4-FFF2-40B4-BE49-F238E27FC236}">
-                <a16:creationId xmlns:a16="http://schemas.microsoft.com/office/drawing/2014/main" id="{1AC35EEC-E10F-4CC7-B5D7-44E576C5CC6C}"/>
+                <a16:creationId xmlns:a16="http://schemas.microsoft.com/office/drawing/2014/main" xmlns="" id="{1AC35EEC-E10F-4CC7-B5D7-44E576C5CC6C}"/>
               </a:ext>
             </a:extLst>
           </p:cNvPr>
@@ -37309,7 +37449,7 @@
           <p:cNvPr id="8" name="Footer Placeholder 4">
             <a:extLst>
               <a:ext uri="{FF2B5EF4-FFF2-40B4-BE49-F238E27FC236}">
-                <a16:creationId xmlns:a16="http://schemas.microsoft.com/office/drawing/2014/main" id="{42338DE1-63F8-4EE0-BCD0-872F28CED345}"/>
+                <a16:creationId xmlns:a16="http://schemas.microsoft.com/office/drawing/2014/main" xmlns="" id="{42338DE1-63F8-4EE0-BCD0-872F28CED345}"/>
               </a:ext>
             </a:extLst>
           </p:cNvPr>
@@ -37367,6 +37507,13 @@
       </p:transition>
     </mc:Fallback>
   </mc:AlternateContent>
+  <p:timing>
+    <p:tnLst>
+      <p:par>
+        <p:cTn id="1" dur="indefinite" restart="never" nodeType="tmRoot"/>
+      </p:par>
+    </p:tnLst>
+  </p:timing>
 </p:sld>
 </file>
 

</xml_diff>